<commit_message>
Added: Additional slides for Presentation
</commit_message>
<xml_diff>
--- a/What is new in C Sharp  - 10.12.2018/Presentation.pptx
+++ b/What is new in C Sharp  - 10.12.2018/Presentation.pptx
@@ -4,16 +4,23 @@
   <p:sldMasterIdLst>
     <p:sldMasterId id="2147483669" r:id="rId1"/>
   </p:sldMasterIdLst>
+  <p:notesMasterIdLst>
+    <p:notesMasterId r:id="rId15"/>
+  </p:notesMasterIdLst>
   <p:sldIdLst>
     <p:sldId id="256" r:id="rId2"/>
-    <p:sldId id="271" r:id="rId3"/>
-    <p:sldId id="272" r:id="rId4"/>
-    <p:sldId id="270" r:id="rId5"/>
-    <p:sldId id="257" r:id="rId6"/>
-    <p:sldId id="258" r:id="rId7"/>
-    <p:sldId id="268" r:id="rId8"/>
-    <p:sldId id="260" r:id="rId9"/>
-    <p:sldId id="261" r:id="rId10"/>
+    <p:sldId id="272" r:id="rId3"/>
+    <p:sldId id="277" r:id="rId4"/>
+    <p:sldId id="276" r:id="rId5"/>
+    <p:sldId id="270" r:id="rId6"/>
+    <p:sldId id="257" r:id="rId7"/>
+    <p:sldId id="258" r:id="rId8"/>
+    <p:sldId id="268" r:id="rId9"/>
+    <p:sldId id="275" r:id="rId10"/>
+    <p:sldId id="274" r:id="rId11"/>
+    <p:sldId id="278" r:id="rId12"/>
+    <p:sldId id="260" r:id="rId13"/>
+    <p:sldId id="261" r:id="rId14"/>
   </p:sldIdLst>
   <p:sldSz cx="12192000" cy="6858000"/>
   <p:notesSz cx="6858000" cy="9144000"/>
@@ -120,6 +127,445 @@
 </p:presentation>
 </file>
 
+<file path=ppt/notesMasters/notesMaster1.xml><?xml version="1.0" encoding="utf-8"?>
+<p:notesMaster xmlns:a="http://schemas.openxmlformats.org/drawingml/2006/main" xmlns:r="http://schemas.openxmlformats.org/officeDocument/2006/relationships" xmlns:p="http://schemas.openxmlformats.org/presentationml/2006/main">
+  <p:cSld>
+    <p:bg>
+      <p:bgRef idx="1001">
+        <a:schemeClr val="bg1"/>
+      </p:bgRef>
+    </p:bg>
+    <p:spTree>
+      <p:nvGrpSpPr>
+        <p:cNvPr id="1" name=""/>
+        <p:cNvGrpSpPr/>
+        <p:nvPr/>
+      </p:nvGrpSpPr>
+      <p:grpSpPr>
+        <a:xfrm>
+          <a:off x="0" y="0"/>
+          <a:ext cx="0" cy="0"/>
+          <a:chOff x="0" y="0"/>
+          <a:chExt cx="0" cy="0"/>
+        </a:xfrm>
+      </p:grpSpPr>
+      <p:sp>
+        <p:nvSpPr>
+          <p:cNvPr id="2" name="Header Placeholder 1"/>
+          <p:cNvSpPr>
+            <a:spLocks noGrp="1"/>
+          </p:cNvSpPr>
+          <p:nvPr>
+            <p:ph type="hdr" sz="quarter"/>
+          </p:nvPr>
+        </p:nvSpPr>
+        <p:spPr>
+          <a:xfrm>
+            <a:off x="0" y="0"/>
+            <a:ext cx="2971800" cy="458788"/>
+          </a:xfrm>
+          <a:prstGeom prst="rect">
+            <a:avLst/>
+          </a:prstGeom>
+        </p:spPr>
+        <p:txBody>
+          <a:bodyPr vert="horz" lIns="91440" tIns="45720" rIns="91440" bIns="45720" rtlCol="0"/>
+          <a:lstStyle>
+            <a:lvl1pPr algn="l">
+              <a:defRPr sz="1200"/>
+            </a:lvl1pPr>
+          </a:lstStyle>
+          <a:p>
+            <a:endParaRPr lang="en-US"/>
+          </a:p>
+        </p:txBody>
+      </p:sp>
+      <p:sp>
+        <p:nvSpPr>
+          <p:cNvPr id="3" name="Date Placeholder 2"/>
+          <p:cNvSpPr>
+            <a:spLocks noGrp="1"/>
+          </p:cNvSpPr>
+          <p:nvPr>
+            <p:ph type="dt" idx="1"/>
+          </p:nvPr>
+        </p:nvSpPr>
+        <p:spPr>
+          <a:xfrm>
+            <a:off x="3884613" y="0"/>
+            <a:ext cx="2971800" cy="458788"/>
+          </a:xfrm>
+          <a:prstGeom prst="rect">
+            <a:avLst/>
+          </a:prstGeom>
+        </p:spPr>
+        <p:txBody>
+          <a:bodyPr vert="horz" lIns="91440" tIns="45720" rIns="91440" bIns="45720" rtlCol="0"/>
+          <a:lstStyle>
+            <a:lvl1pPr algn="r">
+              <a:defRPr sz="1200"/>
+            </a:lvl1pPr>
+          </a:lstStyle>
+          <a:p>
+            <a:fld id="{B9794F3E-93FF-4010-BF13-E6741D6F851C}" type="datetimeFigureOut">
+              <a:rPr lang="en-US" smtClean="0"/>
+              <a:t>10/11/2018</a:t>
+            </a:fld>
+            <a:endParaRPr lang="en-US"/>
+          </a:p>
+        </p:txBody>
+      </p:sp>
+      <p:sp>
+        <p:nvSpPr>
+          <p:cNvPr id="4" name="Slide Image Placeholder 3"/>
+          <p:cNvSpPr>
+            <a:spLocks noGrp="1" noRot="1" noChangeAspect="1"/>
+          </p:cNvSpPr>
+          <p:nvPr>
+            <p:ph type="sldImg" idx="2"/>
+          </p:nvPr>
+        </p:nvSpPr>
+        <p:spPr>
+          <a:xfrm>
+            <a:off x="685800" y="1143000"/>
+            <a:ext cx="5486400" cy="3086100"/>
+          </a:xfrm>
+          <a:prstGeom prst="rect">
+            <a:avLst/>
+          </a:prstGeom>
+          <a:noFill/>
+          <a:ln w="12700">
+            <a:solidFill>
+              <a:prstClr val="black"/>
+            </a:solidFill>
+          </a:ln>
+        </p:spPr>
+        <p:txBody>
+          <a:bodyPr vert="horz" lIns="91440" tIns="45720" rIns="91440" bIns="45720" rtlCol="0" anchor="ctr"/>
+          <a:lstStyle/>
+          <a:p>
+            <a:endParaRPr lang="en-US"/>
+          </a:p>
+        </p:txBody>
+      </p:sp>
+      <p:sp>
+        <p:nvSpPr>
+          <p:cNvPr id="5" name="Notes Placeholder 4"/>
+          <p:cNvSpPr>
+            <a:spLocks noGrp="1"/>
+          </p:cNvSpPr>
+          <p:nvPr>
+            <p:ph type="body" sz="quarter" idx="3"/>
+          </p:nvPr>
+        </p:nvSpPr>
+        <p:spPr>
+          <a:xfrm>
+            <a:off x="685800" y="4400550"/>
+            <a:ext cx="5486400" cy="3600450"/>
+          </a:xfrm>
+          <a:prstGeom prst="rect">
+            <a:avLst/>
+          </a:prstGeom>
+        </p:spPr>
+        <p:txBody>
+          <a:bodyPr vert="horz" lIns="91440" tIns="45720" rIns="91440" bIns="45720" rtlCol="0"/>
+          <a:lstStyle/>
+          <a:p>
+            <a:pPr lvl="0"/>
+            <a:r>
+              <a:rPr lang="en-US"/>
+              <a:t>Edit Master text styles</a:t>
+            </a:r>
+          </a:p>
+          <a:p>
+            <a:pPr lvl="1"/>
+            <a:r>
+              <a:rPr lang="en-US"/>
+              <a:t>Second level</a:t>
+            </a:r>
+          </a:p>
+          <a:p>
+            <a:pPr lvl="2"/>
+            <a:r>
+              <a:rPr lang="en-US"/>
+              <a:t>Third level</a:t>
+            </a:r>
+          </a:p>
+          <a:p>
+            <a:pPr lvl="3"/>
+            <a:r>
+              <a:rPr lang="en-US"/>
+              <a:t>Fourth level</a:t>
+            </a:r>
+          </a:p>
+          <a:p>
+            <a:pPr lvl="4"/>
+            <a:r>
+              <a:rPr lang="en-US"/>
+              <a:t>Fifth level</a:t>
+            </a:r>
+          </a:p>
+        </p:txBody>
+      </p:sp>
+      <p:sp>
+        <p:nvSpPr>
+          <p:cNvPr id="6" name="Footer Placeholder 5"/>
+          <p:cNvSpPr>
+            <a:spLocks noGrp="1"/>
+          </p:cNvSpPr>
+          <p:nvPr>
+            <p:ph type="ftr" sz="quarter" idx="4"/>
+          </p:nvPr>
+        </p:nvSpPr>
+        <p:spPr>
+          <a:xfrm>
+            <a:off x="0" y="8685213"/>
+            <a:ext cx="2971800" cy="458787"/>
+          </a:xfrm>
+          <a:prstGeom prst="rect">
+            <a:avLst/>
+          </a:prstGeom>
+        </p:spPr>
+        <p:txBody>
+          <a:bodyPr vert="horz" lIns="91440" tIns="45720" rIns="91440" bIns="45720" rtlCol="0" anchor="b"/>
+          <a:lstStyle>
+            <a:lvl1pPr algn="l">
+              <a:defRPr sz="1200"/>
+            </a:lvl1pPr>
+          </a:lstStyle>
+          <a:p>
+            <a:endParaRPr lang="en-US"/>
+          </a:p>
+        </p:txBody>
+      </p:sp>
+      <p:sp>
+        <p:nvSpPr>
+          <p:cNvPr id="7" name="Slide Number Placeholder 6"/>
+          <p:cNvSpPr>
+            <a:spLocks noGrp="1"/>
+          </p:cNvSpPr>
+          <p:nvPr>
+            <p:ph type="sldNum" sz="quarter" idx="5"/>
+          </p:nvPr>
+        </p:nvSpPr>
+        <p:spPr>
+          <a:xfrm>
+            <a:off x="3884613" y="8685213"/>
+            <a:ext cx="2971800" cy="458787"/>
+          </a:xfrm>
+          <a:prstGeom prst="rect">
+            <a:avLst/>
+          </a:prstGeom>
+        </p:spPr>
+        <p:txBody>
+          <a:bodyPr vert="horz" lIns="91440" tIns="45720" rIns="91440" bIns="45720" rtlCol="0" anchor="b"/>
+          <a:lstStyle>
+            <a:lvl1pPr algn="r">
+              <a:defRPr sz="1200"/>
+            </a:lvl1pPr>
+          </a:lstStyle>
+          <a:p>
+            <a:fld id="{5F7205DF-1AF0-428F-99A9-E78159C9DEBA}" type="slidenum">
+              <a:rPr lang="en-US" smtClean="0"/>
+              <a:t>‹#›</a:t>
+            </a:fld>
+            <a:endParaRPr lang="en-US"/>
+          </a:p>
+        </p:txBody>
+      </p:sp>
+    </p:spTree>
+    <p:extLst>
+      <p:ext uri="{BB962C8B-B14F-4D97-AF65-F5344CB8AC3E}">
+        <p14:creationId xmlns:p14="http://schemas.microsoft.com/office/powerpoint/2010/main" val="1031273052"/>
+      </p:ext>
+    </p:extLst>
+  </p:cSld>
+  <p:clrMap bg1="lt1" tx1="dk1" bg2="lt2" tx2="dk2" accent1="accent1" accent2="accent2" accent3="accent3" accent4="accent4" accent5="accent5" accent6="accent6" hlink="hlink" folHlink="folHlink"/>
+  <p:notesStyle>
+    <a:lvl1pPr marL="0" algn="l" defTabSz="914400" rtl="0" eaLnBrk="1" latinLnBrk="0" hangingPunct="1">
+      <a:defRPr sz="1200" kern="1200">
+        <a:solidFill>
+          <a:schemeClr val="tx1"/>
+        </a:solidFill>
+        <a:latin typeface="+mn-lt"/>
+        <a:ea typeface="+mn-ea"/>
+        <a:cs typeface="+mn-cs"/>
+      </a:defRPr>
+    </a:lvl1pPr>
+    <a:lvl2pPr marL="457200" algn="l" defTabSz="914400" rtl="0" eaLnBrk="1" latinLnBrk="0" hangingPunct="1">
+      <a:defRPr sz="1200" kern="1200">
+        <a:solidFill>
+          <a:schemeClr val="tx1"/>
+        </a:solidFill>
+        <a:latin typeface="+mn-lt"/>
+        <a:ea typeface="+mn-ea"/>
+        <a:cs typeface="+mn-cs"/>
+      </a:defRPr>
+    </a:lvl2pPr>
+    <a:lvl3pPr marL="914400" algn="l" defTabSz="914400" rtl="0" eaLnBrk="1" latinLnBrk="0" hangingPunct="1">
+      <a:defRPr sz="1200" kern="1200">
+        <a:solidFill>
+          <a:schemeClr val="tx1"/>
+        </a:solidFill>
+        <a:latin typeface="+mn-lt"/>
+        <a:ea typeface="+mn-ea"/>
+        <a:cs typeface="+mn-cs"/>
+      </a:defRPr>
+    </a:lvl3pPr>
+    <a:lvl4pPr marL="1371600" algn="l" defTabSz="914400" rtl="0" eaLnBrk="1" latinLnBrk="0" hangingPunct="1">
+      <a:defRPr sz="1200" kern="1200">
+        <a:solidFill>
+          <a:schemeClr val="tx1"/>
+        </a:solidFill>
+        <a:latin typeface="+mn-lt"/>
+        <a:ea typeface="+mn-ea"/>
+        <a:cs typeface="+mn-cs"/>
+      </a:defRPr>
+    </a:lvl4pPr>
+    <a:lvl5pPr marL="1828800" algn="l" defTabSz="914400" rtl="0" eaLnBrk="1" latinLnBrk="0" hangingPunct="1">
+      <a:defRPr sz="1200" kern="1200">
+        <a:solidFill>
+          <a:schemeClr val="tx1"/>
+        </a:solidFill>
+        <a:latin typeface="+mn-lt"/>
+        <a:ea typeface="+mn-ea"/>
+        <a:cs typeface="+mn-cs"/>
+      </a:defRPr>
+    </a:lvl5pPr>
+    <a:lvl6pPr marL="2286000" algn="l" defTabSz="914400" rtl="0" eaLnBrk="1" latinLnBrk="0" hangingPunct="1">
+      <a:defRPr sz="1200" kern="1200">
+        <a:solidFill>
+          <a:schemeClr val="tx1"/>
+        </a:solidFill>
+        <a:latin typeface="+mn-lt"/>
+        <a:ea typeface="+mn-ea"/>
+        <a:cs typeface="+mn-cs"/>
+      </a:defRPr>
+    </a:lvl6pPr>
+    <a:lvl7pPr marL="2743200" algn="l" defTabSz="914400" rtl="0" eaLnBrk="1" latinLnBrk="0" hangingPunct="1">
+      <a:defRPr sz="1200" kern="1200">
+        <a:solidFill>
+          <a:schemeClr val="tx1"/>
+        </a:solidFill>
+        <a:latin typeface="+mn-lt"/>
+        <a:ea typeface="+mn-ea"/>
+        <a:cs typeface="+mn-cs"/>
+      </a:defRPr>
+    </a:lvl7pPr>
+    <a:lvl8pPr marL="3200400" algn="l" defTabSz="914400" rtl="0" eaLnBrk="1" latinLnBrk="0" hangingPunct="1">
+      <a:defRPr sz="1200" kern="1200">
+        <a:solidFill>
+          <a:schemeClr val="tx1"/>
+        </a:solidFill>
+        <a:latin typeface="+mn-lt"/>
+        <a:ea typeface="+mn-ea"/>
+        <a:cs typeface="+mn-cs"/>
+      </a:defRPr>
+    </a:lvl8pPr>
+    <a:lvl9pPr marL="3657600" algn="l" defTabSz="914400" rtl="0" eaLnBrk="1" latinLnBrk="0" hangingPunct="1">
+      <a:defRPr sz="1200" kern="1200">
+        <a:solidFill>
+          <a:schemeClr val="tx1"/>
+        </a:solidFill>
+        <a:latin typeface="+mn-lt"/>
+        <a:ea typeface="+mn-ea"/>
+        <a:cs typeface="+mn-cs"/>
+      </a:defRPr>
+    </a:lvl9pPr>
+  </p:notesStyle>
+</p:notesMaster>
+</file>
+
+<file path=ppt/notesSlides/notesSlide1.xml><?xml version="1.0" encoding="utf-8"?>
+<p:notes xmlns:a="http://schemas.openxmlformats.org/drawingml/2006/main" xmlns:r="http://schemas.openxmlformats.org/officeDocument/2006/relationships" xmlns:p="http://schemas.openxmlformats.org/presentationml/2006/main">
+  <p:cSld>
+    <p:spTree>
+      <p:nvGrpSpPr>
+        <p:cNvPr id="1" name=""/>
+        <p:cNvGrpSpPr/>
+        <p:nvPr/>
+      </p:nvGrpSpPr>
+      <p:grpSpPr>
+        <a:xfrm>
+          <a:off x="0" y="0"/>
+          <a:ext cx="0" cy="0"/>
+          <a:chOff x="0" y="0"/>
+          <a:chExt cx="0" cy="0"/>
+        </a:xfrm>
+      </p:grpSpPr>
+      <p:sp>
+        <p:nvSpPr>
+          <p:cNvPr id="2" name="Slide Image Placeholder 1"/>
+          <p:cNvSpPr>
+            <a:spLocks noGrp="1" noRot="1" noChangeAspect="1"/>
+          </p:cNvSpPr>
+          <p:nvPr>
+            <p:ph type="sldImg"/>
+          </p:nvPr>
+        </p:nvSpPr>
+        <p:spPr/>
+      </p:sp>
+      <p:sp>
+        <p:nvSpPr>
+          <p:cNvPr id="3" name="Notes Placeholder 2"/>
+          <p:cNvSpPr>
+            <a:spLocks noGrp="1"/>
+          </p:cNvSpPr>
+          <p:nvPr>
+            <p:ph type="body" idx="1"/>
+          </p:nvPr>
+        </p:nvSpPr>
+        <p:spPr/>
+        <p:txBody>
+          <a:bodyPr/>
+          <a:lstStyle/>
+          <a:p>
+            <a:r>
+              <a:rPr lang="en-US" dirty="0"/>
+              <a:t>Perfect for small collections without wanting to do allocations on the heap</a:t>
+            </a:r>
+          </a:p>
+          <a:p>
+            <a:endParaRPr lang="en-US" dirty="0"/>
+          </a:p>
+        </p:txBody>
+      </p:sp>
+      <p:sp>
+        <p:nvSpPr>
+          <p:cNvPr id="4" name="Slide Number Placeholder 3"/>
+          <p:cNvSpPr>
+            <a:spLocks noGrp="1"/>
+          </p:cNvSpPr>
+          <p:nvPr>
+            <p:ph type="sldNum" sz="quarter" idx="5"/>
+          </p:nvPr>
+        </p:nvSpPr>
+        <p:spPr/>
+        <p:txBody>
+          <a:bodyPr/>
+          <a:lstStyle/>
+          <a:p>
+            <a:fld id="{5F7205DF-1AF0-428F-99A9-E78159C9DEBA}" type="slidenum">
+              <a:rPr lang="en-US" smtClean="0"/>
+              <a:t>4</a:t>
+            </a:fld>
+            <a:endParaRPr lang="en-US"/>
+          </a:p>
+        </p:txBody>
+      </p:sp>
+    </p:spTree>
+    <p:extLst>
+      <p:ext uri="{BB962C8B-B14F-4D97-AF65-F5344CB8AC3E}">
+        <p14:creationId xmlns:p14="http://schemas.microsoft.com/office/powerpoint/2010/main" val="4139561512"/>
+      </p:ext>
+    </p:extLst>
+  </p:cSld>
+  <p:clrMapOvr>
+    <a:masterClrMapping/>
+  </p:clrMapOvr>
+</p:notes>
+</file>
+
 <file path=ppt/slideLayouts/slideLayout1.xml><?xml version="1.0" encoding="utf-8"?>
 <p:sldLayout xmlns:a="http://schemas.openxmlformats.org/drawingml/2006/main" xmlns:r="http://schemas.openxmlformats.org/officeDocument/2006/relationships" xmlns:p="http://schemas.openxmlformats.org/presentationml/2006/main" showMasterSp="0" type="title" preserve="1">
   <p:cSld name="Title Slide">
@@ -177,7 +623,7 @@
           <a:noFill/>
           <a:extLst>
             <a:ext uri="{909E8E84-426E-40dd-AFC4-6F175D3DCCD1}">
-              <a14:hiddenFill xmlns:a14="http://schemas.microsoft.com/office/drawing/2010/main" xmlns="">
+              <a14:hiddenFill xmlns="" xmlns:a14="http://schemas.microsoft.com/office/drawing/2010/main">
                 <a:solidFill>
                   <a:srgbClr val="FFFFFF"/>
                 </a:solidFill>
@@ -236,7 +682,7 @@
             </a:ln>
             <a:extLst>
               <a:ext uri="{91240B29-F687-4f45-9708-019B960494DF}">
-                <a14:hiddenLine xmlns:a14="http://schemas.microsoft.com/office/drawing/2010/main" xmlns="" w="9525">
+                <a14:hiddenLine xmlns="" xmlns:a14="http://schemas.microsoft.com/office/drawing/2010/main" w="9525">
                   <a:solidFill>
                     <a:srgbClr val="000000"/>
                   </a:solidFill>
@@ -326,7 +772,7 @@
             </a:ln>
             <a:extLst>
               <a:ext uri="{91240B29-F687-4f45-9708-019B960494DF}">
-                <a14:hiddenLine xmlns:a14="http://schemas.microsoft.com/office/drawing/2010/main" xmlns="" w="9525">
+                <a14:hiddenLine xmlns="" xmlns:a14="http://schemas.microsoft.com/office/drawing/2010/main" w="9525">
                   <a:solidFill>
                     <a:srgbClr val="000000"/>
                   </a:solidFill>
@@ -416,7 +862,7 @@
             </a:ln>
             <a:extLst>
               <a:ext uri="{91240B29-F687-4f45-9708-019B960494DF}">
-                <a14:hiddenLine xmlns:a14="http://schemas.microsoft.com/office/drawing/2010/main" xmlns="" w="9525">
+                <a14:hiddenLine xmlns="" xmlns:a14="http://schemas.microsoft.com/office/drawing/2010/main" w="9525">
                   <a:solidFill>
                     <a:srgbClr val="000000"/>
                   </a:solidFill>
@@ -450,7 +896,7 @@
             </a:ln>
             <a:extLst>
               <a:ext uri="{91240B29-F687-4f45-9708-019B960494DF}">
-                <a14:hiddenLine xmlns:a14="http://schemas.microsoft.com/office/drawing/2010/main" xmlns="" w="9525">
+                <a14:hiddenLine xmlns="" xmlns:a14="http://schemas.microsoft.com/office/drawing/2010/main" w="9525">
                   <a:solidFill>
                     <a:srgbClr val="000000"/>
                   </a:solidFill>
@@ -540,7 +986,7 @@
             </a:ln>
             <a:extLst>
               <a:ext uri="{91240B29-F687-4f45-9708-019B960494DF}">
-                <a14:hiddenLine xmlns:a14="http://schemas.microsoft.com/office/drawing/2010/main" xmlns="" w="9525">
+                <a14:hiddenLine xmlns="" xmlns:a14="http://schemas.microsoft.com/office/drawing/2010/main" w="9525">
                   <a:solidFill>
                     <a:srgbClr val="000000"/>
                   </a:solidFill>
@@ -602,7 +1048,7 @@
             </a:ln>
             <a:extLst>
               <a:ext uri="{91240B29-F687-4f45-9708-019B960494DF}">
-                <a14:hiddenLine xmlns:a14="http://schemas.microsoft.com/office/drawing/2010/main" xmlns="" w="9525">
+                <a14:hiddenLine xmlns="" xmlns:a14="http://schemas.microsoft.com/office/drawing/2010/main" w="9525">
                   <a:solidFill>
                     <a:srgbClr val="000000"/>
                   </a:solidFill>
@@ -664,7 +1110,7 @@
             </a:ln>
             <a:extLst>
               <a:ext uri="{91240B29-F687-4f45-9708-019B960494DF}">
-                <a14:hiddenLine xmlns:a14="http://schemas.microsoft.com/office/drawing/2010/main" xmlns="" w="9525">
+                <a14:hiddenLine xmlns="" xmlns:a14="http://schemas.microsoft.com/office/drawing/2010/main" w="9525">
                   <a:solidFill>
                     <a:srgbClr val="000000"/>
                   </a:solidFill>
@@ -754,7 +1200,7 @@
             </a:ln>
             <a:extLst>
               <a:ext uri="{91240B29-F687-4f45-9708-019B960494DF}">
-                <a14:hiddenLine xmlns:a14="http://schemas.microsoft.com/office/drawing/2010/main" xmlns="" w="9525">
+                <a14:hiddenLine xmlns="" xmlns:a14="http://schemas.microsoft.com/office/drawing/2010/main" w="9525">
                   <a:solidFill>
                     <a:srgbClr val="000000"/>
                   </a:solidFill>
@@ -816,7 +1262,7 @@
             </a:ln>
             <a:extLst>
               <a:ext uri="{91240B29-F687-4f45-9708-019B960494DF}">
-                <a14:hiddenLine xmlns:a14="http://schemas.microsoft.com/office/drawing/2010/main" xmlns="" w="9525">
+                <a14:hiddenLine xmlns="" xmlns:a14="http://schemas.microsoft.com/office/drawing/2010/main" w="9525">
                   <a:solidFill>
                     <a:srgbClr val="000000"/>
                   </a:solidFill>
@@ -878,7 +1324,7 @@
             </a:ln>
             <a:extLst>
               <a:ext uri="{91240B29-F687-4f45-9708-019B960494DF}">
-                <a14:hiddenLine xmlns:a14="http://schemas.microsoft.com/office/drawing/2010/main" xmlns="" w="9525">
+                <a14:hiddenLine xmlns="" xmlns:a14="http://schemas.microsoft.com/office/drawing/2010/main" w="9525">
                   <a:solidFill>
                     <a:srgbClr val="000000"/>
                   </a:solidFill>
@@ -968,7 +1414,7 @@
             </a:ln>
             <a:extLst>
               <a:ext uri="{91240B29-F687-4f45-9708-019B960494DF}">
-                <a14:hiddenLine xmlns:a14="http://schemas.microsoft.com/office/drawing/2010/main" xmlns="" w="9525">
+                <a14:hiddenLine xmlns="" xmlns:a14="http://schemas.microsoft.com/office/drawing/2010/main" w="9525">
                   <a:solidFill>
                     <a:srgbClr val="000000"/>
                   </a:solidFill>
@@ -1058,7 +1504,7 @@
             </a:ln>
             <a:extLst>
               <a:ext uri="{91240B29-F687-4f45-9708-019B960494DF}">
-                <a14:hiddenLine xmlns:a14="http://schemas.microsoft.com/office/drawing/2010/main" xmlns="" w="9525">
+                <a14:hiddenLine xmlns="" xmlns:a14="http://schemas.microsoft.com/office/drawing/2010/main" w="9525">
                   <a:solidFill>
                     <a:srgbClr val="000000"/>
                   </a:solidFill>
@@ -1120,7 +1566,7 @@
             </a:ln>
             <a:extLst>
               <a:ext uri="{91240B29-F687-4f45-9708-019B960494DF}">
-                <a14:hiddenLine xmlns:a14="http://schemas.microsoft.com/office/drawing/2010/main" xmlns="" w="9525">
+                <a14:hiddenLine xmlns="" xmlns:a14="http://schemas.microsoft.com/office/drawing/2010/main" w="9525">
                   <a:solidFill>
                     <a:srgbClr val="000000"/>
                   </a:solidFill>
@@ -1230,7 +1676,7 @@
             </a:ln>
             <a:extLst>
               <a:ext uri="{91240B29-F687-4f45-9708-019B960494DF}">
-                <a14:hiddenLine xmlns:a14="http://schemas.microsoft.com/office/drawing/2010/main" xmlns="" w="9525">
+                <a14:hiddenLine xmlns="" xmlns:a14="http://schemas.microsoft.com/office/drawing/2010/main" w="9525">
                   <a:solidFill>
                     <a:srgbClr val="000000"/>
                   </a:solidFill>
@@ -1292,7 +1738,7 @@
             </a:ln>
             <a:extLst>
               <a:ext uri="{91240B29-F687-4f45-9708-019B960494DF}">
-                <a14:hiddenLine xmlns:a14="http://schemas.microsoft.com/office/drawing/2010/main" xmlns="" w="9525">
+                <a14:hiddenLine xmlns="" xmlns:a14="http://schemas.microsoft.com/office/drawing/2010/main" w="9525">
                   <a:solidFill>
                     <a:srgbClr val="000000"/>
                   </a:solidFill>
@@ -1382,7 +1828,7 @@
             </a:ln>
             <a:extLst>
               <a:ext uri="{91240B29-F687-4f45-9708-019B960494DF}">
-                <a14:hiddenLine xmlns:a14="http://schemas.microsoft.com/office/drawing/2010/main" xmlns="" w="9525">
+                <a14:hiddenLine xmlns="" xmlns:a14="http://schemas.microsoft.com/office/drawing/2010/main" w="9525">
                   <a:solidFill>
                     <a:srgbClr val="000000"/>
                   </a:solidFill>
@@ -1472,7 +1918,7 @@
             </a:ln>
             <a:extLst>
               <a:ext uri="{91240B29-F687-4f45-9708-019B960494DF}">
-                <a14:hiddenLine xmlns:a14="http://schemas.microsoft.com/office/drawing/2010/main" xmlns="" w="9525">
+                <a14:hiddenLine xmlns="" xmlns:a14="http://schemas.microsoft.com/office/drawing/2010/main" w="9525">
                   <a:solidFill>
                     <a:srgbClr val="000000"/>
                   </a:solidFill>
@@ -1534,7 +1980,7 @@
             </a:ln>
             <a:extLst>
               <a:ext uri="{91240B29-F687-4f45-9708-019B960494DF}">
-                <a14:hiddenLine xmlns:a14="http://schemas.microsoft.com/office/drawing/2010/main" xmlns="" w="9525">
+                <a14:hiddenLine xmlns="" xmlns:a14="http://schemas.microsoft.com/office/drawing/2010/main" w="9525">
                   <a:solidFill>
                     <a:srgbClr val="000000"/>
                   </a:solidFill>
@@ -1624,7 +2070,7 @@
             </a:ln>
             <a:extLst>
               <a:ext uri="{91240B29-F687-4f45-9708-019B960494DF}">
-                <a14:hiddenLine xmlns:a14="http://schemas.microsoft.com/office/drawing/2010/main" xmlns="" w="9525">
+                <a14:hiddenLine xmlns="" xmlns:a14="http://schemas.microsoft.com/office/drawing/2010/main" w="9525">
                   <a:solidFill>
                     <a:srgbClr val="000000"/>
                   </a:solidFill>
@@ -1714,7 +2160,7 @@
             </a:ln>
             <a:extLst>
               <a:ext uri="{91240B29-F687-4f45-9708-019B960494DF}">
-                <a14:hiddenLine xmlns:a14="http://schemas.microsoft.com/office/drawing/2010/main" xmlns="" w="9525">
+                <a14:hiddenLine xmlns="" xmlns:a14="http://schemas.microsoft.com/office/drawing/2010/main" w="9525">
                   <a:solidFill>
                     <a:srgbClr val="000000"/>
                   </a:solidFill>
@@ -1770,7 +2216,7 @@
             </a:ln>
             <a:extLst>
               <a:ext uri="{91240B29-F687-4f45-9708-019B960494DF}">
-                <a14:hiddenLine xmlns:a14="http://schemas.microsoft.com/office/drawing/2010/main" xmlns="" w="9525">
+                <a14:hiddenLine xmlns="" xmlns:a14="http://schemas.microsoft.com/office/drawing/2010/main" w="9525">
                   <a:solidFill>
                     <a:srgbClr val="000000"/>
                   </a:solidFill>
@@ -1860,7 +2306,7 @@
             </a:ln>
             <a:extLst>
               <a:ext uri="{91240B29-F687-4f45-9708-019B960494DF}">
-                <a14:hiddenLine xmlns:a14="http://schemas.microsoft.com/office/drawing/2010/main" xmlns="" w="9525">
+                <a14:hiddenLine xmlns="" xmlns:a14="http://schemas.microsoft.com/office/drawing/2010/main" w="9525">
                   <a:solidFill>
                     <a:srgbClr val="000000"/>
                   </a:solidFill>
@@ -1916,7 +2362,7 @@
             </a:ln>
             <a:extLst>
               <a:ext uri="{91240B29-F687-4f45-9708-019B960494DF}">
-                <a14:hiddenLine xmlns:a14="http://schemas.microsoft.com/office/drawing/2010/main" xmlns="" w="9525">
+                <a14:hiddenLine xmlns="" xmlns:a14="http://schemas.microsoft.com/office/drawing/2010/main" w="9525">
                   <a:solidFill>
                     <a:srgbClr val="000000"/>
                   </a:solidFill>
@@ -2006,7 +2452,7 @@
             </a:ln>
             <a:extLst>
               <a:ext uri="{91240B29-F687-4f45-9708-019B960494DF}">
-                <a14:hiddenLine xmlns:a14="http://schemas.microsoft.com/office/drawing/2010/main" xmlns="" w="9525">
+                <a14:hiddenLine xmlns="" xmlns:a14="http://schemas.microsoft.com/office/drawing/2010/main" w="9525">
                   <a:solidFill>
                     <a:srgbClr val="000000"/>
                   </a:solidFill>
@@ -2074,7 +2520,7 @@
             </a:ln>
             <a:extLst>
               <a:ext uri="{91240B29-F687-4f45-9708-019B960494DF}">
-                <a14:hiddenLine xmlns:a14="http://schemas.microsoft.com/office/drawing/2010/main" xmlns="" w="9525">
+                <a14:hiddenLine xmlns="" xmlns:a14="http://schemas.microsoft.com/office/drawing/2010/main" w="9525">
                   <a:solidFill>
                     <a:srgbClr val="000000"/>
                   </a:solidFill>
@@ -2164,7 +2610,7 @@
             </a:ln>
             <a:extLst>
               <a:ext uri="{91240B29-F687-4f45-9708-019B960494DF}">
-                <a14:hiddenLine xmlns:a14="http://schemas.microsoft.com/office/drawing/2010/main" xmlns="" w="9525">
+                <a14:hiddenLine xmlns="" xmlns:a14="http://schemas.microsoft.com/office/drawing/2010/main" w="9525">
                   <a:solidFill>
                     <a:srgbClr val="000000"/>
                   </a:solidFill>
@@ -2232,7 +2678,7 @@
             </a:ln>
             <a:extLst>
               <a:ext uri="{91240B29-F687-4f45-9708-019B960494DF}">
-                <a14:hiddenLine xmlns:a14="http://schemas.microsoft.com/office/drawing/2010/main" xmlns="" w="9525">
+                <a14:hiddenLine xmlns="" xmlns:a14="http://schemas.microsoft.com/office/drawing/2010/main" w="9525">
                   <a:solidFill>
                     <a:srgbClr val="000000"/>
                   </a:solidFill>
@@ -2322,7 +2768,7 @@
             </a:ln>
             <a:extLst>
               <a:ext uri="{91240B29-F687-4f45-9708-019B960494DF}">
-                <a14:hiddenLine xmlns:a14="http://schemas.microsoft.com/office/drawing/2010/main" xmlns="" w="9525">
+                <a14:hiddenLine xmlns="" xmlns:a14="http://schemas.microsoft.com/office/drawing/2010/main" w="9525">
                   <a:solidFill>
                     <a:srgbClr val="000000"/>
                   </a:solidFill>
@@ -2356,7 +2802,7 @@
             </a:ln>
             <a:extLst>
               <a:ext uri="{91240B29-F687-4f45-9708-019B960494DF}">
-                <a14:hiddenLine xmlns:a14="http://schemas.microsoft.com/office/drawing/2010/main" xmlns="" w="9525">
+                <a14:hiddenLine xmlns="" xmlns:a14="http://schemas.microsoft.com/office/drawing/2010/main" w="9525">
                   <a:solidFill>
                     <a:srgbClr val="000000"/>
                   </a:solidFill>
@@ -2446,7 +2892,7 @@
             </a:ln>
             <a:extLst>
               <a:ext uri="{91240B29-F687-4f45-9708-019B960494DF}">
-                <a14:hiddenLine xmlns:a14="http://schemas.microsoft.com/office/drawing/2010/main" xmlns="" w="9525">
+                <a14:hiddenLine xmlns="" xmlns:a14="http://schemas.microsoft.com/office/drawing/2010/main" w="9525">
                   <a:solidFill>
                     <a:srgbClr val="000000"/>
                   </a:solidFill>
@@ -2508,7 +2954,7 @@
             </a:ln>
             <a:extLst>
               <a:ext uri="{91240B29-F687-4f45-9708-019B960494DF}">
-                <a14:hiddenLine xmlns:a14="http://schemas.microsoft.com/office/drawing/2010/main" xmlns="" w="9525">
+                <a14:hiddenLine xmlns="" xmlns:a14="http://schemas.microsoft.com/office/drawing/2010/main" w="9525">
                   <a:solidFill>
                     <a:srgbClr val="000000"/>
                   </a:solidFill>
@@ -2570,7 +3016,7 @@
             </a:ln>
             <a:extLst>
               <a:ext uri="{91240B29-F687-4f45-9708-019B960494DF}">
-                <a14:hiddenLine xmlns:a14="http://schemas.microsoft.com/office/drawing/2010/main" xmlns="" w="9525">
+                <a14:hiddenLine xmlns="" xmlns:a14="http://schemas.microsoft.com/office/drawing/2010/main" w="9525">
                   <a:solidFill>
                     <a:srgbClr val="000000"/>
                   </a:solidFill>
@@ -2660,7 +3106,7 @@
             </a:ln>
             <a:extLst>
               <a:ext uri="{91240B29-F687-4f45-9708-019B960494DF}">
-                <a14:hiddenLine xmlns:a14="http://schemas.microsoft.com/office/drawing/2010/main" xmlns="" w="9525">
+                <a14:hiddenLine xmlns="" xmlns:a14="http://schemas.microsoft.com/office/drawing/2010/main" w="9525">
                   <a:solidFill>
                     <a:srgbClr val="000000"/>
                   </a:solidFill>
@@ -2728,7 +3174,7 @@
             </a:ln>
             <a:extLst>
               <a:ext uri="{91240B29-F687-4f45-9708-019B960494DF}">
-                <a14:hiddenLine xmlns:a14="http://schemas.microsoft.com/office/drawing/2010/main" xmlns="" w="9525">
+                <a14:hiddenLine xmlns="" xmlns:a14="http://schemas.microsoft.com/office/drawing/2010/main" w="9525">
                   <a:solidFill>
                     <a:srgbClr val="000000"/>
                   </a:solidFill>
@@ -2790,7 +3236,7 @@
             </a:ln>
             <a:extLst>
               <a:ext uri="{91240B29-F687-4f45-9708-019B960494DF}">
-                <a14:hiddenLine xmlns:a14="http://schemas.microsoft.com/office/drawing/2010/main" xmlns="" w="9525">
+                <a14:hiddenLine xmlns="" xmlns:a14="http://schemas.microsoft.com/office/drawing/2010/main" w="9525">
                   <a:solidFill>
                     <a:srgbClr val="000000"/>
                   </a:solidFill>
@@ -2880,7 +3326,7 @@
             </a:ln>
             <a:extLst>
               <a:ext uri="{91240B29-F687-4f45-9708-019B960494DF}">
-                <a14:hiddenLine xmlns:a14="http://schemas.microsoft.com/office/drawing/2010/main" xmlns="" w="9525">
+                <a14:hiddenLine xmlns="" xmlns:a14="http://schemas.microsoft.com/office/drawing/2010/main" w="9525">
                   <a:solidFill>
                     <a:srgbClr val="000000"/>
                   </a:solidFill>
@@ -2942,7 +3388,7 @@
             </a:ln>
             <a:extLst>
               <a:ext uri="{91240B29-F687-4f45-9708-019B960494DF}">
-                <a14:hiddenLine xmlns:a14="http://schemas.microsoft.com/office/drawing/2010/main" xmlns="" w="9525">
+                <a14:hiddenLine xmlns="" xmlns:a14="http://schemas.microsoft.com/office/drawing/2010/main" w="9525">
                   <a:solidFill>
                     <a:srgbClr val="000000"/>
                   </a:solidFill>
@@ -3032,7 +3478,7 @@
             </a:ln>
             <a:extLst>
               <a:ext uri="{91240B29-F687-4f45-9708-019B960494DF}">
-                <a14:hiddenLine xmlns:a14="http://schemas.microsoft.com/office/drawing/2010/main" xmlns="" w="9525">
+                <a14:hiddenLine xmlns="" xmlns:a14="http://schemas.microsoft.com/office/drawing/2010/main" w="9525">
                   <a:solidFill>
                     <a:srgbClr val="000000"/>
                   </a:solidFill>
@@ -3094,7 +3540,7 @@
             </a:ln>
             <a:extLst>
               <a:ext uri="{91240B29-F687-4f45-9708-019B960494DF}">
-                <a14:hiddenLine xmlns:a14="http://schemas.microsoft.com/office/drawing/2010/main" xmlns="" w="9525">
+                <a14:hiddenLine xmlns="" xmlns:a14="http://schemas.microsoft.com/office/drawing/2010/main" w="9525">
                   <a:solidFill>
                     <a:srgbClr val="000000"/>
                   </a:solidFill>
@@ -3184,7 +3630,7 @@
             </a:ln>
             <a:extLst>
               <a:ext uri="{91240B29-F687-4f45-9708-019B960494DF}">
-                <a14:hiddenLine xmlns:a14="http://schemas.microsoft.com/office/drawing/2010/main" xmlns="" w="9525">
+                <a14:hiddenLine xmlns="" xmlns:a14="http://schemas.microsoft.com/office/drawing/2010/main" w="9525">
                   <a:solidFill>
                     <a:srgbClr val="000000"/>
                   </a:solidFill>
@@ -3218,7 +3664,7 @@
             </a:ln>
             <a:extLst>
               <a:ext uri="{91240B29-F687-4f45-9708-019B960494DF}">
-                <a14:hiddenLine xmlns:a14="http://schemas.microsoft.com/office/drawing/2010/main" xmlns="" w="9525">
+                <a14:hiddenLine xmlns="" xmlns:a14="http://schemas.microsoft.com/office/drawing/2010/main" w="9525">
                   <a:solidFill>
                     <a:srgbClr val="000000"/>
                   </a:solidFill>
@@ -3283,7 +3729,7 @@
             </a:ln>
             <a:extLst>
               <a:ext uri="{91240B29-F687-4f45-9708-019B960494DF}">
-                <a14:hiddenLine xmlns:a14="http://schemas.microsoft.com/office/drawing/2010/main" xmlns="" w="9525">
+                <a14:hiddenLine xmlns="" xmlns:a14="http://schemas.microsoft.com/office/drawing/2010/main" w="9525">
                   <a:solidFill>
                     <a:srgbClr val="000000"/>
                   </a:solidFill>
@@ -3373,7 +3819,7 @@
             </a:ln>
             <a:extLst>
               <a:ext uri="{91240B29-F687-4f45-9708-019B960494DF}">
-                <a14:hiddenLine xmlns:a14="http://schemas.microsoft.com/office/drawing/2010/main" xmlns="" w="9525">
+                <a14:hiddenLine xmlns="" xmlns:a14="http://schemas.microsoft.com/office/drawing/2010/main" w="9525">
                   <a:solidFill>
                     <a:srgbClr val="000000"/>
                   </a:solidFill>
@@ -3435,7 +3881,7 @@
             </a:ln>
             <a:extLst>
               <a:ext uri="{91240B29-F687-4f45-9708-019B960494DF}">
-                <a14:hiddenLine xmlns:a14="http://schemas.microsoft.com/office/drawing/2010/main" xmlns="" w="9525">
+                <a14:hiddenLine xmlns="" xmlns:a14="http://schemas.microsoft.com/office/drawing/2010/main" w="9525">
                   <a:solidFill>
                     <a:srgbClr val="000000"/>
                   </a:solidFill>
@@ -3525,7 +3971,7 @@
             </a:ln>
             <a:extLst>
               <a:ext uri="{91240B29-F687-4f45-9708-019B960494DF}">
-                <a14:hiddenLine xmlns:a14="http://schemas.microsoft.com/office/drawing/2010/main" xmlns="" w="9525">
+                <a14:hiddenLine xmlns="" xmlns:a14="http://schemas.microsoft.com/office/drawing/2010/main" w="9525">
                   <a:solidFill>
                     <a:srgbClr val="000000"/>
                   </a:solidFill>
@@ -3615,7 +4061,7 @@
             </a:ln>
             <a:extLst>
               <a:ext uri="{91240B29-F687-4f45-9708-019B960494DF}">
-                <a14:hiddenLine xmlns:a14="http://schemas.microsoft.com/office/drawing/2010/main" xmlns="" w="9525">
+                <a14:hiddenLine xmlns="" xmlns:a14="http://schemas.microsoft.com/office/drawing/2010/main" w="9525">
                   <a:solidFill>
                     <a:srgbClr val="000000"/>
                   </a:solidFill>
@@ -3680,7 +4126,7 @@
             </a:ln>
             <a:extLst>
               <a:ext uri="{91240B29-F687-4f45-9708-019B960494DF}">
-                <a14:hiddenLine xmlns:a14="http://schemas.microsoft.com/office/drawing/2010/main" xmlns="" w="9525">
+                <a14:hiddenLine xmlns="" xmlns:a14="http://schemas.microsoft.com/office/drawing/2010/main" w="9525">
                   <a:solidFill>
                     <a:srgbClr val="000000"/>
                   </a:solidFill>
@@ -3742,7 +4188,7 @@
             </a:ln>
             <a:extLst>
               <a:ext uri="{91240B29-F687-4f45-9708-019B960494DF}">
-                <a14:hiddenLine xmlns:a14="http://schemas.microsoft.com/office/drawing/2010/main" xmlns="" w="9525">
+                <a14:hiddenLine xmlns="" xmlns:a14="http://schemas.microsoft.com/office/drawing/2010/main" w="9525">
                   <a:solidFill>
                     <a:srgbClr val="000000"/>
                   </a:solidFill>
@@ -3832,7 +4278,7 @@
             </a:ln>
             <a:extLst>
               <a:ext uri="{91240B29-F687-4f45-9708-019B960494DF}">
-                <a14:hiddenLine xmlns:a14="http://schemas.microsoft.com/office/drawing/2010/main" xmlns="" w="9525">
+                <a14:hiddenLine xmlns="" xmlns:a14="http://schemas.microsoft.com/office/drawing/2010/main" w="9525">
                   <a:solidFill>
                     <a:srgbClr val="000000"/>
                   </a:solidFill>
@@ -3922,7 +4368,7 @@
             </a:ln>
             <a:extLst>
               <a:ext uri="{91240B29-F687-4f45-9708-019B960494DF}">
-                <a14:hiddenLine xmlns:a14="http://schemas.microsoft.com/office/drawing/2010/main" xmlns="" w="9525">
+                <a14:hiddenLine xmlns="" xmlns:a14="http://schemas.microsoft.com/office/drawing/2010/main" w="9525">
                   <a:solidFill>
                     <a:srgbClr val="000000"/>
                   </a:solidFill>
@@ -3984,7 +4430,7 @@
             </a:ln>
             <a:extLst>
               <a:ext uri="{91240B29-F687-4f45-9708-019B960494DF}">
-                <a14:hiddenLine xmlns:a14="http://schemas.microsoft.com/office/drawing/2010/main" xmlns="" w="9525">
+                <a14:hiddenLine xmlns="" xmlns:a14="http://schemas.microsoft.com/office/drawing/2010/main" w="9525">
                   <a:solidFill>
                     <a:srgbClr val="000000"/>
                   </a:solidFill>
@@ -4104,7 +4550,7 @@
             </a:ln>
             <a:extLst>
               <a:ext uri="{91240B29-F687-4f45-9708-019B960494DF}">
-                <a14:hiddenLine xmlns:a14="http://schemas.microsoft.com/office/drawing/2010/main" xmlns="" w="9525">
+                <a14:hiddenLine xmlns="" xmlns:a14="http://schemas.microsoft.com/office/drawing/2010/main" w="9525">
                   <a:solidFill>
                     <a:srgbClr val="000000"/>
                   </a:solidFill>
@@ -4172,7 +4618,7 @@
             </a:ln>
             <a:extLst>
               <a:ext uri="{91240B29-F687-4f45-9708-019B960494DF}">
-                <a14:hiddenLine xmlns:a14="http://schemas.microsoft.com/office/drawing/2010/main" xmlns="" w="9525">
+                <a14:hiddenLine xmlns="" xmlns:a14="http://schemas.microsoft.com/office/drawing/2010/main" w="9525">
                   <a:solidFill>
                     <a:srgbClr val="000000"/>
                   </a:solidFill>
@@ -4262,7 +4708,7 @@
             </a:ln>
             <a:extLst>
               <a:ext uri="{91240B29-F687-4f45-9708-019B960494DF}">
-                <a14:hiddenLine xmlns:a14="http://schemas.microsoft.com/office/drawing/2010/main" xmlns="" w="9525">
+                <a14:hiddenLine xmlns="" xmlns:a14="http://schemas.microsoft.com/office/drawing/2010/main" w="9525">
                   <a:solidFill>
                     <a:srgbClr val="000000"/>
                   </a:solidFill>
@@ -4402,7 +4848,7 @@
           <a:p>
             <a:fld id="{48A87A34-81AB-432B-8DAE-1953F412C126}" type="datetimeFigureOut">
               <a:rPr lang="en-US" smtClean="0"/>
-              <a:t>10/10/2018</a:t>
+              <a:t>10/11/2018</a:t>
             </a:fld>
             <a:endParaRPr lang="en-US" dirty="0"/>
           </a:p>
@@ -4669,7 +5115,7 @@
           <a:p>
             <a:fld id="{48A87A34-81AB-432B-8DAE-1953F412C126}" type="datetimeFigureOut">
               <a:rPr lang="en-US" smtClean="0"/>
-              <a:t>10/10/2018</a:t>
+              <a:t>10/11/2018</a:t>
             </a:fld>
             <a:endParaRPr lang="en-US" dirty="0"/>
           </a:p>
@@ -4865,7 +5311,7 @@
           <a:p>
             <a:fld id="{48A87A34-81AB-432B-8DAE-1953F412C126}" type="datetimeFigureOut">
               <a:rPr lang="en-US" smtClean="0"/>
-              <a:t>10/10/2018</a:t>
+              <a:t>10/11/2018</a:t>
             </a:fld>
             <a:endParaRPr lang="en-US" dirty="0"/>
           </a:p>
@@ -5128,7 +5574,7 @@
           <a:p>
             <a:fld id="{48A87A34-81AB-432B-8DAE-1953F412C126}" type="datetimeFigureOut">
               <a:rPr lang="en-US" smtClean="0"/>
-              <a:t>10/10/2018</a:t>
+              <a:t>10/11/2018</a:t>
             </a:fld>
             <a:endParaRPr lang="en-US" dirty="0"/>
           </a:p>
@@ -5562,7 +6008,7 @@
           <a:p>
             <a:fld id="{48A87A34-81AB-432B-8DAE-1953F412C126}" type="datetimeFigureOut">
               <a:rPr lang="en-US" smtClean="0"/>
-              <a:t>10/10/2018</a:t>
+              <a:t>10/11/2018</a:t>
             </a:fld>
             <a:endParaRPr lang="en-US" dirty="0"/>
           </a:p>
@@ -6108,7 +6554,7 @@
           <a:p>
             <a:fld id="{48A87A34-81AB-432B-8DAE-1953F412C126}" type="datetimeFigureOut">
               <a:rPr lang="en-US" smtClean="0"/>
-              <a:t>10/10/2018</a:t>
+              <a:t>10/11/2018</a:t>
             </a:fld>
             <a:endParaRPr lang="en-US" dirty="0"/>
           </a:p>
@@ -6828,7 +7274,7 @@
           <a:p>
             <a:fld id="{48A87A34-81AB-432B-8DAE-1953F412C126}" type="datetimeFigureOut">
               <a:rPr lang="en-US" smtClean="0"/>
-              <a:t>10/10/2018</a:t>
+              <a:t>10/11/2018</a:t>
             </a:fld>
             <a:endParaRPr lang="en-US" dirty="0"/>
           </a:p>
@@ -6998,7 +7444,7 @@
           <a:p>
             <a:fld id="{48A87A34-81AB-432B-8DAE-1953F412C126}" type="datetimeFigureOut">
               <a:rPr lang="en-US" smtClean="0"/>
-              <a:t>10/10/2018</a:t>
+              <a:t>10/11/2018</a:t>
             </a:fld>
             <a:endParaRPr lang="en-US" dirty="0"/>
           </a:p>
@@ -7178,7 +7624,7 @@
           <a:p>
             <a:fld id="{48A87A34-81AB-432B-8DAE-1953F412C126}" type="datetimeFigureOut">
               <a:rPr lang="en-US" smtClean="0"/>
-              <a:t>10/10/2018</a:t>
+              <a:t>10/11/2018</a:t>
             </a:fld>
             <a:endParaRPr lang="en-US" dirty="0"/>
           </a:p>
@@ -7348,7 +7794,7 @@
           <a:p>
             <a:fld id="{48A87A34-81AB-432B-8DAE-1953F412C126}" type="datetimeFigureOut">
               <a:rPr lang="en-US" smtClean="0"/>
-              <a:t>10/10/2018</a:t>
+              <a:t>10/11/2018</a:t>
             </a:fld>
             <a:endParaRPr lang="en-US" dirty="0"/>
           </a:p>
@@ -7598,7 +8044,7 @@
           <a:p>
             <a:fld id="{48A87A34-81AB-432B-8DAE-1953F412C126}" type="datetimeFigureOut">
               <a:rPr lang="en-US" smtClean="0"/>
-              <a:t>10/10/2018</a:t>
+              <a:t>10/11/2018</a:t>
             </a:fld>
             <a:endParaRPr lang="en-US" dirty="0"/>
           </a:p>
@@ -7830,7 +8276,7 @@
           <a:p>
             <a:fld id="{48A87A34-81AB-432B-8DAE-1953F412C126}" type="datetimeFigureOut">
               <a:rPr lang="en-US" smtClean="0"/>
-              <a:t>10/10/2018</a:t>
+              <a:t>10/11/2018</a:t>
             </a:fld>
             <a:endParaRPr lang="en-US" dirty="0"/>
           </a:p>
@@ -8211,7 +8657,7 @@
           <a:p>
             <a:fld id="{48A87A34-81AB-432B-8DAE-1953F412C126}" type="datetimeFigureOut">
               <a:rPr lang="en-US" smtClean="0"/>
-              <a:t>10/10/2018</a:t>
+              <a:t>10/11/2018</a:t>
             </a:fld>
             <a:endParaRPr lang="en-US" dirty="0"/>
           </a:p>
@@ -8329,7 +8775,7 @@
           <a:p>
             <a:fld id="{48A87A34-81AB-432B-8DAE-1953F412C126}" type="datetimeFigureOut">
               <a:rPr lang="en-US" smtClean="0"/>
-              <a:t>10/10/2018</a:t>
+              <a:t>10/11/2018</a:t>
             </a:fld>
             <a:endParaRPr lang="en-US" dirty="0"/>
           </a:p>
@@ -8424,7 +8870,7 @@
           <a:p>
             <a:fld id="{48A87A34-81AB-432B-8DAE-1953F412C126}" type="datetimeFigureOut">
               <a:rPr lang="en-US" smtClean="0"/>
-              <a:t>10/10/2018</a:t>
+              <a:t>10/11/2018</a:t>
             </a:fld>
             <a:endParaRPr lang="en-US" dirty="0"/>
           </a:p>
@@ -8673,7 +9119,7 @@
           <a:p>
             <a:fld id="{48A87A34-81AB-432B-8DAE-1953F412C126}" type="datetimeFigureOut">
               <a:rPr lang="en-US" smtClean="0"/>
-              <a:t>10/10/2018</a:t>
+              <a:t>10/11/2018</a:t>
             </a:fld>
             <a:endParaRPr lang="en-US" dirty="0"/>
           </a:p>
@@ -8953,7 +9399,7 @@
           <a:p>
             <a:fld id="{48A87A34-81AB-432B-8DAE-1953F412C126}" type="datetimeFigureOut">
               <a:rPr lang="en-US" smtClean="0"/>
-              <a:t>10/10/2018</a:t>
+              <a:t>10/11/2018</a:t>
             </a:fld>
             <a:endParaRPr lang="en-US" dirty="0"/>
           </a:p>
@@ -9076,7 +9522,7 @@
           <a:noFill/>
           <a:extLst>
             <a:ext uri="{909E8E84-426E-40dd-AFC4-6F175D3DCCD1}">
-              <a14:hiddenFill xmlns:a14="http://schemas.microsoft.com/office/drawing/2010/main" xmlns="">
+              <a14:hiddenFill xmlns="" xmlns:a14="http://schemas.microsoft.com/office/drawing/2010/main">
                 <a:solidFill>
                   <a:srgbClr val="FFFFFF"/>
                 </a:solidFill>
@@ -9150,7 +9596,7 @@
               </a:ln>
               <a:extLst>
                 <a:ext uri="{91240B29-F687-4f45-9708-019B960494DF}">
-                  <a14:hiddenLine xmlns:a14="http://schemas.microsoft.com/office/drawing/2010/main" xmlns="" w="9525">
+                  <a14:hiddenLine xmlns="" xmlns:a14="http://schemas.microsoft.com/office/drawing/2010/main" w="9525">
                     <a:solidFill>
                       <a:srgbClr val="000000"/>
                     </a:solidFill>
@@ -9240,7 +9686,7 @@
               </a:ln>
               <a:extLst>
                 <a:ext uri="{91240B29-F687-4f45-9708-019B960494DF}">
-                  <a14:hiddenLine xmlns:a14="http://schemas.microsoft.com/office/drawing/2010/main" xmlns="" w="9525">
+                  <a14:hiddenLine xmlns="" xmlns:a14="http://schemas.microsoft.com/office/drawing/2010/main" w="9525">
                     <a:solidFill>
                       <a:srgbClr val="000000"/>
                     </a:solidFill>
@@ -9330,7 +9776,7 @@
               </a:ln>
               <a:extLst>
                 <a:ext uri="{91240B29-F687-4f45-9708-019B960494DF}">
-                  <a14:hiddenLine xmlns:a14="http://schemas.microsoft.com/office/drawing/2010/main" xmlns="" w="9525">
+                  <a14:hiddenLine xmlns="" xmlns:a14="http://schemas.microsoft.com/office/drawing/2010/main" w="9525">
                     <a:solidFill>
                       <a:srgbClr val="000000"/>
                     </a:solidFill>
@@ -9392,7 +9838,7 @@
               </a:ln>
               <a:extLst>
                 <a:ext uri="{91240B29-F687-4f45-9708-019B960494DF}">
-                  <a14:hiddenLine xmlns:a14="http://schemas.microsoft.com/office/drawing/2010/main" xmlns="" w="9525">
+                  <a14:hiddenLine xmlns="" xmlns:a14="http://schemas.microsoft.com/office/drawing/2010/main" w="9525">
                     <a:solidFill>
                       <a:srgbClr val="000000"/>
                     </a:solidFill>
@@ -9482,7 +9928,7 @@
               </a:ln>
               <a:extLst>
                 <a:ext uri="{91240B29-F687-4f45-9708-019B960494DF}">
-                  <a14:hiddenLine xmlns:a14="http://schemas.microsoft.com/office/drawing/2010/main" xmlns="" w="9525">
+                  <a14:hiddenLine xmlns="" xmlns:a14="http://schemas.microsoft.com/office/drawing/2010/main" w="9525">
                     <a:solidFill>
                       <a:srgbClr val="000000"/>
                     </a:solidFill>
@@ -9544,7 +9990,7 @@
               </a:ln>
               <a:extLst>
                 <a:ext uri="{91240B29-F687-4f45-9708-019B960494DF}">
-                  <a14:hiddenLine xmlns:a14="http://schemas.microsoft.com/office/drawing/2010/main" xmlns="" w="9525">
+                  <a14:hiddenLine xmlns="" xmlns:a14="http://schemas.microsoft.com/office/drawing/2010/main" w="9525">
                     <a:solidFill>
                       <a:srgbClr val="000000"/>
                     </a:solidFill>
@@ -9606,7 +10052,7 @@
               </a:ln>
               <a:extLst>
                 <a:ext uri="{91240B29-F687-4f45-9708-019B960494DF}">
-                  <a14:hiddenLine xmlns:a14="http://schemas.microsoft.com/office/drawing/2010/main" xmlns="" w="9525">
+                  <a14:hiddenLine xmlns="" xmlns:a14="http://schemas.microsoft.com/office/drawing/2010/main" w="9525">
                     <a:solidFill>
                       <a:srgbClr val="000000"/>
                     </a:solidFill>
@@ -9696,7 +10142,7 @@
               </a:ln>
               <a:extLst>
                 <a:ext uri="{91240B29-F687-4f45-9708-019B960494DF}">
-                  <a14:hiddenLine xmlns:a14="http://schemas.microsoft.com/office/drawing/2010/main" xmlns="" w="9525">
+                  <a14:hiddenLine xmlns="" xmlns:a14="http://schemas.microsoft.com/office/drawing/2010/main" w="9525">
                     <a:solidFill>
                       <a:srgbClr val="000000"/>
                     </a:solidFill>
@@ -9786,7 +10232,7 @@
               </a:ln>
               <a:extLst>
                 <a:ext uri="{91240B29-F687-4f45-9708-019B960494DF}">
-                  <a14:hiddenLine xmlns:a14="http://schemas.microsoft.com/office/drawing/2010/main" xmlns="" w="9525">
+                  <a14:hiddenLine xmlns="" xmlns:a14="http://schemas.microsoft.com/office/drawing/2010/main" w="9525">
                     <a:solidFill>
                       <a:srgbClr val="000000"/>
                     </a:solidFill>
@@ -9848,7 +10294,7 @@
               </a:ln>
               <a:extLst>
                 <a:ext uri="{91240B29-F687-4f45-9708-019B960494DF}">
-                  <a14:hiddenLine xmlns:a14="http://schemas.microsoft.com/office/drawing/2010/main" xmlns="" w="9525">
+                  <a14:hiddenLine xmlns="" xmlns:a14="http://schemas.microsoft.com/office/drawing/2010/main" w="9525">
                     <a:solidFill>
                       <a:srgbClr val="000000"/>
                     </a:solidFill>
@@ -9958,7 +10404,7 @@
               </a:ln>
               <a:extLst>
                 <a:ext uri="{91240B29-F687-4f45-9708-019B960494DF}">
-                  <a14:hiddenLine xmlns:a14="http://schemas.microsoft.com/office/drawing/2010/main" xmlns="" w="9525">
+                  <a14:hiddenLine xmlns="" xmlns:a14="http://schemas.microsoft.com/office/drawing/2010/main" w="9525">
                     <a:solidFill>
                       <a:srgbClr val="000000"/>
                     </a:solidFill>
@@ -10042,7 +10488,7 @@
               </a:ln>
               <a:extLst>
                 <a:ext uri="{91240B29-F687-4f45-9708-019B960494DF}">
-                  <a14:hiddenLine xmlns:a14="http://schemas.microsoft.com/office/drawing/2010/main" xmlns="" w="9525">
+                  <a14:hiddenLine xmlns="" xmlns:a14="http://schemas.microsoft.com/office/drawing/2010/main" w="9525">
                     <a:solidFill>
                       <a:srgbClr val="000000"/>
                     </a:solidFill>
@@ -10104,7 +10550,7 @@
               </a:ln>
               <a:extLst>
                 <a:ext uri="{91240B29-F687-4f45-9708-019B960494DF}">
-                  <a14:hiddenLine xmlns:a14="http://schemas.microsoft.com/office/drawing/2010/main" xmlns="" w="9525">
+                  <a14:hiddenLine xmlns="" xmlns:a14="http://schemas.microsoft.com/office/drawing/2010/main" w="9525">
                     <a:solidFill>
                       <a:srgbClr val="000000"/>
                     </a:solidFill>
@@ -10166,7 +10612,7 @@
               </a:ln>
               <a:extLst>
                 <a:ext uri="{91240B29-F687-4f45-9708-019B960494DF}">
-                  <a14:hiddenLine xmlns:a14="http://schemas.microsoft.com/office/drawing/2010/main" xmlns="" w="9525">
+                  <a14:hiddenLine xmlns="" xmlns:a14="http://schemas.microsoft.com/office/drawing/2010/main" w="9525">
                     <a:solidFill>
                       <a:srgbClr val="000000"/>
                     </a:solidFill>
@@ -10256,7 +10702,7 @@
               </a:ln>
               <a:extLst>
                 <a:ext uri="{91240B29-F687-4f45-9708-019B960494DF}">
-                  <a14:hiddenLine xmlns:a14="http://schemas.microsoft.com/office/drawing/2010/main" xmlns="" w="9525">
+                  <a14:hiddenLine xmlns="" xmlns:a14="http://schemas.microsoft.com/office/drawing/2010/main" w="9525">
                     <a:solidFill>
                       <a:srgbClr val="000000"/>
                     </a:solidFill>
@@ -10290,7 +10736,7 @@
               </a:ln>
               <a:extLst>
                 <a:ext uri="{91240B29-F687-4f45-9708-019B960494DF}">
-                  <a14:hiddenLine xmlns:a14="http://schemas.microsoft.com/office/drawing/2010/main" xmlns="" w="9525">
+                  <a14:hiddenLine xmlns="" xmlns:a14="http://schemas.microsoft.com/office/drawing/2010/main" w="9525">
                     <a:solidFill>
                       <a:srgbClr val="000000"/>
                     </a:solidFill>
@@ -10355,7 +10801,7 @@
               </a:ln>
               <a:extLst>
                 <a:ext uri="{91240B29-F687-4f45-9708-019B960494DF}">
-                  <a14:hiddenLine xmlns:a14="http://schemas.microsoft.com/office/drawing/2010/main" xmlns="" w="9525">
+                  <a14:hiddenLine xmlns="" xmlns:a14="http://schemas.microsoft.com/office/drawing/2010/main" w="9525">
                     <a:solidFill>
                       <a:srgbClr val="000000"/>
                     </a:solidFill>
@@ -10445,7 +10891,7 @@
               </a:ln>
               <a:extLst>
                 <a:ext uri="{91240B29-F687-4f45-9708-019B960494DF}">
-                  <a14:hiddenLine xmlns:a14="http://schemas.microsoft.com/office/drawing/2010/main" xmlns="" w="9525">
+                  <a14:hiddenLine xmlns="" xmlns:a14="http://schemas.microsoft.com/office/drawing/2010/main" w="9525">
                     <a:solidFill>
                       <a:srgbClr val="000000"/>
                     </a:solidFill>
@@ -10507,7 +10953,7 @@
               </a:ln>
               <a:extLst>
                 <a:ext uri="{91240B29-F687-4f45-9708-019B960494DF}">
-                  <a14:hiddenLine xmlns:a14="http://schemas.microsoft.com/office/drawing/2010/main" xmlns="" w="9525">
+                  <a14:hiddenLine xmlns="" xmlns:a14="http://schemas.microsoft.com/office/drawing/2010/main" w="9525">
                     <a:solidFill>
                       <a:srgbClr val="000000"/>
                     </a:solidFill>
@@ -10597,7 +11043,7 @@
               </a:ln>
               <a:extLst>
                 <a:ext uri="{91240B29-F687-4f45-9708-019B960494DF}">
-                  <a14:hiddenLine xmlns:a14="http://schemas.microsoft.com/office/drawing/2010/main" xmlns="" w="9525">
+                  <a14:hiddenLine xmlns="" xmlns:a14="http://schemas.microsoft.com/office/drawing/2010/main" w="9525">
                     <a:solidFill>
                       <a:srgbClr val="000000"/>
                     </a:solidFill>
@@ -10662,7 +11108,7 @@
               </a:ln>
               <a:extLst>
                 <a:ext uri="{91240B29-F687-4f45-9708-019B960494DF}">
-                  <a14:hiddenLine xmlns:a14="http://schemas.microsoft.com/office/drawing/2010/main" xmlns="" w="9525">
+                  <a14:hiddenLine xmlns="" xmlns:a14="http://schemas.microsoft.com/office/drawing/2010/main" w="9525">
                     <a:solidFill>
                       <a:srgbClr val="000000"/>
                     </a:solidFill>
@@ -10724,7 +11170,7 @@
               </a:ln>
               <a:extLst>
                 <a:ext uri="{91240B29-F687-4f45-9708-019B960494DF}">
-                  <a14:hiddenLine xmlns:a14="http://schemas.microsoft.com/office/drawing/2010/main" xmlns="" w="9525">
+                  <a14:hiddenLine xmlns="" xmlns:a14="http://schemas.microsoft.com/office/drawing/2010/main" w="9525">
                     <a:solidFill>
                       <a:srgbClr val="000000"/>
                     </a:solidFill>
@@ -10814,7 +11260,7 @@
               </a:ln>
               <a:extLst>
                 <a:ext uri="{91240B29-F687-4f45-9708-019B960494DF}">
-                  <a14:hiddenLine xmlns:a14="http://schemas.microsoft.com/office/drawing/2010/main" xmlns="" w="9525">
+                  <a14:hiddenLine xmlns="" xmlns:a14="http://schemas.microsoft.com/office/drawing/2010/main" w="9525">
                     <a:solidFill>
                       <a:srgbClr val="000000"/>
                     </a:solidFill>
@@ -10904,7 +11350,7 @@
               </a:ln>
               <a:extLst>
                 <a:ext uri="{91240B29-F687-4f45-9708-019B960494DF}">
-                  <a14:hiddenLine xmlns:a14="http://schemas.microsoft.com/office/drawing/2010/main" xmlns="" w="9525">
+                  <a14:hiddenLine xmlns="" xmlns:a14="http://schemas.microsoft.com/office/drawing/2010/main" w="9525">
                     <a:solidFill>
                       <a:srgbClr val="000000"/>
                     </a:solidFill>
@@ -10969,7 +11415,7 @@
               </a:ln>
               <a:extLst>
                 <a:ext uri="{91240B29-F687-4f45-9708-019B960494DF}">
-                  <a14:hiddenLine xmlns:a14="http://schemas.microsoft.com/office/drawing/2010/main" xmlns="" w="9525">
+                  <a14:hiddenLine xmlns="" xmlns:a14="http://schemas.microsoft.com/office/drawing/2010/main" w="9525">
                     <a:solidFill>
                       <a:srgbClr val="000000"/>
                     </a:solidFill>
@@ -11089,7 +11535,7 @@
               </a:ln>
               <a:extLst>
                 <a:ext uri="{91240B29-F687-4f45-9708-019B960494DF}">
-                  <a14:hiddenLine xmlns:a14="http://schemas.microsoft.com/office/drawing/2010/main" xmlns="" w="9525">
+                  <a14:hiddenLine xmlns="" xmlns:a14="http://schemas.microsoft.com/office/drawing/2010/main" w="9525">
                     <a:solidFill>
                       <a:srgbClr val="000000"/>
                     </a:solidFill>
@@ -11170,7 +11616,7 @@
               </a:ln>
               <a:extLst>
                 <a:ext uri="{91240B29-F687-4f45-9708-019B960494DF}">
-                  <a14:hiddenLine xmlns:a14="http://schemas.microsoft.com/office/drawing/2010/main" xmlns="" w="9525">
+                  <a14:hiddenLine xmlns="" xmlns:a14="http://schemas.microsoft.com/office/drawing/2010/main" w="9525">
                     <a:solidFill>
                       <a:srgbClr val="000000"/>
                     </a:solidFill>
@@ -11285,7 +11731,7 @@
               </a:ln>
               <a:extLst>
                 <a:ext uri="{91240B29-F687-4f45-9708-019B960494DF}">
-                  <a14:hiddenLine xmlns:a14="http://schemas.microsoft.com/office/drawing/2010/main" xmlns="" w="9525">
+                  <a14:hiddenLine xmlns="" xmlns:a14="http://schemas.microsoft.com/office/drawing/2010/main" w="9525">
                     <a:solidFill>
                       <a:srgbClr val="000000"/>
                     </a:solidFill>
@@ -11375,7 +11821,7 @@
               </a:ln>
               <a:extLst>
                 <a:ext uri="{91240B29-F687-4f45-9708-019B960494DF}">
-                  <a14:hiddenLine xmlns:a14="http://schemas.microsoft.com/office/drawing/2010/main" xmlns="" w="9525">
+                  <a14:hiddenLine xmlns="" xmlns:a14="http://schemas.microsoft.com/office/drawing/2010/main" w="9525">
                     <a:solidFill>
                       <a:srgbClr val="000000"/>
                     </a:solidFill>
@@ -11440,7 +11886,7 @@
               </a:ln>
               <a:extLst>
                 <a:ext uri="{91240B29-F687-4f45-9708-019B960494DF}">
-                  <a14:hiddenLine xmlns:a14="http://schemas.microsoft.com/office/drawing/2010/main" xmlns="" w="9525">
+                  <a14:hiddenLine xmlns="" xmlns:a14="http://schemas.microsoft.com/office/drawing/2010/main" w="9525">
                     <a:solidFill>
                       <a:srgbClr val="000000"/>
                     </a:solidFill>
@@ -11530,7 +11976,7 @@
               </a:ln>
               <a:extLst>
                 <a:ext uri="{91240B29-F687-4f45-9708-019B960494DF}">
-                  <a14:hiddenLine xmlns:a14="http://schemas.microsoft.com/office/drawing/2010/main" xmlns="" w="9525">
+                  <a14:hiddenLine xmlns="" xmlns:a14="http://schemas.microsoft.com/office/drawing/2010/main" w="9525">
                     <a:solidFill>
                       <a:srgbClr val="000000"/>
                     </a:solidFill>
@@ -11598,7 +12044,7 @@
               </a:ln>
               <a:extLst>
                 <a:ext uri="{91240B29-F687-4f45-9708-019B960494DF}">
-                  <a14:hiddenLine xmlns:a14="http://schemas.microsoft.com/office/drawing/2010/main" xmlns="" w="9525">
+                  <a14:hiddenLine xmlns="" xmlns:a14="http://schemas.microsoft.com/office/drawing/2010/main" w="9525">
                     <a:solidFill>
                       <a:srgbClr val="000000"/>
                     </a:solidFill>
@@ -11688,7 +12134,7 @@
               </a:ln>
               <a:extLst>
                 <a:ext uri="{91240B29-F687-4f45-9708-019B960494DF}">
-                  <a14:hiddenLine xmlns:a14="http://schemas.microsoft.com/office/drawing/2010/main" xmlns="" w="9525">
+                  <a14:hiddenLine xmlns="" xmlns:a14="http://schemas.microsoft.com/office/drawing/2010/main" w="9525">
                     <a:solidFill>
                       <a:srgbClr val="000000"/>
                     </a:solidFill>
@@ -11756,7 +12202,7 @@
               </a:ln>
               <a:extLst>
                 <a:ext uri="{91240B29-F687-4f45-9708-019B960494DF}">
-                  <a14:hiddenLine xmlns:a14="http://schemas.microsoft.com/office/drawing/2010/main" xmlns="" w="9525">
+                  <a14:hiddenLine xmlns="" xmlns:a14="http://schemas.microsoft.com/office/drawing/2010/main" w="9525">
                     <a:solidFill>
                       <a:srgbClr val="000000"/>
                     </a:solidFill>
@@ -11846,7 +12292,7 @@
               </a:ln>
               <a:extLst>
                 <a:ext uri="{91240B29-F687-4f45-9708-019B960494DF}">
-                  <a14:hiddenLine xmlns:a14="http://schemas.microsoft.com/office/drawing/2010/main" xmlns="" w="9525">
+                  <a14:hiddenLine xmlns="" xmlns:a14="http://schemas.microsoft.com/office/drawing/2010/main" w="9525">
                     <a:solidFill>
                       <a:srgbClr val="000000"/>
                     </a:solidFill>
@@ -11880,7 +12326,7 @@
               </a:ln>
               <a:extLst>
                 <a:ext uri="{91240B29-F687-4f45-9708-019B960494DF}">
-                  <a14:hiddenLine xmlns:a14="http://schemas.microsoft.com/office/drawing/2010/main" xmlns="" w="9525">
+                  <a14:hiddenLine xmlns="" xmlns:a14="http://schemas.microsoft.com/office/drawing/2010/main" w="9525">
                     <a:solidFill>
                       <a:srgbClr val="000000"/>
                     </a:solidFill>
@@ -12021,7 +12467,7 @@
             <a:fld id="{48A87A34-81AB-432B-8DAE-1953F412C126}" type="datetimeFigureOut">
               <a:rPr lang="en-US" smtClean="0"/>
               <a:pPr/>
-              <a:t>10/10/2018</a:t>
+              <a:t>10/11/2018</a:t>
             </a:fld>
             <a:endParaRPr lang="en-US" dirty="0"/>
           </a:p>
@@ -12525,7 +12971,7 @@
 </p:sld>
 </file>
 
-<file path=ppt/slides/slide2.xml><?xml version="1.0" encoding="utf-8"?>
+<file path=ppt/slides/slide10.xml><?xml version="1.0" encoding="utf-8"?>
 <p:sld xmlns:a="http://schemas.openxmlformats.org/drawingml/2006/main" xmlns:r="http://schemas.openxmlformats.org/officeDocument/2006/relationships" xmlns:p="http://schemas.openxmlformats.org/presentationml/2006/main">
   <p:cSld>
     <p:spTree>
@@ -12547,7 +12993,7 @@
           <p:cNvPr id="2" name="Title 1">
             <a:extLst>
               <a:ext uri="{FF2B5EF4-FFF2-40B4-BE49-F238E27FC236}">
-                <a16:creationId xmlns:a16="http://schemas.microsoft.com/office/drawing/2014/main" id="{530D793E-9D1B-4916-8DF7-01E0817FB03D}"/>
+                <a16:creationId xmlns:a16="http://schemas.microsoft.com/office/drawing/2014/main" id="{78D7BC93-D0C7-4B16-91AC-D4E9B0142459}"/>
               </a:ext>
             </a:extLst>
           </p:cNvPr>
@@ -12565,17 +13011,17 @@
           <a:p>
             <a:r>
               <a:rPr lang="en-US" dirty="0"/>
-              <a:t>Span and slice</a:t>
+              <a:t>.NET Core 3.0 (2019)</a:t>
             </a:r>
           </a:p>
         </p:txBody>
       </p:sp>
       <p:sp>
         <p:nvSpPr>
-          <p:cNvPr id="3" name="Text Placeholder 2">
+          <p:cNvPr id="3" name="Content Placeholder 2">
             <a:extLst>
               <a:ext uri="{FF2B5EF4-FFF2-40B4-BE49-F238E27FC236}">
-                <a16:creationId xmlns:a16="http://schemas.microsoft.com/office/drawing/2014/main" id="{3AA42258-FA41-4C98-89F8-B0D7CA862934}"/>
+                <a16:creationId xmlns:a16="http://schemas.microsoft.com/office/drawing/2014/main" id="{4743AF63-51FF-454D-B8DD-675C92D8308F}"/>
               </a:ext>
             </a:extLst>
           </p:cNvPr>
@@ -12583,22 +13029,42 @@
             <a:spLocks noGrp="1"/>
           </p:cNvSpPr>
           <p:nvPr>
-            <p:ph type="body" idx="1"/>
+            <p:ph idx="1"/>
           </p:nvPr>
         </p:nvSpPr>
         <p:spPr/>
         <p:txBody>
-          <a:bodyPr/>
+          <a:bodyPr>
+            <a:normAutofit/>
+          </a:bodyPr>
           <a:lstStyle/>
           <a:p>
-            <a:endParaRPr lang="en-US"/>
+            <a:r>
+              <a:rPr lang="en-US" dirty="0"/>
+              <a:t>Self-contained EXE on Windows (no dependencies on .NET Core or .NET Framework</a:t>
+            </a:r>
+          </a:p>
+          <a:p>
+            <a:r>
+              <a:rPr lang="en-US" dirty="0"/>
+              <a:t>Non-UWP applications (WPF and WinForms) can now take advantage of the newer project structure</a:t>
+            </a:r>
+          </a:p>
+          <a:p>
+            <a:r>
+              <a:rPr lang="en-US" dirty="0"/>
+              <a:t>Faster iterations and take advantage of .NET Core optimizations over .NET Framework</a:t>
+            </a:r>
+          </a:p>
+          <a:p>
+            <a:endParaRPr lang="en-US" dirty="0"/>
           </a:p>
         </p:txBody>
       </p:sp>
     </p:spTree>
     <p:extLst>
       <p:ext uri="{BB962C8B-B14F-4D97-AF65-F5344CB8AC3E}">
-        <p14:creationId xmlns:p14="http://schemas.microsoft.com/office/powerpoint/2010/main" val="993560705"/>
+        <p14:creationId xmlns:p14="http://schemas.microsoft.com/office/powerpoint/2010/main" val="522438790"/>
       </p:ext>
     </p:extLst>
   </p:cSld>
@@ -12608,7 +13074,267 @@
 </p:sld>
 </file>
 
-<file path=ppt/slides/slide3.xml><?xml version="1.0" encoding="utf-8"?>
+<file path=ppt/slides/slide11.xml><?xml version="1.0" encoding="utf-8"?>
+<p:sld xmlns:a="http://schemas.openxmlformats.org/drawingml/2006/main" xmlns:r="http://schemas.openxmlformats.org/officeDocument/2006/relationships" xmlns:p="http://schemas.openxmlformats.org/presentationml/2006/main">
+  <p:cSld>
+    <p:spTree>
+      <p:nvGrpSpPr>
+        <p:cNvPr id="1" name=""/>
+        <p:cNvGrpSpPr/>
+        <p:nvPr/>
+      </p:nvGrpSpPr>
+      <p:grpSpPr>
+        <a:xfrm>
+          <a:off x="0" y="0"/>
+          <a:ext cx="0" cy="0"/>
+          <a:chOff x="0" y="0"/>
+          <a:chExt cx="0" cy="0"/>
+        </a:xfrm>
+      </p:grpSpPr>
+      <p:sp>
+        <p:nvSpPr>
+          <p:cNvPr id="2" name="Title 1">
+            <a:extLst>
+              <a:ext uri="{FF2B5EF4-FFF2-40B4-BE49-F238E27FC236}">
+                <a16:creationId xmlns:a16="http://schemas.microsoft.com/office/drawing/2014/main" id="{6C357E14-C73F-477F-B2E5-647D85B404AB}"/>
+              </a:ext>
+            </a:extLst>
+          </p:cNvPr>
+          <p:cNvSpPr>
+            <a:spLocks noGrp="1"/>
+          </p:cNvSpPr>
+          <p:nvPr>
+            <p:ph type="title"/>
+          </p:nvPr>
+        </p:nvSpPr>
+        <p:spPr/>
+        <p:txBody>
+          <a:bodyPr/>
+          <a:lstStyle/>
+          <a:p>
+            <a:pPr algn="ctr"/>
+            <a:r>
+              <a:rPr lang="en-US" dirty="0"/>
+              <a:t>Visual studio live share</a:t>
+            </a:r>
+          </a:p>
+        </p:txBody>
+      </p:sp>
+      <p:pic>
+        <p:nvPicPr>
+          <p:cNvPr id="4" name="Picture 3">
+            <a:extLst>
+              <a:ext uri="{FF2B5EF4-FFF2-40B4-BE49-F238E27FC236}">
+                <a16:creationId xmlns:a16="http://schemas.microsoft.com/office/drawing/2014/main" id="{081527C8-54E5-45D3-A32D-66A66F5761B0}"/>
+              </a:ext>
+            </a:extLst>
+          </p:cNvPr>
+          <p:cNvPicPr>
+            <a:picLocks noChangeAspect="1"/>
+          </p:cNvPicPr>
+          <p:nvPr/>
+        </p:nvPicPr>
+        <p:blipFill>
+          <a:blip r:embed="rId2"/>
+          <a:stretch>
+            <a:fillRect/>
+          </a:stretch>
+        </p:blipFill>
+        <p:spPr>
+          <a:xfrm>
+            <a:off x="2398675" y="1813450"/>
+            <a:ext cx="7391474" cy="4213723"/>
+          </a:xfrm>
+          <a:prstGeom prst="rect">
+            <a:avLst/>
+          </a:prstGeom>
+        </p:spPr>
+      </p:pic>
+    </p:spTree>
+    <p:extLst>
+      <p:ext uri="{BB962C8B-B14F-4D97-AF65-F5344CB8AC3E}">
+        <p14:creationId xmlns:p14="http://schemas.microsoft.com/office/powerpoint/2010/main" val="1678005509"/>
+      </p:ext>
+    </p:extLst>
+  </p:cSld>
+  <p:clrMapOvr>
+    <a:masterClrMapping/>
+  </p:clrMapOvr>
+</p:sld>
+</file>
+
+<file path=ppt/slides/slide12.xml><?xml version="1.0" encoding="utf-8"?>
+<p:sld xmlns:a="http://schemas.openxmlformats.org/drawingml/2006/main" xmlns:r="http://schemas.openxmlformats.org/officeDocument/2006/relationships" xmlns:p="http://schemas.openxmlformats.org/presentationml/2006/main">
+  <p:cSld>
+    <p:spTree>
+      <p:nvGrpSpPr>
+        <p:cNvPr id="1" name=""/>
+        <p:cNvGrpSpPr/>
+        <p:nvPr/>
+      </p:nvGrpSpPr>
+      <p:grpSpPr>
+        <a:xfrm>
+          <a:off x="0" y="0"/>
+          <a:ext cx="0" cy="0"/>
+          <a:chOff x="0" y="0"/>
+          <a:chExt cx="0" cy="0"/>
+        </a:xfrm>
+      </p:grpSpPr>
+      <p:sp>
+        <p:nvSpPr>
+          <p:cNvPr id="2" name="Title 1">
+            <a:extLst>
+              <a:ext uri="{FF2B5EF4-FFF2-40B4-BE49-F238E27FC236}">
+                <a16:creationId xmlns:a16="http://schemas.microsoft.com/office/drawing/2014/main" id="{516C00E3-171A-4EE7-8490-2C2AB0355C35}"/>
+              </a:ext>
+            </a:extLst>
+          </p:cNvPr>
+          <p:cNvSpPr>
+            <a:spLocks noGrp="1"/>
+          </p:cNvSpPr>
+          <p:nvPr>
+            <p:ph type="title"/>
+          </p:nvPr>
+        </p:nvSpPr>
+        <p:spPr>
+          <a:xfrm>
+            <a:off x="4592333" y="2578842"/>
+            <a:ext cx="2622658" cy="1478570"/>
+          </a:xfrm>
+        </p:spPr>
+        <p:txBody>
+          <a:bodyPr/>
+          <a:lstStyle/>
+          <a:p>
+            <a:r>
+              <a:rPr lang="en-US" dirty="0"/>
+              <a:t>Questions?</a:t>
+            </a:r>
+          </a:p>
+        </p:txBody>
+      </p:sp>
+    </p:spTree>
+    <p:extLst>
+      <p:ext uri="{BB962C8B-B14F-4D97-AF65-F5344CB8AC3E}">
+        <p14:creationId xmlns:p14="http://schemas.microsoft.com/office/powerpoint/2010/main" val="2815773771"/>
+      </p:ext>
+    </p:extLst>
+  </p:cSld>
+  <p:clrMapOvr>
+    <a:masterClrMapping/>
+  </p:clrMapOvr>
+</p:sld>
+</file>
+
+<file path=ppt/slides/slide13.xml><?xml version="1.0" encoding="utf-8"?>
+<p:sld xmlns:a="http://schemas.openxmlformats.org/drawingml/2006/main" xmlns:r="http://schemas.openxmlformats.org/officeDocument/2006/relationships" xmlns:p="http://schemas.openxmlformats.org/presentationml/2006/main">
+  <p:cSld>
+    <p:spTree>
+      <p:nvGrpSpPr>
+        <p:cNvPr id="1" name=""/>
+        <p:cNvGrpSpPr/>
+        <p:nvPr/>
+      </p:nvGrpSpPr>
+      <p:grpSpPr>
+        <a:xfrm>
+          <a:off x="0" y="0"/>
+          <a:ext cx="0" cy="0"/>
+          <a:chOff x="0" y="0"/>
+          <a:chExt cx="0" cy="0"/>
+        </a:xfrm>
+      </p:grpSpPr>
+      <p:sp>
+        <p:nvSpPr>
+          <p:cNvPr id="2" name="Title 1">
+            <a:extLst>
+              <a:ext uri="{FF2B5EF4-FFF2-40B4-BE49-F238E27FC236}">
+                <a16:creationId xmlns:a16="http://schemas.microsoft.com/office/drawing/2014/main" id="{66694C7E-1320-487B-8226-EE0FA90ED676}"/>
+              </a:ext>
+            </a:extLst>
+          </p:cNvPr>
+          <p:cNvSpPr>
+            <a:spLocks noGrp="1"/>
+          </p:cNvSpPr>
+          <p:nvPr>
+            <p:ph type="title"/>
+          </p:nvPr>
+        </p:nvSpPr>
+        <p:spPr/>
+        <p:txBody>
+          <a:bodyPr/>
+          <a:lstStyle/>
+          <a:p>
+            <a:r>
+              <a:rPr lang="en-US" dirty="0"/>
+              <a:t>Resources</a:t>
+            </a:r>
+          </a:p>
+        </p:txBody>
+      </p:sp>
+      <p:sp>
+        <p:nvSpPr>
+          <p:cNvPr id="3" name="Content Placeholder 2">
+            <a:extLst>
+              <a:ext uri="{FF2B5EF4-FFF2-40B4-BE49-F238E27FC236}">
+                <a16:creationId xmlns:a16="http://schemas.microsoft.com/office/drawing/2014/main" id="{D32D2827-855E-4AFF-8D0A-26F07B67E2CD}"/>
+              </a:ext>
+            </a:extLst>
+          </p:cNvPr>
+          <p:cNvSpPr>
+            <a:spLocks noGrp="1"/>
+          </p:cNvSpPr>
+          <p:nvPr>
+            <p:ph idx="1"/>
+          </p:nvPr>
+        </p:nvSpPr>
+        <p:spPr>
+          <a:xfrm>
+            <a:off x="1141412" y="1591645"/>
+            <a:ext cx="9905999" cy="3541714"/>
+          </a:xfrm>
+        </p:spPr>
+        <p:txBody>
+          <a:bodyPr/>
+          <a:lstStyle/>
+          <a:p>
+            <a:r>
+              <a:rPr lang="en-US" dirty="0"/>
+              <a:t>PowerPoint and Sample Source Code</a:t>
+            </a:r>
+          </a:p>
+          <a:p>
+            <a:pPr lvl="1"/>
+            <a:r>
+              <a:rPr lang="en-US" dirty="0">
+                <a:hlinkClick r:id="rId2"/>
+              </a:rPr>
+              <a:t>https://github.com/jcapellman/Presentations</a:t>
+            </a:r>
+            <a:endParaRPr lang="en-US" dirty="0"/>
+          </a:p>
+          <a:p>
+            <a:pPr lvl="1"/>
+            <a:endParaRPr lang="en-US" dirty="0"/>
+          </a:p>
+          <a:p>
+            <a:endParaRPr lang="en-US" dirty="0"/>
+          </a:p>
+        </p:txBody>
+      </p:sp>
+    </p:spTree>
+    <p:extLst>
+      <p:ext uri="{BB962C8B-B14F-4D97-AF65-F5344CB8AC3E}">
+        <p14:creationId xmlns:p14="http://schemas.microsoft.com/office/powerpoint/2010/main" val="378910343"/>
+      </p:ext>
+    </p:extLst>
+  </p:cSld>
+  <p:clrMapOvr>
+    <a:masterClrMapping/>
+  </p:clrMapOvr>
+</p:sld>
+</file>
+
+<file path=ppt/slides/slide2.xml><?xml version="1.0" encoding="utf-8"?>
 <p:sld xmlns:a="http://schemas.openxmlformats.org/drawingml/2006/main" xmlns:r="http://schemas.openxmlformats.org/officeDocument/2006/relationships" xmlns:p="http://schemas.openxmlformats.org/presentationml/2006/main">
   <p:cSld>
     <p:spTree>
@@ -12641,14 +13367,21 @@
             <p:ph type="title"/>
           </p:nvPr>
         </p:nvSpPr>
-        <p:spPr/>
+        <p:spPr>
+          <a:xfrm>
+            <a:off x="1141413" y="618518"/>
+            <a:ext cx="4411490" cy="1478570"/>
+          </a:xfrm>
+        </p:spPr>
         <p:txBody>
-          <a:bodyPr/>
+          <a:bodyPr>
+            <a:normAutofit/>
+          </a:bodyPr>
           <a:lstStyle/>
           <a:p>
             <a:r>
-              <a:rPr lang="en-US" dirty="0"/>
-              <a:t>span</a:t>
+              <a:rPr lang="en-US" sz="2400" dirty="0"/>
+              <a:t>Traditional Subsets</a:t>
             </a:r>
           </a:p>
         </p:txBody>
@@ -12669,15 +13402,399 @@
             <p:ph idx="1"/>
           </p:nvPr>
         </p:nvSpPr>
-        <p:spPr/>
+        <p:spPr>
+          <a:xfrm>
+            <a:off x="1141413" y="1567843"/>
+            <a:ext cx="4411490" cy="3541714"/>
+          </a:xfrm>
+        </p:spPr>
         <p:txBody>
-          <a:bodyPr/>
+          <a:bodyPr>
+            <a:normAutofit/>
+          </a:bodyPr>
           <a:lstStyle/>
           <a:p>
             <a:pPr marL="0" indent="0">
               <a:buNone/>
             </a:pPr>
-            <a:endParaRPr lang="en-US" dirty="0"/>
+            <a:r>
+              <a:rPr lang="en-US" sz="1800" dirty="0"/>
+              <a:t>var bytes = </a:t>
+            </a:r>
+            <a:r>
+              <a:rPr lang="en-US" sz="1800" dirty="0" err="1"/>
+              <a:t>File.ReadAllBytes</a:t>
+            </a:r>
+            <a:r>
+              <a:rPr lang="en-US" sz="1800" dirty="0"/>
+              <a:t>(“Camaro.jpg”);</a:t>
+            </a:r>
+          </a:p>
+          <a:p>
+            <a:pPr marL="0" indent="0">
+              <a:buNone/>
+            </a:pPr>
+            <a:r>
+              <a:rPr lang="en-US" sz="1800" dirty="0"/>
+              <a:t>var result = Analyze(</a:t>
+            </a:r>
+            <a:r>
+              <a:rPr lang="en-US" sz="1800" dirty="0" err="1"/>
+              <a:t>bytes.Take</a:t>
+            </a:r>
+            <a:r>
+              <a:rPr lang="en-US" sz="1800" dirty="0"/>
+              <a:t>(1000));</a:t>
+            </a:r>
+          </a:p>
+          <a:p>
+            <a:pPr marL="0" indent="0">
+              <a:buNone/>
+            </a:pPr>
+            <a:r>
+              <a:rPr lang="en-US" sz="1800" dirty="0"/>
+              <a:t>public bool Analyze(byte[] bytes) {</a:t>
+            </a:r>
+          </a:p>
+          <a:p>
+            <a:pPr marL="0" indent="0">
+              <a:buNone/>
+            </a:pPr>
+            <a:r>
+              <a:rPr lang="en-US" sz="1800" dirty="0"/>
+              <a:t>// …</a:t>
+            </a:r>
+          </a:p>
+          <a:p>
+            <a:pPr marL="0" indent="0">
+              <a:buNone/>
+            </a:pPr>
+            <a:r>
+              <a:rPr lang="en-US" sz="1800" dirty="0"/>
+              <a:t>}</a:t>
+            </a:r>
+          </a:p>
+        </p:txBody>
+      </p:sp>
+      <p:sp>
+        <p:nvSpPr>
+          <p:cNvPr id="4" name="Title 1">
+            <a:extLst>
+              <a:ext uri="{FF2B5EF4-FFF2-40B4-BE49-F238E27FC236}">
+                <a16:creationId xmlns:a16="http://schemas.microsoft.com/office/drawing/2014/main" id="{6F6EEC42-0D46-4AD4-B0C8-46141BD70EFD}"/>
+              </a:ext>
+            </a:extLst>
+          </p:cNvPr>
+          <p:cNvSpPr txBox="1">
+            <a:spLocks/>
+          </p:cNvSpPr>
+          <p:nvPr/>
+        </p:nvSpPr>
+        <p:spPr>
+          <a:xfrm>
+            <a:off x="5724497" y="618518"/>
+            <a:ext cx="4411490" cy="1478570"/>
+          </a:xfrm>
+          <a:prstGeom prst="rect">
+            <a:avLst/>
+          </a:prstGeom>
+        </p:spPr>
+        <p:txBody>
+          <a:bodyPr vert="horz" lIns="91440" tIns="45720" rIns="91440" bIns="45720" rtlCol="0" anchor="ctr">
+            <a:normAutofit/>
+          </a:bodyPr>
+          <a:lstStyle>
+            <a:lvl1pPr algn="l" defTabSz="914400" rtl="0" eaLnBrk="1" latinLnBrk="0" hangingPunct="1">
+              <a:lnSpc>
+                <a:spcPct val="90000"/>
+              </a:lnSpc>
+              <a:spcBef>
+                <a:spcPct val="0"/>
+              </a:spcBef>
+              <a:buNone/>
+              <a:defRPr sz="3600" kern="1200" cap="all" baseline="0">
+                <a:solidFill>
+                  <a:schemeClr val="tx1"/>
+                </a:solidFill>
+                <a:latin typeface="+mj-lt"/>
+                <a:ea typeface="+mj-ea"/>
+                <a:cs typeface="+mj-cs"/>
+              </a:defRPr>
+            </a:lvl1pPr>
+          </a:lstStyle>
+          <a:p>
+            <a:r>
+              <a:rPr lang="en-US" sz="2400" dirty="0"/>
+              <a:t>SPAN and slice C# 7.2</a:t>
+            </a:r>
+          </a:p>
+        </p:txBody>
+      </p:sp>
+      <p:sp>
+        <p:nvSpPr>
+          <p:cNvPr id="5" name="Content Placeholder 2">
+            <a:extLst>
+              <a:ext uri="{FF2B5EF4-FFF2-40B4-BE49-F238E27FC236}">
+                <a16:creationId xmlns:a16="http://schemas.microsoft.com/office/drawing/2014/main" id="{F3D3D919-87E8-4BD5-90AF-787999B9EE9C}"/>
+              </a:ext>
+            </a:extLst>
+          </p:cNvPr>
+          <p:cNvSpPr txBox="1">
+            <a:spLocks/>
+          </p:cNvSpPr>
+          <p:nvPr/>
+        </p:nvSpPr>
+        <p:spPr>
+          <a:xfrm>
+            <a:off x="5724497" y="1567843"/>
+            <a:ext cx="5464434" cy="3541714"/>
+          </a:xfrm>
+          <a:prstGeom prst="rect">
+            <a:avLst/>
+          </a:prstGeom>
+        </p:spPr>
+        <p:txBody>
+          <a:bodyPr vert="horz" lIns="91440" tIns="45720" rIns="91440" bIns="45720" rtlCol="0">
+            <a:normAutofit/>
+          </a:bodyPr>
+          <a:lstStyle>
+            <a:lvl1pPr marL="228600" indent="-228600" algn="l" defTabSz="914400" rtl="0" eaLnBrk="1" latinLnBrk="0" hangingPunct="1">
+              <a:lnSpc>
+                <a:spcPct val="120000"/>
+              </a:lnSpc>
+              <a:spcBef>
+                <a:spcPts val="1000"/>
+              </a:spcBef>
+              <a:buSzPct val="125000"/>
+              <a:buFont typeface="Arial" panose="020B0604020202020204" pitchFamily="34" charset="0"/>
+              <a:buChar char="•"/>
+              <a:defRPr sz="2400" kern="1200">
+                <a:solidFill>
+                  <a:schemeClr val="tx1"/>
+                </a:solidFill>
+                <a:latin typeface="+mn-lt"/>
+                <a:ea typeface="+mn-ea"/>
+                <a:cs typeface="+mn-cs"/>
+              </a:defRPr>
+            </a:lvl1pPr>
+            <a:lvl2pPr marL="685800" indent="-228600" algn="l" defTabSz="914400" rtl="0" eaLnBrk="1" latinLnBrk="0" hangingPunct="1">
+              <a:lnSpc>
+                <a:spcPct val="120000"/>
+              </a:lnSpc>
+              <a:spcBef>
+                <a:spcPts val="500"/>
+              </a:spcBef>
+              <a:buSzPct val="125000"/>
+              <a:buFont typeface="Arial" panose="020B0604020202020204" pitchFamily="34" charset="0"/>
+              <a:buChar char="•"/>
+              <a:defRPr sz="2000" kern="1200">
+                <a:solidFill>
+                  <a:schemeClr val="tx1"/>
+                </a:solidFill>
+                <a:latin typeface="+mn-lt"/>
+                <a:ea typeface="+mn-ea"/>
+                <a:cs typeface="+mn-cs"/>
+              </a:defRPr>
+            </a:lvl2pPr>
+            <a:lvl3pPr marL="1143000" indent="-228600" algn="l" defTabSz="914400" rtl="0" eaLnBrk="1" latinLnBrk="0" hangingPunct="1">
+              <a:lnSpc>
+                <a:spcPct val="120000"/>
+              </a:lnSpc>
+              <a:spcBef>
+                <a:spcPts val="500"/>
+              </a:spcBef>
+              <a:buSzPct val="125000"/>
+              <a:buFont typeface="Arial" panose="020B0604020202020204" pitchFamily="34" charset="0"/>
+              <a:buChar char="•"/>
+              <a:defRPr sz="1800" kern="1200">
+                <a:solidFill>
+                  <a:schemeClr val="tx1"/>
+                </a:solidFill>
+                <a:latin typeface="+mn-lt"/>
+                <a:ea typeface="+mn-ea"/>
+                <a:cs typeface="+mn-cs"/>
+              </a:defRPr>
+            </a:lvl3pPr>
+            <a:lvl4pPr marL="1600200" indent="-228600" algn="l" defTabSz="914400" rtl="0" eaLnBrk="1" latinLnBrk="0" hangingPunct="1">
+              <a:lnSpc>
+                <a:spcPct val="120000"/>
+              </a:lnSpc>
+              <a:spcBef>
+                <a:spcPts val="500"/>
+              </a:spcBef>
+              <a:buSzPct val="125000"/>
+              <a:buFont typeface="Arial" panose="020B0604020202020204" pitchFamily="34" charset="0"/>
+              <a:buChar char="•"/>
+              <a:defRPr sz="1600" kern="1200">
+                <a:solidFill>
+                  <a:schemeClr val="tx1"/>
+                </a:solidFill>
+                <a:latin typeface="+mn-lt"/>
+                <a:ea typeface="+mn-ea"/>
+                <a:cs typeface="+mn-cs"/>
+              </a:defRPr>
+            </a:lvl4pPr>
+            <a:lvl5pPr marL="2057400" indent="-228600" algn="l" defTabSz="914400" rtl="0" eaLnBrk="1" latinLnBrk="0" hangingPunct="1">
+              <a:lnSpc>
+                <a:spcPct val="120000"/>
+              </a:lnSpc>
+              <a:spcBef>
+                <a:spcPts val="500"/>
+              </a:spcBef>
+              <a:buSzPct val="125000"/>
+              <a:buFont typeface="Arial" panose="020B0604020202020204" pitchFamily="34" charset="0"/>
+              <a:buChar char="•"/>
+              <a:defRPr sz="1600" kern="1200">
+                <a:solidFill>
+                  <a:schemeClr val="tx1"/>
+                </a:solidFill>
+                <a:latin typeface="+mn-lt"/>
+                <a:ea typeface="+mn-ea"/>
+                <a:cs typeface="+mn-cs"/>
+              </a:defRPr>
+            </a:lvl5pPr>
+            <a:lvl6pPr marL="2514600" indent="-228600" algn="l" defTabSz="914400" rtl="0" eaLnBrk="1" latinLnBrk="0" hangingPunct="1">
+              <a:lnSpc>
+                <a:spcPct val="120000"/>
+              </a:lnSpc>
+              <a:spcBef>
+                <a:spcPts val="500"/>
+              </a:spcBef>
+              <a:buSzPct val="125000"/>
+              <a:buFont typeface="Arial" panose="020B0604020202020204" pitchFamily="34" charset="0"/>
+              <a:buChar char="•"/>
+              <a:defRPr sz="1400" kern="1200">
+                <a:solidFill>
+                  <a:schemeClr val="tx1"/>
+                </a:solidFill>
+                <a:latin typeface="+mn-lt"/>
+                <a:ea typeface="+mn-ea"/>
+                <a:cs typeface="+mn-cs"/>
+              </a:defRPr>
+            </a:lvl6pPr>
+            <a:lvl7pPr marL="2971800" indent="-228600" algn="l" defTabSz="914400" rtl="0" eaLnBrk="1" latinLnBrk="0" hangingPunct="1">
+              <a:lnSpc>
+                <a:spcPct val="120000"/>
+              </a:lnSpc>
+              <a:spcBef>
+                <a:spcPts val="500"/>
+              </a:spcBef>
+              <a:buSzPct val="125000"/>
+              <a:buFont typeface="Arial" panose="020B0604020202020204" pitchFamily="34" charset="0"/>
+              <a:buChar char="•"/>
+              <a:defRPr sz="1400" kern="1200">
+                <a:solidFill>
+                  <a:schemeClr val="tx1"/>
+                </a:solidFill>
+                <a:latin typeface="+mn-lt"/>
+                <a:ea typeface="+mn-ea"/>
+                <a:cs typeface="+mn-cs"/>
+              </a:defRPr>
+            </a:lvl7pPr>
+            <a:lvl8pPr marL="3429000" indent="-228600" algn="l" defTabSz="914400" rtl="0" eaLnBrk="1" latinLnBrk="0" hangingPunct="1">
+              <a:lnSpc>
+                <a:spcPct val="120000"/>
+              </a:lnSpc>
+              <a:spcBef>
+                <a:spcPts val="500"/>
+              </a:spcBef>
+              <a:buSzPct val="125000"/>
+              <a:buFont typeface="Arial" panose="020B0604020202020204" pitchFamily="34" charset="0"/>
+              <a:buChar char="•"/>
+              <a:defRPr sz="1400" kern="1200">
+                <a:solidFill>
+                  <a:schemeClr val="tx1"/>
+                </a:solidFill>
+                <a:latin typeface="+mn-lt"/>
+                <a:ea typeface="+mn-ea"/>
+                <a:cs typeface="+mn-cs"/>
+              </a:defRPr>
+            </a:lvl8pPr>
+            <a:lvl9pPr marL="3886200" indent="-228600" algn="l" defTabSz="914400" rtl="0" eaLnBrk="1" latinLnBrk="0" hangingPunct="1">
+              <a:lnSpc>
+                <a:spcPct val="120000"/>
+              </a:lnSpc>
+              <a:spcBef>
+                <a:spcPts val="500"/>
+              </a:spcBef>
+              <a:buSzPct val="125000"/>
+              <a:buFont typeface="Arial" panose="020B0604020202020204" pitchFamily="34" charset="0"/>
+              <a:buChar char="•"/>
+              <a:defRPr sz="1400" kern="1200">
+                <a:solidFill>
+                  <a:schemeClr val="tx1"/>
+                </a:solidFill>
+                <a:latin typeface="+mn-lt"/>
+                <a:ea typeface="+mn-ea"/>
+                <a:cs typeface="+mn-cs"/>
+              </a:defRPr>
+            </a:lvl9pPr>
+          </a:lstStyle>
+          <a:p>
+            <a:pPr marL="0" indent="0">
+              <a:buFont typeface="Arial" panose="020B0604020202020204" pitchFamily="34" charset="0"/>
+              <a:buNone/>
+            </a:pPr>
+            <a:r>
+              <a:rPr lang="en-US" sz="1800" dirty="0"/>
+              <a:t>Span&lt;byte&gt; bytes = </a:t>
+            </a:r>
+            <a:r>
+              <a:rPr lang="en-US" sz="1800" dirty="0" err="1"/>
+              <a:t>File.ReadAllBytes</a:t>
+            </a:r>
+            <a:r>
+              <a:rPr lang="en-US" sz="1800" dirty="0"/>
+              <a:t>(“Camaro.jpg”);</a:t>
+            </a:r>
+          </a:p>
+          <a:p>
+            <a:pPr marL="0" indent="0">
+              <a:buFont typeface="Arial" panose="020B0604020202020204" pitchFamily="34" charset="0"/>
+              <a:buNone/>
+            </a:pPr>
+            <a:r>
+              <a:rPr lang="en-US" sz="1800" dirty="0"/>
+              <a:t>var result = Analyze(</a:t>
+            </a:r>
+            <a:r>
+              <a:rPr lang="en-US" sz="1800" dirty="0" err="1"/>
+              <a:t>bytes.Slice</a:t>
+            </a:r>
+            <a:r>
+              <a:rPr lang="en-US" sz="1800" dirty="0"/>
+              <a:t>(1000));</a:t>
+            </a:r>
+          </a:p>
+          <a:p>
+            <a:pPr marL="0" indent="0">
+              <a:buFont typeface="Arial" panose="020B0604020202020204" pitchFamily="34" charset="0"/>
+              <a:buNone/>
+            </a:pPr>
+            <a:r>
+              <a:rPr lang="en-US" sz="1800" dirty="0"/>
+              <a:t>public bool Analyze(byte[] bytes) {</a:t>
+            </a:r>
+          </a:p>
+          <a:p>
+            <a:pPr marL="0" indent="0">
+              <a:buFont typeface="Arial" panose="020B0604020202020204" pitchFamily="34" charset="0"/>
+              <a:buNone/>
+            </a:pPr>
+            <a:r>
+              <a:rPr lang="en-US" sz="1800" dirty="0"/>
+              <a:t>// …</a:t>
+            </a:r>
+          </a:p>
+          <a:p>
+            <a:pPr marL="0" indent="0">
+              <a:buFont typeface="Arial" panose="020B0604020202020204" pitchFamily="34" charset="0"/>
+              <a:buNone/>
+            </a:pPr>
+            <a:r>
+              <a:rPr lang="en-US" sz="1800" dirty="0"/>
+              <a:t>}</a:t>
+            </a:r>
           </a:p>
         </p:txBody>
       </p:sp>
@@ -12694,7 +13811,1231 @@
 </p:sld>
 </file>
 
+<file path=ppt/slides/slide3.xml><?xml version="1.0" encoding="utf-8"?>
+<p:sld xmlns:a="http://schemas.openxmlformats.org/drawingml/2006/main" xmlns:r="http://schemas.openxmlformats.org/officeDocument/2006/relationships" xmlns:p="http://schemas.openxmlformats.org/presentationml/2006/main">
+  <p:cSld>
+    <p:spTree>
+      <p:nvGrpSpPr>
+        <p:cNvPr id="1" name=""/>
+        <p:cNvGrpSpPr/>
+        <p:nvPr/>
+      </p:nvGrpSpPr>
+      <p:grpSpPr>
+        <a:xfrm>
+          <a:off x="0" y="0"/>
+          <a:ext cx="0" cy="0"/>
+          <a:chOff x="0" y="0"/>
+          <a:chExt cx="0" cy="0"/>
+        </a:xfrm>
+      </p:grpSpPr>
+      <p:sp>
+        <p:nvSpPr>
+          <p:cNvPr id="2" name="Title 1">
+            <a:extLst>
+              <a:ext uri="{FF2B5EF4-FFF2-40B4-BE49-F238E27FC236}">
+                <a16:creationId xmlns:a16="http://schemas.microsoft.com/office/drawing/2014/main" id="{179C0400-C31D-4F86-908C-5EA291B9D5F9}"/>
+              </a:ext>
+            </a:extLst>
+          </p:cNvPr>
+          <p:cNvSpPr>
+            <a:spLocks noGrp="1"/>
+          </p:cNvSpPr>
+          <p:nvPr>
+            <p:ph type="title"/>
+          </p:nvPr>
+        </p:nvSpPr>
+        <p:spPr/>
+        <p:txBody>
+          <a:bodyPr/>
+          <a:lstStyle/>
+          <a:p>
+            <a:r>
+              <a:rPr lang="en-US" dirty="0"/>
+              <a:t>Span continued</a:t>
+            </a:r>
+          </a:p>
+        </p:txBody>
+      </p:sp>
+      <p:sp>
+        <p:nvSpPr>
+          <p:cNvPr id="3" name="Content Placeholder 2">
+            <a:extLst>
+              <a:ext uri="{FF2B5EF4-FFF2-40B4-BE49-F238E27FC236}">
+                <a16:creationId xmlns:a16="http://schemas.microsoft.com/office/drawing/2014/main" id="{1ADCA982-8FA4-4EB5-B3D7-FD0BB6989CC3}"/>
+              </a:ext>
+            </a:extLst>
+          </p:cNvPr>
+          <p:cNvSpPr>
+            <a:spLocks noGrp="1"/>
+          </p:cNvSpPr>
+          <p:nvPr>
+            <p:ph idx="1"/>
+          </p:nvPr>
+        </p:nvSpPr>
+        <p:spPr>
+          <a:xfrm>
+            <a:off x="1128351" y="1767500"/>
+            <a:ext cx="10780622" cy="659176"/>
+          </a:xfrm>
+        </p:spPr>
+        <p:txBody>
+          <a:bodyPr/>
+          <a:lstStyle/>
+          <a:p>
+            <a:pPr marL="0" indent="0">
+              <a:buNone/>
+            </a:pPr>
+            <a:r>
+              <a:rPr lang="en-US" dirty="0"/>
+              <a:t>var </a:t>
+            </a:r>
+            <a:r>
+              <a:rPr lang="en-US" dirty="0" err="1"/>
+              <a:t>carName</a:t>
+            </a:r>
+            <a:r>
+              <a:rPr lang="en-US" dirty="0"/>
+              <a:t> = “Camaro’s are great, high performing cars.”;</a:t>
+            </a:r>
+          </a:p>
+          <a:p>
+            <a:pPr marL="0" indent="0">
+              <a:buNone/>
+            </a:pPr>
+            <a:endParaRPr lang="en-US" dirty="0"/>
+          </a:p>
+        </p:txBody>
+      </p:sp>
+      <p:sp>
+        <p:nvSpPr>
+          <p:cNvPr id="5" name="TextBox 4">
+            <a:extLst>
+              <a:ext uri="{FF2B5EF4-FFF2-40B4-BE49-F238E27FC236}">
+                <a16:creationId xmlns:a16="http://schemas.microsoft.com/office/drawing/2014/main" id="{BBEBA489-42F2-4B13-92C4-FA705EDAB5D9}"/>
+              </a:ext>
+            </a:extLst>
+          </p:cNvPr>
+          <p:cNvSpPr txBox="1"/>
+          <p:nvPr/>
+        </p:nvSpPr>
+        <p:spPr>
+          <a:xfrm>
+            <a:off x="1141413" y="2426676"/>
+            <a:ext cx="8421280" cy="1200329"/>
+          </a:xfrm>
+          <a:prstGeom prst="rect">
+            <a:avLst/>
+          </a:prstGeom>
+          <a:noFill/>
+        </p:spPr>
+        <p:txBody>
+          <a:bodyPr wrap="none" rtlCol="0">
+            <a:spAutoFit/>
+          </a:bodyPr>
+          <a:lstStyle/>
+          <a:p>
+            <a:r>
+              <a:rPr lang="en-US" sz="2400" dirty="0"/>
+              <a:t>// Allocates memory of the substring</a:t>
+            </a:r>
+          </a:p>
+          <a:p>
+            <a:r>
+              <a:rPr lang="en-US" sz="2400" dirty="0"/>
+              <a:t>string </a:t>
+            </a:r>
+            <a:r>
+              <a:rPr lang="en-US" sz="2400" dirty="0" err="1"/>
+              <a:t>subsetOfString</a:t>
+            </a:r>
+            <a:r>
+              <a:rPr lang="en-US" sz="2400" dirty="0"/>
+              <a:t> = </a:t>
+            </a:r>
+            <a:r>
+              <a:rPr lang="en-US" sz="2400" dirty="0" err="1"/>
+              <a:t>carName.Substring</a:t>
+            </a:r>
+            <a:r>
+              <a:rPr lang="en-US" sz="2400" dirty="0"/>
+              <a:t>(</a:t>
+            </a:r>
+            <a:r>
+              <a:rPr lang="en-US" sz="2400" dirty="0" err="1"/>
+              <a:t>startIndex</a:t>
+            </a:r>
+            <a:r>
+              <a:rPr lang="en-US" sz="2400" dirty="0"/>
+              <a:t>: 2, length: 5);</a:t>
+            </a:r>
+          </a:p>
+          <a:p>
+            <a:endParaRPr lang="en-US" sz="2400" dirty="0"/>
+          </a:p>
+        </p:txBody>
+      </p:sp>
+      <p:sp>
+        <p:nvSpPr>
+          <p:cNvPr id="6" name="TextBox 5">
+            <a:extLst>
+              <a:ext uri="{FF2B5EF4-FFF2-40B4-BE49-F238E27FC236}">
+                <a16:creationId xmlns:a16="http://schemas.microsoft.com/office/drawing/2014/main" id="{29F3411F-91E0-4678-A440-742E25E9C151}"/>
+              </a:ext>
+            </a:extLst>
+          </p:cNvPr>
+          <p:cNvSpPr txBox="1"/>
+          <p:nvPr/>
+        </p:nvSpPr>
+        <p:spPr>
+          <a:xfrm>
+            <a:off x="1141413" y="3429000"/>
+            <a:ext cx="10491847" cy="1200329"/>
+          </a:xfrm>
+          <a:prstGeom prst="rect">
+            <a:avLst/>
+          </a:prstGeom>
+          <a:noFill/>
+        </p:spPr>
+        <p:txBody>
+          <a:bodyPr wrap="none" rtlCol="0">
+            <a:spAutoFit/>
+          </a:bodyPr>
+          <a:lstStyle/>
+          <a:p>
+            <a:r>
+              <a:rPr lang="en-US" sz="2400" dirty="0"/>
+              <a:t>// No allocations</a:t>
+            </a:r>
+          </a:p>
+          <a:p>
+            <a:r>
+              <a:rPr lang="en-US" sz="2400" dirty="0" err="1"/>
+              <a:t>ReadOnlySpan</a:t>
+            </a:r>
+            <a:r>
+              <a:rPr lang="en-US" sz="2400" dirty="0"/>
+              <a:t>&lt;char&gt; </a:t>
+            </a:r>
+            <a:r>
+              <a:rPr lang="en-US" sz="2400" dirty="0" err="1"/>
+              <a:t>subsetOfString</a:t>
+            </a:r>
+            <a:r>
+              <a:rPr lang="en-US" sz="2400" dirty="0"/>
+              <a:t> = </a:t>
+            </a:r>
+            <a:r>
+              <a:rPr lang="en-US" sz="2400" dirty="0" err="1"/>
+              <a:t>carName.AsSpan</a:t>
+            </a:r>
+            <a:r>
+              <a:rPr lang="en-US" sz="2400" dirty="0"/>
+              <a:t>().Slice(start: 2, length: 5);</a:t>
+            </a:r>
+          </a:p>
+          <a:p>
+            <a:endParaRPr lang="en-US" sz="2400" dirty="0"/>
+          </a:p>
+        </p:txBody>
+      </p:sp>
+    </p:spTree>
+    <p:extLst>
+      <p:ext uri="{BB962C8B-B14F-4D97-AF65-F5344CB8AC3E}">
+        <p14:creationId xmlns:p14="http://schemas.microsoft.com/office/powerpoint/2010/main" val="448932368"/>
+      </p:ext>
+    </p:extLst>
+  </p:cSld>
+  <p:clrMapOvr>
+    <a:masterClrMapping/>
+  </p:clrMapOvr>
+  <p:timing>
+    <p:tnLst>
+      <p:par>
+        <p:cTn id="1" dur="indefinite" restart="never" nodeType="tmRoot">
+          <p:childTnLst>
+            <p:seq concurrent="1" nextAc="seek">
+              <p:cTn id="2" dur="indefinite" nodeType="mainSeq">
+                <p:childTnLst>
+                  <p:par>
+                    <p:cTn id="3" fill="hold">
+                      <p:stCondLst>
+                        <p:cond delay="indefinite"/>
+                      </p:stCondLst>
+                      <p:childTnLst>
+                        <p:par>
+                          <p:cTn id="4" fill="hold">
+                            <p:stCondLst>
+                              <p:cond delay="0"/>
+                            </p:stCondLst>
+                            <p:childTnLst>
+                              <p:par>
+                                <p:cTn id="5" presetID="10" presetClass="entr" presetSubtype="0" fill="hold" grpId="0" nodeType="clickEffect">
+                                  <p:stCondLst>
+                                    <p:cond delay="0"/>
+                                  </p:stCondLst>
+                                  <p:childTnLst>
+                                    <p:set>
+                                      <p:cBhvr>
+                                        <p:cTn id="6" dur="1" fill="hold">
+                                          <p:stCondLst>
+                                            <p:cond delay="0"/>
+                                          </p:stCondLst>
+                                        </p:cTn>
+                                        <p:tgtEl>
+                                          <p:spTgt spid="3">
+                                            <p:txEl>
+                                              <p:pRg st="0" end="0"/>
+                                            </p:txEl>
+                                          </p:spTgt>
+                                        </p:tgtEl>
+                                        <p:attrNameLst>
+                                          <p:attrName>style.visibility</p:attrName>
+                                        </p:attrNameLst>
+                                      </p:cBhvr>
+                                      <p:to>
+                                        <p:strVal val="visible"/>
+                                      </p:to>
+                                    </p:set>
+                                    <p:animEffect transition="in" filter="fade">
+                                      <p:cBhvr>
+                                        <p:cTn id="7" dur="500"/>
+                                        <p:tgtEl>
+                                          <p:spTgt spid="3">
+                                            <p:txEl>
+                                              <p:pRg st="0" end="0"/>
+                                            </p:txEl>
+                                          </p:spTgt>
+                                        </p:tgtEl>
+                                      </p:cBhvr>
+                                    </p:animEffect>
+                                  </p:childTnLst>
+                                </p:cTn>
+                              </p:par>
+                            </p:childTnLst>
+                          </p:cTn>
+                        </p:par>
+                      </p:childTnLst>
+                    </p:cTn>
+                  </p:par>
+                  <p:par>
+                    <p:cTn id="8" fill="hold">
+                      <p:stCondLst>
+                        <p:cond delay="indefinite"/>
+                      </p:stCondLst>
+                      <p:childTnLst>
+                        <p:par>
+                          <p:cTn id="9" fill="hold">
+                            <p:stCondLst>
+                              <p:cond delay="0"/>
+                            </p:stCondLst>
+                            <p:childTnLst>
+                              <p:par>
+                                <p:cTn id="10" presetID="10" presetClass="entr" presetSubtype="0" fill="hold" grpId="0" nodeType="clickEffect">
+                                  <p:stCondLst>
+                                    <p:cond delay="0"/>
+                                  </p:stCondLst>
+                                  <p:childTnLst>
+                                    <p:set>
+                                      <p:cBhvr>
+                                        <p:cTn id="11" dur="1" fill="hold">
+                                          <p:stCondLst>
+                                            <p:cond delay="0"/>
+                                          </p:stCondLst>
+                                        </p:cTn>
+                                        <p:tgtEl>
+                                          <p:spTgt spid="5"/>
+                                        </p:tgtEl>
+                                        <p:attrNameLst>
+                                          <p:attrName>style.visibility</p:attrName>
+                                        </p:attrNameLst>
+                                      </p:cBhvr>
+                                      <p:to>
+                                        <p:strVal val="visible"/>
+                                      </p:to>
+                                    </p:set>
+                                    <p:animEffect transition="in" filter="fade">
+                                      <p:cBhvr>
+                                        <p:cTn id="12" dur="500"/>
+                                        <p:tgtEl>
+                                          <p:spTgt spid="5"/>
+                                        </p:tgtEl>
+                                      </p:cBhvr>
+                                    </p:animEffect>
+                                  </p:childTnLst>
+                                </p:cTn>
+                              </p:par>
+                            </p:childTnLst>
+                          </p:cTn>
+                        </p:par>
+                      </p:childTnLst>
+                    </p:cTn>
+                  </p:par>
+                  <p:par>
+                    <p:cTn id="13" fill="hold">
+                      <p:stCondLst>
+                        <p:cond delay="indefinite"/>
+                      </p:stCondLst>
+                      <p:childTnLst>
+                        <p:par>
+                          <p:cTn id="14" fill="hold">
+                            <p:stCondLst>
+                              <p:cond delay="0"/>
+                            </p:stCondLst>
+                            <p:childTnLst>
+                              <p:par>
+                                <p:cTn id="15" presetID="10" presetClass="entr" presetSubtype="0" fill="hold" grpId="0" nodeType="clickEffect">
+                                  <p:stCondLst>
+                                    <p:cond delay="0"/>
+                                  </p:stCondLst>
+                                  <p:childTnLst>
+                                    <p:set>
+                                      <p:cBhvr>
+                                        <p:cTn id="16" dur="1" fill="hold">
+                                          <p:stCondLst>
+                                            <p:cond delay="0"/>
+                                          </p:stCondLst>
+                                        </p:cTn>
+                                        <p:tgtEl>
+                                          <p:spTgt spid="6"/>
+                                        </p:tgtEl>
+                                        <p:attrNameLst>
+                                          <p:attrName>style.visibility</p:attrName>
+                                        </p:attrNameLst>
+                                      </p:cBhvr>
+                                      <p:to>
+                                        <p:strVal val="visible"/>
+                                      </p:to>
+                                    </p:set>
+                                    <p:animEffect transition="in" filter="fade">
+                                      <p:cBhvr>
+                                        <p:cTn id="17" dur="500"/>
+                                        <p:tgtEl>
+                                          <p:spTgt spid="6"/>
+                                        </p:tgtEl>
+                                      </p:cBhvr>
+                                    </p:animEffect>
+                                  </p:childTnLst>
+                                </p:cTn>
+                              </p:par>
+                            </p:childTnLst>
+                          </p:cTn>
+                        </p:par>
+                      </p:childTnLst>
+                    </p:cTn>
+                  </p:par>
+                </p:childTnLst>
+              </p:cTn>
+              <p:prevCondLst>
+                <p:cond evt="onPrev" delay="0">
+                  <p:tgtEl>
+                    <p:sldTgt/>
+                  </p:tgtEl>
+                </p:cond>
+              </p:prevCondLst>
+              <p:nextCondLst>
+                <p:cond evt="onNext" delay="0">
+                  <p:tgtEl>
+                    <p:sldTgt/>
+                  </p:tgtEl>
+                </p:cond>
+              </p:nextCondLst>
+            </p:seq>
+          </p:childTnLst>
+        </p:cTn>
+      </p:par>
+    </p:tnLst>
+    <p:bldLst>
+      <p:bldP spid="3" grpId="0" build="p"/>
+      <p:bldP spid="5" grpId="0"/>
+      <p:bldP spid="6" grpId="0"/>
+    </p:bldLst>
+  </p:timing>
+</p:sld>
+</file>
+
 <file path=ppt/slides/slide4.xml><?xml version="1.0" encoding="utf-8"?>
+<p:sld xmlns:a="http://schemas.openxmlformats.org/drawingml/2006/main" xmlns:r="http://schemas.openxmlformats.org/officeDocument/2006/relationships" xmlns:p="http://schemas.openxmlformats.org/presentationml/2006/main">
+  <p:cSld>
+    <p:spTree>
+      <p:nvGrpSpPr>
+        <p:cNvPr id="1" name=""/>
+        <p:cNvGrpSpPr/>
+        <p:nvPr/>
+      </p:nvGrpSpPr>
+      <p:grpSpPr>
+        <a:xfrm>
+          <a:off x="0" y="0"/>
+          <a:ext cx="0" cy="0"/>
+          <a:chOff x="0" y="0"/>
+          <a:chExt cx="0" cy="0"/>
+        </a:xfrm>
+      </p:grpSpPr>
+      <p:sp>
+        <p:nvSpPr>
+          <p:cNvPr id="2" name="Title 1">
+            <a:extLst>
+              <a:ext uri="{FF2B5EF4-FFF2-40B4-BE49-F238E27FC236}">
+                <a16:creationId xmlns:a16="http://schemas.microsoft.com/office/drawing/2014/main" id="{440CEDA4-0913-481B-844E-B638F6E77AF5}"/>
+              </a:ext>
+            </a:extLst>
+          </p:cNvPr>
+          <p:cNvSpPr>
+            <a:spLocks noGrp="1"/>
+          </p:cNvSpPr>
+          <p:nvPr>
+            <p:ph type="title"/>
+          </p:nvPr>
+        </p:nvSpPr>
+        <p:spPr>
+          <a:xfrm>
+            <a:off x="1141413" y="618518"/>
+            <a:ext cx="4369925" cy="1478570"/>
+          </a:xfrm>
+        </p:spPr>
+        <p:txBody>
+          <a:bodyPr/>
+          <a:lstStyle/>
+          <a:p>
+            <a:r>
+              <a:rPr lang="en-US" dirty="0" err="1"/>
+              <a:t>Stackalloc</a:t>
+            </a:r>
+            <a:r>
+              <a:rPr lang="en-US" dirty="0"/>
+              <a:t> (&lt; 7.2)</a:t>
+            </a:r>
+          </a:p>
+        </p:txBody>
+      </p:sp>
+      <p:sp>
+        <p:nvSpPr>
+          <p:cNvPr id="3" name="Content Placeholder 2">
+            <a:extLst>
+              <a:ext uri="{FF2B5EF4-FFF2-40B4-BE49-F238E27FC236}">
+                <a16:creationId xmlns:a16="http://schemas.microsoft.com/office/drawing/2014/main" id="{04FA3B5F-F76B-4104-A814-4836FCC26E4F}"/>
+              </a:ext>
+            </a:extLst>
+          </p:cNvPr>
+          <p:cNvSpPr>
+            <a:spLocks noGrp="1"/>
+          </p:cNvSpPr>
+          <p:nvPr>
+            <p:ph idx="1"/>
+          </p:nvPr>
+        </p:nvSpPr>
+        <p:spPr>
+          <a:xfrm>
+            <a:off x="1141412" y="1858789"/>
+            <a:ext cx="4577744" cy="3541714"/>
+          </a:xfrm>
+        </p:spPr>
+        <p:txBody>
+          <a:bodyPr>
+            <a:normAutofit/>
+          </a:bodyPr>
+          <a:lstStyle/>
+          <a:p>
+            <a:pPr marL="0" indent="0">
+              <a:buNone/>
+            </a:pPr>
+            <a:r>
+              <a:rPr lang="en-US" sz="1800" dirty="0"/>
+              <a:t>Span&lt;byte&gt; </a:t>
+            </a:r>
+            <a:r>
+              <a:rPr lang="en-US" sz="1800" dirty="0" err="1"/>
+              <a:t>someBytes</a:t>
+            </a:r>
+            <a:r>
+              <a:rPr lang="en-US" sz="1800" dirty="0"/>
+              <a:t>;</a:t>
+            </a:r>
+          </a:p>
+          <a:p>
+            <a:pPr marL="0" indent="0">
+              <a:buNone/>
+            </a:pPr>
+            <a:r>
+              <a:rPr lang="en-US" sz="1800" dirty="0"/>
+              <a:t>unsafe</a:t>
+            </a:r>
+          </a:p>
+          <a:p>
+            <a:pPr marL="0" indent="0">
+              <a:buNone/>
+            </a:pPr>
+            <a:r>
+              <a:rPr lang="en-US" sz="1800" dirty="0"/>
+              <a:t>{</a:t>
+            </a:r>
+          </a:p>
+          <a:p>
+            <a:pPr marL="0" indent="0">
+              <a:buNone/>
+            </a:pPr>
+            <a:r>
+              <a:rPr lang="en-US" sz="1800" dirty="0"/>
+              <a:t>  byte * temp = </a:t>
+            </a:r>
+            <a:r>
+              <a:rPr lang="en-US" sz="1800" dirty="0" err="1"/>
+              <a:t>stackalloc</a:t>
+            </a:r>
+            <a:r>
+              <a:rPr lang="en-US" sz="1800" dirty="0"/>
+              <a:t> byte[length];</a:t>
+            </a:r>
+          </a:p>
+          <a:p>
+            <a:pPr marL="0" indent="0">
+              <a:buNone/>
+            </a:pPr>
+            <a:r>
+              <a:rPr lang="en-US" sz="1800" dirty="0"/>
+              <a:t>  </a:t>
+            </a:r>
+            <a:r>
+              <a:rPr lang="en-US" sz="1800" dirty="0" err="1"/>
+              <a:t>someBytes</a:t>
+            </a:r>
+            <a:r>
+              <a:rPr lang="en-US" sz="1800" dirty="0"/>
+              <a:t> = new Span&lt;byte&gt;(temp, length);</a:t>
+            </a:r>
+          </a:p>
+          <a:p>
+            <a:pPr marL="0" indent="0">
+              <a:buNone/>
+            </a:pPr>
+            <a:r>
+              <a:rPr lang="en-US" sz="1800" dirty="0"/>
+              <a:t>}</a:t>
+            </a:r>
+          </a:p>
+        </p:txBody>
+      </p:sp>
+      <p:sp>
+        <p:nvSpPr>
+          <p:cNvPr id="5" name="Title 1">
+            <a:extLst>
+              <a:ext uri="{FF2B5EF4-FFF2-40B4-BE49-F238E27FC236}">
+                <a16:creationId xmlns:a16="http://schemas.microsoft.com/office/drawing/2014/main" id="{FE59D825-D63A-4125-B189-55C392D6DCB7}"/>
+              </a:ext>
+            </a:extLst>
+          </p:cNvPr>
+          <p:cNvSpPr txBox="1">
+            <a:spLocks/>
+          </p:cNvSpPr>
+          <p:nvPr/>
+        </p:nvSpPr>
+        <p:spPr>
+          <a:xfrm>
+            <a:off x="5948939" y="618518"/>
+            <a:ext cx="4369925" cy="1478570"/>
+          </a:xfrm>
+          <a:prstGeom prst="rect">
+            <a:avLst/>
+          </a:prstGeom>
+        </p:spPr>
+        <p:txBody>
+          <a:bodyPr vert="horz" lIns="91440" tIns="45720" rIns="91440" bIns="45720" rtlCol="0" anchor="ctr">
+            <a:normAutofit/>
+          </a:bodyPr>
+          <a:lstStyle>
+            <a:lvl1pPr algn="l" defTabSz="914400" rtl="0" eaLnBrk="1" latinLnBrk="0" hangingPunct="1">
+              <a:lnSpc>
+                <a:spcPct val="90000"/>
+              </a:lnSpc>
+              <a:spcBef>
+                <a:spcPct val="0"/>
+              </a:spcBef>
+              <a:buNone/>
+              <a:defRPr sz="3600" kern="1200" cap="all" baseline="0">
+                <a:solidFill>
+                  <a:schemeClr val="tx1"/>
+                </a:solidFill>
+                <a:latin typeface="+mj-lt"/>
+                <a:ea typeface="+mj-ea"/>
+                <a:cs typeface="+mj-cs"/>
+              </a:defRPr>
+            </a:lvl1pPr>
+          </a:lstStyle>
+          <a:p>
+            <a:r>
+              <a:rPr lang="en-US" dirty="0" err="1"/>
+              <a:t>Stackalloc</a:t>
+            </a:r>
+            <a:r>
+              <a:rPr lang="en-US" dirty="0"/>
+              <a:t> (7.2)</a:t>
+            </a:r>
+          </a:p>
+        </p:txBody>
+      </p:sp>
+      <p:sp>
+        <p:nvSpPr>
+          <p:cNvPr id="6" name="TextBox 5">
+            <a:extLst>
+              <a:ext uri="{FF2B5EF4-FFF2-40B4-BE49-F238E27FC236}">
+                <a16:creationId xmlns:a16="http://schemas.microsoft.com/office/drawing/2014/main" id="{DF9D2E88-B0C2-4F99-B3F8-161B7132ADAA}"/>
+              </a:ext>
+            </a:extLst>
+          </p:cNvPr>
+          <p:cNvSpPr txBox="1"/>
+          <p:nvPr/>
+        </p:nvSpPr>
+        <p:spPr>
+          <a:xfrm>
+            <a:off x="5948939" y="1858789"/>
+            <a:ext cx="4313040" cy="369332"/>
+          </a:xfrm>
+          <a:prstGeom prst="rect">
+            <a:avLst/>
+          </a:prstGeom>
+          <a:noFill/>
+        </p:spPr>
+        <p:txBody>
+          <a:bodyPr wrap="none" rtlCol="0">
+            <a:spAutoFit/>
+          </a:bodyPr>
+          <a:lstStyle/>
+          <a:p>
+            <a:r>
+              <a:rPr lang="en-US" dirty="0"/>
+              <a:t>Span&lt;byte&gt; bytes = </a:t>
+            </a:r>
+            <a:r>
+              <a:rPr lang="en-US" dirty="0" err="1"/>
+              <a:t>stackalloc</a:t>
+            </a:r>
+            <a:r>
+              <a:rPr lang="en-US" dirty="0"/>
+              <a:t> byte[length];</a:t>
+            </a:r>
+          </a:p>
+        </p:txBody>
+      </p:sp>
+    </p:spTree>
+    <p:extLst>
+      <p:ext uri="{BB962C8B-B14F-4D97-AF65-F5344CB8AC3E}">
+        <p14:creationId xmlns:p14="http://schemas.microsoft.com/office/powerpoint/2010/main" val="804330364"/>
+      </p:ext>
+    </p:extLst>
+  </p:cSld>
+  <p:clrMapOvr>
+    <a:masterClrMapping/>
+  </p:clrMapOvr>
+  <p:timing>
+    <p:tnLst>
+      <p:par>
+        <p:cTn id="1" dur="indefinite" restart="never" nodeType="tmRoot">
+          <p:childTnLst>
+            <p:seq concurrent="1" nextAc="seek">
+              <p:cTn id="2" dur="indefinite" nodeType="mainSeq">
+                <p:childTnLst>
+                  <p:par>
+                    <p:cTn id="3" fill="hold">
+                      <p:stCondLst>
+                        <p:cond delay="indefinite"/>
+                      </p:stCondLst>
+                      <p:childTnLst>
+                        <p:par>
+                          <p:cTn id="4" fill="hold">
+                            <p:stCondLst>
+                              <p:cond delay="0"/>
+                            </p:stCondLst>
+                            <p:childTnLst>
+                              <p:par>
+                                <p:cTn id="5" presetID="10" presetClass="entr" presetSubtype="0" fill="hold" grpId="0" nodeType="clickEffect">
+                                  <p:stCondLst>
+                                    <p:cond delay="0"/>
+                                  </p:stCondLst>
+                                  <p:childTnLst>
+                                    <p:set>
+                                      <p:cBhvr>
+                                        <p:cTn id="6" dur="1" fill="hold">
+                                          <p:stCondLst>
+                                            <p:cond delay="0"/>
+                                          </p:stCondLst>
+                                        </p:cTn>
+                                        <p:tgtEl>
+                                          <p:spTgt spid="3">
+                                            <p:txEl>
+                                              <p:pRg st="0" end="0"/>
+                                            </p:txEl>
+                                          </p:spTgt>
+                                        </p:tgtEl>
+                                        <p:attrNameLst>
+                                          <p:attrName>style.visibility</p:attrName>
+                                        </p:attrNameLst>
+                                      </p:cBhvr>
+                                      <p:to>
+                                        <p:strVal val="visible"/>
+                                      </p:to>
+                                    </p:set>
+                                    <p:animEffect transition="in" filter="fade">
+                                      <p:cBhvr>
+                                        <p:cTn id="7" dur="500"/>
+                                        <p:tgtEl>
+                                          <p:spTgt spid="3">
+                                            <p:txEl>
+                                              <p:pRg st="0" end="0"/>
+                                            </p:txEl>
+                                          </p:spTgt>
+                                        </p:tgtEl>
+                                      </p:cBhvr>
+                                    </p:animEffect>
+                                  </p:childTnLst>
+                                </p:cTn>
+                              </p:par>
+                            </p:childTnLst>
+                          </p:cTn>
+                        </p:par>
+                      </p:childTnLst>
+                    </p:cTn>
+                  </p:par>
+                  <p:par>
+                    <p:cTn id="8" fill="hold">
+                      <p:stCondLst>
+                        <p:cond delay="indefinite"/>
+                      </p:stCondLst>
+                      <p:childTnLst>
+                        <p:par>
+                          <p:cTn id="9" fill="hold">
+                            <p:stCondLst>
+                              <p:cond delay="0"/>
+                            </p:stCondLst>
+                            <p:childTnLst>
+                              <p:par>
+                                <p:cTn id="10" presetID="10" presetClass="entr" presetSubtype="0" fill="hold" grpId="0" nodeType="clickEffect">
+                                  <p:stCondLst>
+                                    <p:cond delay="0"/>
+                                  </p:stCondLst>
+                                  <p:childTnLst>
+                                    <p:set>
+                                      <p:cBhvr>
+                                        <p:cTn id="11" dur="1" fill="hold">
+                                          <p:stCondLst>
+                                            <p:cond delay="0"/>
+                                          </p:stCondLst>
+                                        </p:cTn>
+                                        <p:tgtEl>
+                                          <p:spTgt spid="3">
+                                            <p:txEl>
+                                              <p:pRg st="1" end="1"/>
+                                            </p:txEl>
+                                          </p:spTgt>
+                                        </p:tgtEl>
+                                        <p:attrNameLst>
+                                          <p:attrName>style.visibility</p:attrName>
+                                        </p:attrNameLst>
+                                      </p:cBhvr>
+                                      <p:to>
+                                        <p:strVal val="visible"/>
+                                      </p:to>
+                                    </p:set>
+                                    <p:animEffect transition="in" filter="fade">
+                                      <p:cBhvr>
+                                        <p:cTn id="12" dur="500"/>
+                                        <p:tgtEl>
+                                          <p:spTgt spid="3">
+                                            <p:txEl>
+                                              <p:pRg st="1" end="1"/>
+                                            </p:txEl>
+                                          </p:spTgt>
+                                        </p:tgtEl>
+                                      </p:cBhvr>
+                                    </p:animEffect>
+                                  </p:childTnLst>
+                                </p:cTn>
+                              </p:par>
+                            </p:childTnLst>
+                          </p:cTn>
+                        </p:par>
+                      </p:childTnLst>
+                    </p:cTn>
+                  </p:par>
+                  <p:par>
+                    <p:cTn id="13" fill="hold">
+                      <p:stCondLst>
+                        <p:cond delay="indefinite"/>
+                      </p:stCondLst>
+                      <p:childTnLst>
+                        <p:par>
+                          <p:cTn id="14" fill="hold">
+                            <p:stCondLst>
+                              <p:cond delay="0"/>
+                            </p:stCondLst>
+                            <p:childTnLst>
+                              <p:par>
+                                <p:cTn id="15" presetID="10" presetClass="entr" presetSubtype="0" fill="hold" grpId="0" nodeType="clickEffect">
+                                  <p:stCondLst>
+                                    <p:cond delay="0"/>
+                                  </p:stCondLst>
+                                  <p:childTnLst>
+                                    <p:set>
+                                      <p:cBhvr>
+                                        <p:cTn id="16" dur="1" fill="hold">
+                                          <p:stCondLst>
+                                            <p:cond delay="0"/>
+                                          </p:stCondLst>
+                                        </p:cTn>
+                                        <p:tgtEl>
+                                          <p:spTgt spid="3">
+                                            <p:txEl>
+                                              <p:pRg st="2" end="2"/>
+                                            </p:txEl>
+                                          </p:spTgt>
+                                        </p:tgtEl>
+                                        <p:attrNameLst>
+                                          <p:attrName>style.visibility</p:attrName>
+                                        </p:attrNameLst>
+                                      </p:cBhvr>
+                                      <p:to>
+                                        <p:strVal val="visible"/>
+                                      </p:to>
+                                    </p:set>
+                                    <p:animEffect transition="in" filter="fade">
+                                      <p:cBhvr>
+                                        <p:cTn id="17" dur="500"/>
+                                        <p:tgtEl>
+                                          <p:spTgt spid="3">
+                                            <p:txEl>
+                                              <p:pRg st="2" end="2"/>
+                                            </p:txEl>
+                                          </p:spTgt>
+                                        </p:tgtEl>
+                                      </p:cBhvr>
+                                    </p:animEffect>
+                                  </p:childTnLst>
+                                </p:cTn>
+                              </p:par>
+                            </p:childTnLst>
+                          </p:cTn>
+                        </p:par>
+                      </p:childTnLst>
+                    </p:cTn>
+                  </p:par>
+                  <p:par>
+                    <p:cTn id="18" fill="hold">
+                      <p:stCondLst>
+                        <p:cond delay="indefinite"/>
+                      </p:stCondLst>
+                      <p:childTnLst>
+                        <p:par>
+                          <p:cTn id="19" fill="hold">
+                            <p:stCondLst>
+                              <p:cond delay="0"/>
+                            </p:stCondLst>
+                            <p:childTnLst>
+                              <p:par>
+                                <p:cTn id="20" presetID="10" presetClass="entr" presetSubtype="0" fill="hold" grpId="0" nodeType="clickEffect">
+                                  <p:stCondLst>
+                                    <p:cond delay="0"/>
+                                  </p:stCondLst>
+                                  <p:childTnLst>
+                                    <p:set>
+                                      <p:cBhvr>
+                                        <p:cTn id="21" dur="1" fill="hold">
+                                          <p:stCondLst>
+                                            <p:cond delay="0"/>
+                                          </p:stCondLst>
+                                        </p:cTn>
+                                        <p:tgtEl>
+                                          <p:spTgt spid="3">
+                                            <p:txEl>
+                                              <p:pRg st="3" end="3"/>
+                                            </p:txEl>
+                                          </p:spTgt>
+                                        </p:tgtEl>
+                                        <p:attrNameLst>
+                                          <p:attrName>style.visibility</p:attrName>
+                                        </p:attrNameLst>
+                                      </p:cBhvr>
+                                      <p:to>
+                                        <p:strVal val="visible"/>
+                                      </p:to>
+                                    </p:set>
+                                    <p:animEffect transition="in" filter="fade">
+                                      <p:cBhvr>
+                                        <p:cTn id="22" dur="500"/>
+                                        <p:tgtEl>
+                                          <p:spTgt spid="3">
+                                            <p:txEl>
+                                              <p:pRg st="3" end="3"/>
+                                            </p:txEl>
+                                          </p:spTgt>
+                                        </p:tgtEl>
+                                      </p:cBhvr>
+                                    </p:animEffect>
+                                  </p:childTnLst>
+                                </p:cTn>
+                              </p:par>
+                            </p:childTnLst>
+                          </p:cTn>
+                        </p:par>
+                      </p:childTnLst>
+                    </p:cTn>
+                  </p:par>
+                  <p:par>
+                    <p:cTn id="23" fill="hold">
+                      <p:stCondLst>
+                        <p:cond delay="indefinite"/>
+                      </p:stCondLst>
+                      <p:childTnLst>
+                        <p:par>
+                          <p:cTn id="24" fill="hold">
+                            <p:stCondLst>
+                              <p:cond delay="0"/>
+                            </p:stCondLst>
+                            <p:childTnLst>
+                              <p:par>
+                                <p:cTn id="25" presetID="10" presetClass="entr" presetSubtype="0" fill="hold" grpId="0" nodeType="clickEffect">
+                                  <p:stCondLst>
+                                    <p:cond delay="0"/>
+                                  </p:stCondLst>
+                                  <p:childTnLst>
+                                    <p:set>
+                                      <p:cBhvr>
+                                        <p:cTn id="26" dur="1" fill="hold">
+                                          <p:stCondLst>
+                                            <p:cond delay="0"/>
+                                          </p:stCondLst>
+                                        </p:cTn>
+                                        <p:tgtEl>
+                                          <p:spTgt spid="3">
+                                            <p:txEl>
+                                              <p:pRg st="4" end="4"/>
+                                            </p:txEl>
+                                          </p:spTgt>
+                                        </p:tgtEl>
+                                        <p:attrNameLst>
+                                          <p:attrName>style.visibility</p:attrName>
+                                        </p:attrNameLst>
+                                      </p:cBhvr>
+                                      <p:to>
+                                        <p:strVal val="visible"/>
+                                      </p:to>
+                                    </p:set>
+                                    <p:animEffect transition="in" filter="fade">
+                                      <p:cBhvr>
+                                        <p:cTn id="27" dur="500"/>
+                                        <p:tgtEl>
+                                          <p:spTgt spid="3">
+                                            <p:txEl>
+                                              <p:pRg st="4" end="4"/>
+                                            </p:txEl>
+                                          </p:spTgt>
+                                        </p:tgtEl>
+                                      </p:cBhvr>
+                                    </p:animEffect>
+                                  </p:childTnLst>
+                                </p:cTn>
+                              </p:par>
+                            </p:childTnLst>
+                          </p:cTn>
+                        </p:par>
+                      </p:childTnLst>
+                    </p:cTn>
+                  </p:par>
+                  <p:par>
+                    <p:cTn id="28" fill="hold">
+                      <p:stCondLst>
+                        <p:cond delay="indefinite"/>
+                      </p:stCondLst>
+                      <p:childTnLst>
+                        <p:par>
+                          <p:cTn id="29" fill="hold">
+                            <p:stCondLst>
+                              <p:cond delay="0"/>
+                            </p:stCondLst>
+                            <p:childTnLst>
+                              <p:par>
+                                <p:cTn id="30" presetID="10" presetClass="entr" presetSubtype="0" fill="hold" grpId="0" nodeType="clickEffect">
+                                  <p:stCondLst>
+                                    <p:cond delay="0"/>
+                                  </p:stCondLst>
+                                  <p:childTnLst>
+                                    <p:set>
+                                      <p:cBhvr>
+                                        <p:cTn id="31" dur="1" fill="hold">
+                                          <p:stCondLst>
+                                            <p:cond delay="0"/>
+                                          </p:stCondLst>
+                                        </p:cTn>
+                                        <p:tgtEl>
+                                          <p:spTgt spid="3">
+                                            <p:txEl>
+                                              <p:pRg st="5" end="5"/>
+                                            </p:txEl>
+                                          </p:spTgt>
+                                        </p:tgtEl>
+                                        <p:attrNameLst>
+                                          <p:attrName>style.visibility</p:attrName>
+                                        </p:attrNameLst>
+                                      </p:cBhvr>
+                                      <p:to>
+                                        <p:strVal val="visible"/>
+                                      </p:to>
+                                    </p:set>
+                                    <p:animEffect transition="in" filter="fade">
+                                      <p:cBhvr>
+                                        <p:cTn id="32" dur="500"/>
+                                        <p:tgtEl>
+                                          <p:spTgt spid="3">
+                                            <p:txEl>
+                                              <p:pRg st="5" end="5"/>
+                                            </p:txEl>
+                                          </p:spTgt>
+                                        </p:tgtEl>
+                                      </p:cBhvr>
+                                    </p:animEffect>
+                                  </p:childTnLst>
+                                </p:cTn>
+                              </p:par>
+                            </p:childTnLst>
+                          </p:cTn>
+                        </p:par>
+                      </p:childTnLst>
+                    </p:cTn>
+                  </p:par>
+                  <p:par>
+                    <p:cTn id="33" fill="hold">
+                      <p:stCondLst>
+                        <p:cond delay="indefinite"/>
+                      </p:stCondLst>
+                      <p:childTnLst>
+                        <p:par>
+                          <p:cTn id="34" fill="hold">
+                            <p:stCondLst>
+                              <p:cond delay="0"/>
+                            </p:stCondLst>
+                            <p:childTnLst>
+                              <p:par>
+                                <p:cTn id="35" presetID="10" presetClass="entr" presetSubtype="0" fill="hold" grpId="0" nodeType="clickEffect">
+                                  <p:stCondLst>
+                                    <p:cond delay="0"/>
+                                  </p:stCondLst>
+                                  <p:childTnLst>
+                                    <p:set>
+                                      <p:cBhvr>
+                                        <p:cTn id="36" dur="1" fill="hold">
+                                          <p:stCondLst>
+                                            <p:cond delay="0"/>
+                                          </p:stCondLst>
+                                        </p:cTn>
+                                        <p:tgtEl>
+                                          <p:spTgt spid="5"/>
+                                        </p:tgtEl>
+                                        <p:attrNameLst>
+                                          <p:attrName>style.visibility</p:attrName>
+                                        </p:attrNameLst>
+                                      </p:cBhvr>
+                                      <p:to>
+                                        <p:strVal val="visible"/>
+                                      </p:to>
+                                    </p:set>
+                                    <p:animEffect transition="in" filter="fade">
+                                      <p:cBhvr>
+                                        <p:cTn id="37" dur="500"/>
+                                        <p:tgtEl>
+                                          <p:spTgt spid="5"/>
+                                        </p:tgtEl>
+                                      </p:cBhvr>
+                                    </p:animEffect>
+                                  </p:childTnLst>
+                                </p:cTn>
+                              </p:par>
+                            </p:childTnLst>
+                          </p:cTn>
+                        </p:par>
+                      </p:childTnLst>
+                    </p:cTn>
+                  </p:par>
+                  <p:par>
+                    <p:cTn id="38" fill="hold">
+                      <p:stCondLst>
+                        <p:cond delay="indefinite"/>
+                      </p:stCondLst>
+                      <p:childTnLst>
+                        <p:par>
+                          <p:cTn id="39" fill="hold">
+                            <p:stCondLst>
+                              <p:cond delay="0"/>
+                            </p:stCondLst>
+                            <p:childTnLst>
+                              <p:par>
+                                <p:cTn id="40" presetID="10" presetClass="entr" presetSubtype="0" fill="hold" grpId="0" nodeType="clickEffect">
+                                  <p:stCondLst>
+                                    <p:cond delay="0"/>
+                                  </p:stCondLst>
+                                  <p:childTnLst>
+                                    <p:set>
+                                      <p:cBhvr>
+                                        <p:cTn id="41" dur="1" fill="hold">
+                                          <p:stCondLst>
+                                            <p:cond delay="0"/>
+                                          </p:stCondLst>
+                                        </p:cTn>
+                                        <p:tgtEl>
+                                          <p:spTgt spid="6"/>
+                                        </p:tgtEl>
+                                        <p:attrNameLst>
+                                          <p:attrName>style.visibility</p:attrName>
+                                        </p:attrNameLst>
+                                      </p:cBhvr>
+                                      <p:to>
+                                        <p:strVal val="visible"/>
+                                      </p:to>
+                                    </p:set>
+                                    <p:animEffect transition="in" filter="fade">
+                                      <p:cBhvr>
+                                        <p:cTn id="42" dur="500"/>
+                                        <p:tgtEl>
+                                          <p:spTgt spid="6"/>
+                                        </p:tgtEl>
+                                      </p:cBhvr>
+                                    </p:animEffect>
+                                  </p:childTnLst>
+                                </p:cTn>
+                              </p:par>
+                            </p:childTnLst>
+                          </p:cTn>
+                        </p:par>
+                      </p:childTnLst>
+                    </p:cTn>
+                  </p:par>
+                </p:childTnLst>
+              </p:cTn>
+              <p:prevCondLst>
+                <p:cond evt="onPrev" delay="0">
+                  <p:tgtEl>
+                    <p:sldTgt/>
+                  </p:tgtEl>
+                </p:cond>
+              </p:prevCondLst>
+              <p:nextCondLst>
+                <p:cond evt="onNext" delay="0">
+                  <p:tgtEl>
+                    <p:sldTgt/>
+                  </p:tgtEl>
+                </p:cond>
+              </p:nextCondLst>
+            </p:seq>
+          </p:childTnLst>
+        </p:cTn>
+      </p:par>
+    </p:tnLst>
+    <p:bldLst>
+      <p:bldP spid="3" grpId="0" build="p"/>
+      <p:bldP spid="5" grpId="0"/>
+      <p:bldP spid="6" grpId="0"/>
+    </p:bldLst>
+  </p:timing>
+</p:sld>
+</file>
+
+<file path=ppt/slides/slide5.xml><?xml version="1.0" encoding="utf-8"?>
 <p:sld xmlns:a="http://schemas.openxmlformats.org/drawingml/2006/main" xmlns:r="http://schemas.openxmlformats.org/officeDocument/2006/relationships" xmlns:p="http://schemas.openxmlformats.org/presentationml/2006/main">
   <p:cSld>
     <p:spTree>
@@ -12777,7 +15118,7 @@
 </p:sld>
 </file>
 
-<file path=ppt/slides/slide5.xml><?xml version="1.0" encoding="utf-8"?>
+<file path=ppt/slides/slide6.xml><?xml version="1.0" encoding="utf-8"?>
 <p:sld xmlns:a="http://schemas.openxmlformats.org/drawingml/2006/main" xmlns:r="http://schemas.openxmlformats.org/officeDocument/2006/relationships" xmlns:p="http://schemas.openxmlformats.org/presentationml/2006/main">
   <p:cSld>
     <p:spTree>
@@ -13391,7 +15732,7 @@
 </p:sld>
 </file>
 
-<file path=ppt/slides/slide6.xml><?xml version="1.0" encoding="utf-8"?>
+<file path=ppt/slides/slide7.xml><?xml version="1.0" encoding="utf-8"?>
 <p:sld xmlns:a="http://schemas.openxmlformats.org/drawingml/2006/main" xmlns:r="http://schemas.openxmlformats.org/officeDocument/2006/relationships" xmlns:p="http://schemas.openxmlformats.org/presentationml/2006/main">
   <p:cSld>
     <p:spTree>
@@ -14483,7 +16824,7 @@
 </p:sld>
 </file>
 
-<file path=ppt/slides/slide7.xml><?xml version="1.0" encoding="utf-8"?>
+<file path=ppt/slides/slide8.xml><?xml version="1.0" encoding="utf-8"?>
 <p:sld xmlns:a="http://schemas.openxmlformats.org/drawingml/2006/main" xmlns:r="http://schemas.openxmlformats.org/officeDocument/2006/relationships" xmlns:p="http://schemas.openxmlformats.org/presentationml/2006/main">
   <p:cSld>
     <p:spTree>
@@ -15113,69 +17454,6 @@
 </p:sld>
 </file>
 
-<file path=ppt/slides/slide8.xml><?xml version="1.0" encoding="utf-8"?>
-<p:sld xmlns:a="http://schemas.openxmlformats.org/drawingml/2006/main" xmlns:r="http://schemas.openxmlformats.org/officeDocument/2006/relationships" xmlns:p="http://schemas.openxmlformats.org/presentationml/2006/main">
-  <p:cSld>
-    <p:spTree>
-      <p:nvGrpSpPr>
-        <p:cNvPr id="1" name=""/>
-        <p:cNvGrpSpPr/>
-        <p:nvPr/>
-      </p:nvGrpSpPr>
-      <p:grpSpPr>
-        <a:xfrm>
-          <a:off x="0" y="0"/>
-          <a:ext cx="0" cy="0"/>
-          <a:chOff x="0" y="0"/>
-          <a:chExt cx="0" cy="0"/>
-        </a:xfrm>
-      </p:grpSpPr>
-      <p:sp>
-        <p:nvSpPr>
-          <p:cNvPr id="2" name="Title 1">
-            <a:extLst>
-              <a:ext uri="{FF2B5EF4-FFF2-40B4-BE49-F238E27FC236}">
-                <a16:creationId xmlns:a16="http://schemas.microsoft.com/office/drawing/2014/main" id="{516C00E3-171A-4EE7-8490-2C2AB0355C35}"/>
-              </a:ext>
-            </a:extLst>
-          </p:cNvPr>
-          <p:cNvSpPr>
-            <a:spLocks noGrp="1"/>
-          </p:cNvSpPr>
-          <p:nvPr>
-            <p:ph type="title"/>
-          </p:nvPr>
-        </p:nvSpPr>
-        <p:spPr>
-          <a:xfrm>
-            <a:off x="4592333" y="2578842"/>
-            <a:ext cx="2622658" cy="1478570"/>
-          </a:xfrm>
-        </p:spPr>
-        <p:txBody>
-          <a:bodyPr/>
-          <a:lstStyle/>
-          <a:p>
-            <a:r>
-              <a:rPr lang="en-US" dirty="0"/>
-              <a:t>Questions?</a:t>
-            </a:r>
-          </a:p>
-        </p:txBody>
-      </p:sp>
-    </p:spTree>
-    <p:extLst>
-      <p:ext uri="{BB962C8B-B14F-4D97-AF65-F5344CB8AC3E}">
-        <p14:creationId xmlns:p14="http://schemas.microsoft.com/office/powerpoint/2010/main" val="2815773771"/>
-      </p:ext>
-    </p:extLst>
-  </p:cSld>
-  <p:clrMapOvr>
-    <a:masterClrMapping/>
-  </p:clrMapOvr>
-</p:sld>
-</file>
-
 <file path=ppt/slides/slide9.xml><?xml version="1.0" encoding="utf-8"?>
 <p:sld xmlns:a="http://schemas.openxmlformats.org/drawingml/2006/main" xmlns:r="http://schemas.openxmlformats.org/officeDocument/2006/relationships" xmlns:p="http://schemas.openxmlformats.org/presentationml/2006/main">
   <p:cSld>
@@ -15198,7 +17476,7 @@
           <p:cNvPr id="2" name="Title 1">
             <a:extLst>
               <a:ext uri="{FF2B5EF4-FFF2-40B4-BE49-F238E27FC236}">
-                <a16:creationId xmlns:a16="http://schemas.microsoft.com/office/drawing/2014/main" id="{66694C7E-1320-487B-8226-EE0FA90ED676}"/>
+                <a16:creationId xmlns:a16="http://schemas.microsoft.com/office/drawing/2014/main" id="{789CFA96-BE11-4606-B9F1-5E572D208C16}"/>
               </a:ext>
             </a:extLst>
           </p:cNvPr>
@@ -15216,7 +17494,7 @@
           <a:p>
             <a:r>
               <a:rPr lang="en-US" dirty="0"/>
-              <a:t>Resources</a:t>
+              <a:t>.NET Core windows compatibility pack</a:t>
             </a:r>
           </a:p>
         </p:txBody>
@@ -15226,7 +17504,7 @@
           <p:cNvPr id="3" name="Content Placeholder 2">
             <a:extLst>
               <a:ext uri="{FF2B5EF4-FFF2-40B4-BE49-F238E27FC236}">
-                <a16:creationId xmlns:a16="http://schemas.microsoft.com/office/drawing/2014/main" id="{D32D2827-855E-4AFF-8D0A-26F07B67E2CD}"/>
+                <a16:creationId xmlns:a16="http://schemas.microsoft.com/office/drawing/2014/main" id="{B69CDE4E-F672-4A83-B661-542BDA1D1156}"/>
               </a:ext>
             </a:extLst>
           </p:cNvPr>
@@ -15239,48 +17517,230 @@
         </p:nvSpPr>
         <p:spPr>
           <a:xfrm>
-            <a:off x="1141412" y="1591645"/>
-            <a:ext cx="9905999" cy="3541714"/>
+            <a:off x="1141413" y="1792287"/>
+            <a:ext cx="9905999" cy="601778"/>
           </a:xfrm>
         </p:spPr>
         <p:txBody>
-          <a:bodyPr/>
+          <a:bodyPr>
+            <a:normAutofit/>
+          </a:bodyPr>
           <a:lstStyle/>
           <a:p>
             <a:r>
+              <a:rPr lang="en-US" sz="1800" dirty="0"/>
+              <a:t>20,000+ APIs now available (</a:t>
+            </a:r>
+            <a:r>
+              <a:rPr lang="en-US" sz="1800" dirty="0" err="1"/>
+              <a:t>System.Drawing</a:t>
+            </a:r>
+            <a:r>
+              <a:rPr lang="en-US" sz="1800" dirty="0"/>
+              <a:t>, </a:t>
+            </a:r>
+            <a:r>
+              <a:rPr lang="en-US" sz="1800" dirty="0" err="1"/>
+              <a:t>System.Management</a:t>
+            </a:r>
+            <a:r>
+              <a:rPr lang="en-US" sz="1800" dirty="0"/>
+              <a:t> etc.)</a:t>
+            </a:r>
+          </a:p>
+          <a:p>
+            <a:pPr marL="0" indent="0">
+              <a:buNone/>
+            </a:pPr>
+            <a:endParaRPr lang="en-US" sz="1800" dirty="0"/>
+          </a:p>
+          <a:p>
+            <a:pPr marL="0" indent="0">
+              <a:buNone/>
+            </a:pPr>
+            <a:endParaRPr lang="en-US" sz="1800" dirty="0"/>
+          </a:p>
+        </p:txBody>
+      </p:sp>
+      <p:sp>
+        <p:nvSpPr>
+          <p:cNvPr id="4" name="TextBox 3">
+            <a:extLst>
+              <a:ext uri="{FF2B5EF4-FFF2-40B4-BE49-F238E27FC236}">
+                <a16:creationId xmlns:a16="http://schemas.microsoft.com/office/drawing/2014/main" id="{65EAE699-A252-4455-A055-E0AECC61A480}"/>
+              </a:ext>
+            </a:extLst>
+          </p:cNvPr>
+          <p:cNvSpPr txBox="1"/>
+          <p:nvPr/>
+        </p:nvSpPr>
+        <p:spPr>
+          <a:xfrm>
+            <a:off x="1141413" y="2394065"/>
+            <a:ext cx="7925503" cy="1477328"/>
+          </a:xfrm>
+          <a:prstGeom prst="rect">
+            <a:avLst/>
+          </a:prstGeom>
+          <a:noFill/>
+        </p:spPr>
+        <p:txBody>
+          <a:bodyPr wrap="none" rtlCol="0">
+            <a:spAutoFit/>
+          </a:bodyPr>
+          <a:lstStyle/>
+          <a:p>
+            <a:r>
               <a:rPr lang="en-US" dirty="0"/>
-              <a:t>PowerPoint and Sample Source Code</a:t>
-            </a:r>
-          </a:p>
-          <a:p>
-            <a:pPr lvl="1"/>
-            <a:r>
-              <a:rPr lang="en-US" dirty="0">
-                <a:hlinkClick r:id="rId2"/>
-              </a:rPr>
-              <a:t>https://github.com/jcapellman/Presentations</a:t>
-            </a:r>
-            <a:endParaRPr lang="en-US" dirty="0"/>
-          </a:p>
-          <a:p>
-            <a:pPr lvl="1"/>
-            <a:endParaRPr lang="en-US" dirty="0"/>
-          </a:p>
-          <a:p>
-            <a:endParaRPr lang="en-US" dirty="0"/>
+              <a:t>if (</a:t>
+            </a:r>
+            <a:r>
+              <a:rPr lang="en-US" dirty="0" err="1"/>
+              <a:t>RuntimeInformation.IsOSPlatform</a:t>
+            </a:r>
+            <a:r>
+              <a:rPr lang="en-US" dirty="0"/>
+              <a:t>(</a:t>
+            </a:r>
+            <a:r>
+              <a:rPr lang="en-US" dirty="0" err="1"/>
+              <a:t>OSPlatform.Windows</a:t>
+            </a:r>
+            <a:r>
+              <a:rPr lang="en-US" dirty="0"/>
+              <a:t>)) {</a:t>
+            </a:r>
+          </a:p>
+          <a:p>
+            <a:r>
+              <a:rPr lang="en-US" dirty="0"/>
+              <a:t>   using (var key = </a:t>
+            </a:r>
+            <a:r>
+              <a:rPr lang="en-US" dirty="0" err="1"/>
+              <a:t>Registry.CurrentUser.OpenSubKey</a:t>
+            </a:r>
+            <a:r>
+              <a:rPr lang="en-US" dirty="0"/>
+              <a:t>(@"Software\Awesomeness")) {</a:t>
+            </a:r>
+          </a:p>
+          <a:p>
+            <a:r>
+              <a:rPr lang="en-US" dirty="0"/>
+              <a:t>      // …</a:t>
+            </a:r>
+          </a:p>
+          <a:p>
+            <a:r>
+              <a:rPr lang="en-US" dirty="0"/>
+              <a:t>   }</a:t>
+            </a:r>
+          </a:p>
+          <a:p>
+            <a:r>
+              <a:rPr lang="en-US" dirty="0"/>
+              <a:t>}</a:t>
+            </a:r>
           </a:p>
         </p:txBody>
       </p:sp>
     </p:spTree>
     <p:extLst>
       <p:ext uri="{BB962C8B-B14F-4D97-AF65-F5344CB8AC3E}">
-        <p14:creationId xmlns:p14="http://schemas.microsoft.com/office/powerpoint/2010/main" val="378910343"/>
+        <p14:creationId xmlns:p14="http://schemas.microsoft.com/office/powerpoint/2010/main" val="3811043102"/>
       </p:ext>
     </p:extLst>
   </p:cSld>
   <p:clrMapOvr>
     <a:masterClrMapping/>
   </p:clrMapOvr>
+  <p:timing>
+    <p:tnLst>
+      <p:par>
+        <p:cTn id="1" dur="indefinite" restart="never" nodeType="tmRoot">
+          <p:childTnLst>
+            <p:seq concurrent="1" nextAc="seek">
+              <p:cTn id="2" dur="indefinite" nodeType="mainSeq">
+                <p:childTnLst>
+                  <p:par>
+                    <p:cTn id="3" fill="hold">
+                      <p:stCondLst>
+                        <p:cond delay="indefinite"/>
+                      </p:stCondLst>
+                      <p:childTnLst>
+                        <p:par>
+                          <p:cTn id="4" fill="hold">
+                            <p:stCondLst>
+                              <p:cond delay="0"/>
+                            </p:stCondLst>
+                            <p:childTnLst>
+                              <p:par>
+                                <p:cTn id="5" presetID="10" presetClass="entr" presetSubtype="0" fill="hold" grpId="0" nodeType="clickEffect">
+                                  <p:stCondLst>
+                                    <p:cond delay="0"/>
+                                  </p:stCondLst>
+                                  <p:childTnLst>
+                                    <p:set>
+                                      <p:cBhvr>
+                                        <p:cTn id="6" dur="1" fill="hold">
+                                          <p:stCondLst>
+                                            <p:cond delay="0"/>
+                                          </p:stCondLst>
+                                        </p:cTn>
+                                        <p:tgtEl>
+                                          <p:spTgt spid="4"/>
+                                        </p:tgtEl>
+                                        <p:attrNameLst>
+                                          <p:attrName>style.visibility</p:attrName>
+                                        </p:attrNameLst>
+                                      </p:cBhvr>
+                                      <p:to>
+                                        <p:strVal val="visible"/>
+                                      </p:to>
+                                    </p:set>
+                                    <p:animEffect transition="in" filter="fade">
+                                      <p:cBhvr>
+                                        <p:cTn id="7" dur="500"/>
+                                        <p:tgtEl>
+                                          <p:spTgt spid="4"/>
+                                        </p:tgtEl>
+                                      </p:cBhvr>
+                                    </p:animEffect>
+                                  </p:childTnLst>
+                                </p:cTn>
+                              </p:par>
+                            </p:childTnLst>
+                          </p:cTn>
+                        </p:par>
+                      </p:childTnLst>
+                    </p:cTn>
+                  </p:par>
+                </p:childTnLst>
+              </p:cTn>
+              <p:prevCondLst>
+                <p:cond evt="onPrev" delay="0">
+                  <p:tgtEl>
+                    <p:sldTgt/>
+                  </p:tgtEl>
+                </p:cond>
+              </p:prevCondLst>
+              <p:nextCondLst>
+                <p:cond evt="onNext" delay="0">
+                  <p:tgtEl>
+                    <p:sldTgt/>
+                  </p:tgtEl>
+                </p:cond>
+              </p:nextCondLst>
+            </p:seq>
+          </p:childTnLst>
+        </p:cTn>
+      </p:par>
+    </p:tnLst>
+    <p:bldLst>
+      <p:bldP spid="4" grpId="0"/>
+    </p:bldLst>
+  </p:timing>
 </p:sld>
 </file>
 
@@ -15533,4 +17993,299 @@
     </a:ext>
   </a:extLst>
 </a:theme>
+</file>
+
+<file path=ppt/theme/theme2.xml><?xml version="1.0" encoding="utf-8"?>
+<a:theme xmlns:a="http://schemas.openxmlformats.org/drawingml/2006/main" name="Office Theme">
+  <a:themeElements>
+    <a:clrScheme name="Office">
+      <a:dk1>
+        <a:sysClr val="windowText" lastClr="000000"/>
+      </a:dk1>
+      <a:lt1>
+        <a:sysClr val="window" lastClr="FFFFFF"/>
+      </a:lt1>
+      <a:dk2>
+        <a:srgbClr val="44546A"/>
+      </a:dk2>
+      <a:lt2>
+        <a:srgbClr val="E7E6E6"/>
+      </a:lt2>
+      <a:accent1>
+        <a:srgbClr val="4472C4"/>
+      </a:accent1>
+      <a:accent2>
+        <a:srgbClr val="ED7D31"/>
+      </a:accent2>
+      <a:accent3>
+        <a:srgbClr val="A5A5A5"/>
+      </a:accent3>
+      <a:accent4>
+        <a:srgbClr val="FFC000"/>
+      </a:accent4>
+      <a:accent5>
+        <a:srgbClr val="5B9BD5"/>
+      </a:accent5>
+      <a:accent6>
+        <a:srgbClr val="70AD47"/>
+      </a:accent6>
+      <a:hlink>
+        <a:srgbClr val="0563C1"/>
+      </a:hlink>
+      <a:folHlink>
+        <a:srgbClr val="954F72"/>
+      </a:folHlink>
+    </a:clrScheme>
+    <a:fontScheme name="Office">
+      <a:majorFont>
+        <a:latin typeface="Calibri Light" panose="020F0302020204030204"/>
+        <a:ea typeface=""/>
+        <a:cs typeface=""/>
+        <a:font script="Jpan" typeface="游ゴシック Light"/>
+        <a:font script="Hang" typeface="맑은 고딕"/>
+        <a:font script="Hans" typeface="等线 Light"/>
+        <a:font script="Hant" typeface="新細明體"/>
+        <a:font script="Arab" typeface="Times New Roman"/>
+        <a:font script="Hebr" typeface="Times New Roman"/>
+        <a:font script="Thai" typeface="Angsana New"/>
+        <a:font script="Ethi" typeface="Nyala"/>
+        <a:font script="Beng" typeface="Vrinda"/>
+        <a:font script="Gujr" typeface="Shruti"/>
+        <a:font script="Khmr" typeface="MoolBoran"/>
+        <a:font script="Knda" typeface="Tunga"/>
+        <a:font script="Guru" typeface="Raavi"/>
+        <a:font script="Cans" typeface="Euphemia"/>
+        <a:font script="Cher" typeface="Plantagenet Cherokee"/>
+        <a:font script="Yiii" typeface="Microsoft Yi Baiti"/>
+        <a:font script="Tibt" typeface="Microsoft Himalaya"/>
+        <a:font script="Thaa" typeface="MV Boli"/>
+        <a:font script="Deva" typeface="Mangal"/>
+        <a:font script="Telu" typeface="Gautami"/>
+        <a:font script="Taml" typeface="Latha"/>
+        <a:font script="Syrc" typeface="Estrangelo Edessa"/>
+        <a:font script="Orya" typeface="Kalinga"/>
+        <a:font script="Mlym" typeface="Kartika"/>
+        <a:font script="Laoo" typeface="DokChampa"/>
+        <a:font script="Sinh" typeface="Iskoola Pota"/>
+        <a:font script="Mong" typeface="Mongolian Baiti"/>
+        <a:font script="Viet" typeface="Times New Roman"/>
+        <a:font script="Uigh" typeface="Microsoft Uighur"/>
+        <a:font script="Geor" typeface="Sylfaen"/>
+        <a:font script="Armn" typeface="Arial"/>
+        <a:font script="Bugi" typeface="Leelawadee UI"/>
+        <a:font script="Bopo" typeface="Microsoft JhengHei"/>
+        <a:font script="Java" typeface="Javanese Text"/>
+        <a:font script="Lisu" typeface="Segoe UI"/>
+        <a:font script="Mymr" typeface="Myanmar Text"/>
+        <a:font script="Nkoo" typeface="Ebrima"/>
+        <a:font script="Olck" typeface="Nirmala UI"/>
+        <a:font script="Osma" typeface="Ebrima"/>
+        <a:font script="Phag" typeface="Phagspa"/>
+        <a:font script="Syrn" typeface="Estrangelo Edessa"/>
+        <a:font script="Syrj" typeface="Estrangelo Edessa"/>
+        <a:font script="Syre" typeface="Estrangelo Edessa"/>
+        <a:font script="Sora" typeface="Nirmala UI"/>
+        <a:font script="Tale" typeface="Microsoft Tai Le"/>
+        <a:font script="Talu" typeface="Microsoft New Tai Lue"/>
+        <a:font script="Tfng" typeface="Ebrima"/>
+      </a:majorFont>
+      <a:minorFont>
+        <a:latin typeface="Calibri" panose="020F0502020204030204"/>
+        <a:ea typeface=""/>
+        <a:cs typeface=""/>
+        <a:font script="Jpan" typeface="游ゴシック"/>
+        <a:font script="Hang" typeface="맑은 고딕"/>
+        <a:font script="Hans" typeface="等线"/>
+        <a:font script="Hant" typeface="新細明體"/>
+        <a:font script="Arab" typeface="Arial"/>
+        <a:font script="Hebr" typeface="Arial"/>
+        <a:font script="Thai" typeface="Cordia New"/>
+        <a:font script="Ethi" typeface="Nyala"/>
+        <a:font script="Beng" typeface="Vrinda"/>
+        <a:font script="Gujr" typeface="Shruti"/>
+        <a:font script="Khmr" typeface="DaunPenh"/>
+        <a:font script="Knda" typeface="Tunga"/>
+        <a:font script="Guru" typeface="Raavi"/>
+        <a:font script="Cans" typeface="Euphemia"/>
+        <a:font script="Cher" typeface="Plantagenet Cherokee"/>
+        <a:font script="Yiii" typeface="Microsoft Yi Baiti"/>
+        <a:font script="Tibt" typeface="Microsoft Himalaya"/>
+        <a:font script="Thaa" typeface="MV Boli"/>
+        <a:font script="Deva" typeface="Mangal"/>
+        <a:font script="Telu" typeface="Gautami"/>
+        <a:font script="Taml" typeface="Latha"/>
+        <a:font script="Syrc" typeface="Estrangelo Edessa"/>
+        <a:font script="Orya" typeface="Kalinga"/>
+        <a:font script="Mlym" typeface="Kartika"/>
+        <a:font script="Laoo" typeface="DokChampa"/>
+        <a:font script="Sinh" typeface="Iskoola Pota"/>
+        <a:font script="Mong" typeface="Mongolian Baiti"/>
+        <a:font script="Viet" typeface="Arial"/>
+        <a:font script="Uigh" typeface="Microsoft Uighur"/>
+        <a:font script="Geor" typeface="Sylfaen"/>
+        <a:font script="Armn" typeface="Arial"/>
+        <a:font script="Bugi" typeface="Leelawadee UI"/>
+        <a:font script="Bopo" typeface="Microsoft JhengHei"/>
+        <a:font script="Java" typeface="Javanese Text"/>
+        <a:font script="Lisu" typeface="Segoe UI"/>
+        <a:font script="Mymr" typeface="Myanmar Text"/>
+        <a:font script="Nkoo" typeface="Ebrima"/>
+        <a:font script="Olck" typeface="Nirmala UI"/>
+        <a:font script="Osma" typeface="Ebrima"/>
+        <a:font script="Phag" typeface="Phagspa"/>
+        <a:font script="Syrn" typeface="Estrangelo Edessa"/>
+        <a:font script="Syrj" typeface="Estrangelo Edessa"/>
+        <a:font script="Syre" typeface="Estrangelo Edessa"/>
+        <a:font script="Sora" typeface="Nirmala UI"/>
+        <a:font script="Tale" typeface="Microsoft Tai Le"/>
+        <a:font script="Talu" typeface="Microsoft New Tai Lue"/>
+        <a:font script="Tfng" typeface="Ebrima"/>
+      </a:minorFont>
+    </a:fontScheme>
+    <a:fmtScheme name="Office">
+      <a:fillStyleLst>
+        <a:solidFill>
+          <a:schemeClr val="phClr"/>
+        </a:solidFill>
+        <a:gradFill rotWithShape="1">
+          <a:gsLst>
+            <a:gs pos="0">
+              <a:schemeClr val="phClr">
+                <a:lumMod val="110000"/>
+                <a:satMod val="105000"/>
+                <a:tint val="67000"/>
+              </a:schemeClr>
+            </a:gs>
+            <a:gs pos="50000">
+              <a:schemeClr val="phClr">
+                <a:lumMod val="105000"/>
+                <a:satMod val="103000"/>
+                <a:tint val="73000"/>
+              </a:schemeClr>
+            </a:gs>
+            <a:gs pos="100000">
+              <a:schemeClr val="phClr">
+                <a:lumMod val="105000"/>
+                <a:satMod val="109000"/>
+                <a:tint val="81000"/>
+              </a:schemeClr>
+            </a:gs>
+          </a:gsLst>
+          <a:lin ang="5400000" scaled="0"/>
+        </a:gradFill>
+        <a:gradFill rotWithShape="1">
+          <a:gsLst>
+            <a:gs pos="0">
+              <a:schemeClr val="phClr">
+                <a:satMod val="103000"/>
+                <a:lumMod val="102000"/>
+                <a:tint val="94000"/>
+              </a:schemeClr>
+            </a:gs>
+            <a:gs pos="50000">
+              <a:schemeClr val="phClr">
+                <a:satMod val="110000"/>
+                <a:lumMod val="100000"/>
+                <a:shade val="100000"/>
+              </a:schemeClr>
+            </a:gs>
+            <a:gs pos="100000">
+              <a:schemeClr val="phClr">
+                <a:lumMod val="99000"/>
+                <a:satMod val="120000"/>
+                <a:shade val="78000"/>
+              </a:schemeClr>
+            </a:gs>
+          </a:gsLst>
+          <a:lin ang="5400000" scaled="0"/>
+        </a:gradFill>
+      </a:fillStyleLst>
+      <a:lnStyleLst>
+        <a:ln w="6350" cap="flat" cmpd="sng" algn="ctr">
+          <a:solidFill>
+            <a:schemeClr val="phClr"/>
+          </a:solidFill>
+          <a:prstDash val="solid"/>
+          <a:miter lim="800000"/>
+        </a:ln>
+        <a:ln w="12700" cap="flat" cmpd="sng" algn="ctr">
+          <a:solidFill>
+            <a:schemeClr val="phClr"/>
+          </a:solidFill>
+          <a:prstDash val="solid"/>
+          <a:miter lim="800000"/>
+        </a:ln>
+        <a:ln w="19050" cap="flat" cmpd="sng" algn="ctr">
+          <a:solidFill>
+            <a:schemeClr val="phClr"/>
+          </a:solidFill>
+          <a:prstDash val="solid"/>
+          <a:miter lim="800000"/>
+        </a:ln>
+      </a:lnStyleLst>
+      <a:effectStyleLst>
+        <a:effectStyle>
+          <a:effectLst/>
+        </a:effectStyle>
+        <a:effectStyle>
+          <a:effectLst/>
+        </a:effectStyle>
+        <a:effectStyle>
+          <a:effectLst>
+            <a:outerShdw blurRad="57150" dist="19050" dir="5400000" algn="ctr" rotWithShape="0">
+              <a:srgbClr val="000000">
+                <a:alpha val="63000"/>
+              </a:srgbClr>
+            </a:outerShdw>
+          </a:effectLst>
+        </a:effectStyle>
+      </a:effectStyleLst>
+      <a:bgFillStyleLst>
+        <a:solidFill>
+          <a:schemeClr val="phClr"/>
+        </a:solidFill>
+        <a:solidFill>
+          <a:schemeClr val="phClr">
+            <a:tint val="95000"/>
+            <a:satMod val="170000"/>
+          </a:schemeClr>
+        </a:solidFill>
+        <a:gradFill rotWithShape="1">
+          <a:gsLst>
+            <a:gs pos="0">
+              <a:schemeClr val="phClr">
+                <a:tint val="93000"/>
+                <a:satMod val="150000"/>
+                <a:shade val="98000"/>
+                <a:lumMod val="102000"/>
+              </a:schemeClr>
+            </a:gs>
+            <a:gs pos="50000">
+              <a:schemeClr val="phClr">
+                <a:tint val="98000"/>
+                <a:satMod val="130000"/>
+                <a:shade val="90000"/>
+                <a:lumMod val="103000"/>
+              </a:schemeClr>
+            </a:gs>
+            <a:gs pos="100000">
+              <a:schemeClr val="phClr">
+                <a:shade val="63000"/>
+                <a:satMod val="120000"/>
+              </a:schemeClr>
+            </a:gs>
+          </a:gsLst>
+          <a:lin ang="5400000" scaled="0"/>
+        </a:gradFill>
+      </a:bgFillStyleLst>
+    </a:fmtScheme>
+  </a:themeElements>
+  <a:objectDefaults/>
+  <a:extraClrSchemeLst/>
+  <a:extLst>
+    <a:ext uri="{05A4C25C-085E-4340-85A3-A5531E510DB2}">
+      <thm15:themeFamily xmlns:thm15="http://schemas.microsoft.com/office/thememl/2012/main" name="Office Theme" id="{62F939B6-93AF-4DB8-9C6B-D6C7DFDC589F}" vid="{4A3C46E8-61CC-4603-A589-7422A47A8E4A}"/>
+    </a:ext>
+  </a:extLst>
+</a:theme>
 </file>
</xml_diff>

<commit_message>
Added: Additional slides and information
</commit_message>
<xml_diff>
--- a/What is new in C Sharp  - 10.12.2018/Presentation.pptx
+++ b/What is new in C Sharp  - 10.12.2018/Presentation.pptx
@@ -5,7 +5,7 @@
     <p:sldMasterId id="2147483669" r:id="rId1"/>
   </p:sldMasterIdLst>
   <p:notesMasterIdLst>
-    <p:notesMasterId r:id="rId15"/>
+    <p:notesMasterId r:id="rId18"/>
   </p:notesMasterIdLst>
   <p:sldIdLst>
     <p:sldId id="256" r:id="rId2"/>
@@ -16,11 +16,14 @@
     <p:sldId id="257" r:id="rId7"/>
     <p:sldId id="258" r:id="rId8"/>
     <p:sldId id="268" r:id="rId9"/>
-    <p:sldId id="275" r:id="rId10"/>
-    <p:sldId id="274" r:id="rId11"/>
-    <p:sldId id="278" r:id="rId12"/>
-    <p:sldId id="260" r:id="rId13"/>
-    <p:sldId id="261" r:id="rId14"/>
+    <p:sldId id="280" r:id="rId10"/>
+    <p:sldId id="275" r:id="rId11"/>
+    <p:sldId id="274" r:id="rId12"/>
+    <p:sldId id="279" r:id="rId13"/>
+    <p:sldId id="281" r:id="rId14"/>
+    <p:sldId id="278" r:id="rId15"/>
+    <p:sldId id="260" r:id="rId16"/>
+    <p:sldId id="261" r:id="rId17"/>
   </p:sldIdLst>
   <p:sldSz cx="12192000" cy="6858000"/>
   <p:notesSz cx="6858000" cy="9144000"/>
@@ -12993,6 +12996,296 @@
           <p:cNvPr id="2" name="Title 1">
             <a:extLst>
               <a:ext uri="{FF2B5EF4-FFF2-40B4-BE49-F238E27FC236}">
+                <a16:creationId xmlns:a16="http://schemas.microsoft.com/office/drawing/2014/main" id="{789CFA96-BE11-4606-B9F1-5E572D208C16}"/>
+              </a:ext>
+            </a:extLst>
+          </p:cNvPr>
+          <p:cNvSpPr>
+            <a:spLocks noGrp="1"/>
+          </p:cNvSpPr>
+          <p:nvPr>
+            <p:ph type="title"/>
+          </p:nvPr>
+        </p:nvSpPr>
+        <p:spPr/>
+        <p:txBody>
+          <a:bodyPr/>
+          <a:lstStyle/>
+          <a:p>
+            <a:r>
+              <a:rPr lang="en-US" dirty="0"/>
+              <a:t>.NET Core windows compatibility pack</a:t>
+            </a:r>
+          </a:p>
+        </p:txBody>
+      </p:sp>
+      <p:sp>
+        <p:nvSpPr>
+          <p:cNvPr id="3" name="Content Placeholder 2">
+            <a:extLst>
+              <a:ext uri="{FF2B5EF4-FFF2-40B4-BE49-F238E27FC236}">
+                <a16:creationId xmlns:a16="http://schemas.microsoft.com/office/drawing/2014/main" id="{B69CDE4E-F672-4A83-B661-542BDA1D1156}"/>
+              </a:ext>
+            </a:extLst>
+          </p:cNvPr>
+          <p:cNvSpPr>
+            <a:spLocks noGrp="1"/>
+          </p:cNvSpPr>
+          <p:nvPr>
+            <p:ph idx="1"/>
+          </p:nvPr>
+        </p:nvSpPr>
+        <p:spPr>
+          <a:xfrm>
+            <a:off x="1141413" y="1792287"/>
+            <a:ext cx="9905999" cy="601778"/>
+          </a:xfrm>
+        </p:spPr>
+        <p:txBody>
+          <a:bodyPr>
+            <a:normAutofit/>
+          </a:bodyPr>
+          <a:lstStyle/>
+          <a:p>
+            <a:r>
+              <a:rPr lang="en-US" sz="1800" dirty="0"/>
+              <a:t>20,000+ APIs now available (</a:t>
+            </a:r>
+            <a:r>
+              <a:rPr lang="en-US" sz="1800" dirty="0" err="1"/>
+              <a:t>System.Drawing</a:t>
+            </a:r>
+            <a:r>
+              <a:rPr lang="en-US" sz="1800" dirty="0"/>
+              <a:t>, </a:t>
+            </a:r>
+            <a:r>
+              <a:rPr lang="en-US" sz="1800" dirty="0" err="1"/>
+              <a:t>System.Management</a:t>
+            </a:r>
+            <a:r>
+              <a:rPr lang="en-US" sz="1800" dirty="0"/>
+              <a:t> etc.)</a:t>
+            </a:r>
+          </a:p>
+          <a:p>
+            <a:pPr marL="0" indent="0">
+              <a:buNone/>
+            </a:pPr>
+            <a:endParaRPr lang="en-US" sz="1800" dirty="0"/>
+          </a:p>
+          <a:p>
+            <a:pPr marL="0" indent="0">
+              <a:buNone/>
+            </a:pPr>
+            <a:endParaRPr lang="en-US" sz="1800" dirty="0"/>
+          </a:p>
+        </p:txBody>
+      </p:sp>
+      <p:sp>
+        <p:nvSpPr>
+          <p:cNvPr id="4" name="TextBox 3">
+            <a:extLst>
+              <a:ext uri="{FF2B5EF4-FFF2-40B4-BE49-F238E27FC236}">
+                <a16:creationId xmlns:a16="http://schemas.microsoft.com/office/drawing/2014/main" id="{65EAE699-A252-4455-A055-E0AECC61A480}"/>
+              </a:ext>
+            </a:extLst>
+          </p:cNvPr>
+          <p:cNvSpPr txBox="1"/>
+          <p:nvPr/>
+        </p:nvSpPr>
+        <p:spPr>
+          <a:xfrm>
+            <a:off x="1141413" y="2394065"/>
+            <a:ext cx="7925503" cy="1477328"/>
+          </a:xfrm>
+          <a:prstGeom prst="rect">
+            <a:avLst/>
+          </a:prstGeom>
+          <a:noFill/>
+        </p:spPr>
+        <p:txBody>
+          <a:bodyPr wrap="none" rtlCol="0">
+            <a:spAutoFit/>
+          </a:bodyPr>
+          <a:lstStyle/>
+          <a:p>
+            <a:r>
+              <a:rPr lang="en-US" dirty="0"/>
+              <a:t>if (</a:t>
+            </a:r>
+            <a:r>
+              <a:rPr lang="en-US" dirty="0" err="1"/>
+              <a:t>RuntimeInformation.IsOSPlatform</a:t>
+            </a:r>
+            <a:r>
+              <a:rPr lang="en-US" dirty="0"/>
+              <a:t>(</a:t>
+            </a:r>
+            <a:r>
+              <a:rPr lang="en-US" dirty="0" err="1"/>
+              <a:t>OSPlatform.Windows</a:t>
+            </a:r>
+            <a:r>
+              <a:rPr lang="en-US" dirty="0"/>
+              <a:t>)) {</a:t>
+            </a:r>
+          </a:p>
+          <a:p>
+            <a:r>
+              <a:rPr lang="en-US" dirty="0"/>
+              <a:t>   using (var key = </a:t>
+            </a:r>
+            <a:r>
+              <a:rPr lang="en-US" dirty="0" err="1"/>
+              <a:t>Registry.CurrentUser.OpenSubKey</a:t>
+            </a:r>
+            <a:r>
+              <a:rPr lang="en-US" dirty="0"/>
+              <a:t>(@"Software\Awesomeness")) {</a:t>
+            </a:r>
+          </a:p>
+          <a:p>
+            <a:r>
+              <a:rPr lang="en-US" dirty="0"/>
+              <a:t>      // …</a:t>
+            </a:r>
+          </a:p>
+          <a:p>
+            <a:r>
+              <a:rPr lang="en-US" dirty="0"/>
+              <a:t>   }</a:t>
+            </a:r>
+          </a:p>
+          <a:p>
+            <a:r>
+              <a:rPr lang="en-US" dirty="0"/>
+              <a:t>}</a:t>
+            </a:r>
+          </a:p>
+        </p:txBody>
+      </p:sp>
+    </p:spTree>
+    <p:extLst>
+      <p:ext uri="{BB962C8B-B14F-4D97-AF65-F5344CB8AC3E}">
+        <p14:creationId xmlns:p14="http://schemas.microsoft.com/office/powerpoint/2010/main" val="3811043102"/>
+      </p:ext>
+    </p:extLst>
+  </p:cSld>
+  <p:clrMapOvr>
+    <a:masterClrMapping/>
+  </p:clrMapOvr>
+  <p:timing>
+    <p:tnLst>
+      <p:par>
+        <p:cTn id="1" dur="indefinite" restart="never" nodeType="tmRoot">
+          <p:childTnLst>
+            <p:seq concurrent="1" nextAc="seek">
+              <p:cTn id="2" dur="indefinite" nodeType="mainSeq">
+                <p:childTnLst>
+                  <p:par>
+                    <p:cTn id="3" fill="hold">
+                      <p:stCondLst>
+                        <p:cond delay="indefinite"/>
+                      </p:stCondLst>
+                      <p:childTnLst>
+                        <p:par>
+                          <p:cTn id="4" fill="hold">
+                            <p:stCondLst>
+                              <p:cond delay="0"/>
+                            </p:stCondLst>
+                            <p:childTnLst>
+                              <p:par>
+                                <p:cTn id="5" presetID="10" presetClass="entr" presetSubtype="0" fill="hold" grpId="0" nodeType="clickEffect">
+                                  <p:stCondLst>
+                                    <p:cond delay="0"/>
+                                  </p:stCondLst>
+                                  <p:childTnLst>
+                                    <p:set>
+                                      <p:cBhvr>
+                                        <p:cTn id="6" dur="1" fill="hold">
+                                          <p:stCondLst>
+                                            <p:cond delay="0"/>
+                                          </p:stCondLst>
+                                        </p:cTn>
+                                        <p:tgtEl>
+                                          <p:spTgt spid="4"/>
+                                        </p:tgtEl>
+                                        <p:attrNameLst>
+                                          <p:attrName>style.visibility</p:attrName>
+                                        </p:attrNameLst>
+                                      </p:cBhvr>
+                                      <p:to>
+                                        <p:strVal val="visible"/>
+                                      </p:to>
+                                    </p:set>
+                                    <p:animEffect transition="in" filter="fade">
+                                      <p:cBhvr>
+                                        <p:cTn id="7" dur="500"/>
+                                        <p:tgtEl>
+                                          <p:spTgt spid="4"/>
+                                        </p:tgtEl>
+                                      </p:cBhvr>
+                                    </p:animEffect>
+                                  </p:childTnLst>
+                                </p:cTn>
+                              </p:par>
+                            </p:childTnLst>
+                          </p:cTn>
+                        </p:par>
+                      </p:childTnLst>
+                    </p:cTn>
+                  </p:par>
+                </p:childTnLst>
+              </p:cTn>
+              <p:prevCondLst>
+                <p:cond evt="onPrev" delay="0">
+                  <p:tgtEl>
+                    <p:sldTgt/>
+                  </p:tgtEl>
+                </p:cond>
+              </p:prevCondLst>
+              <p:nextCondLst>
+                <p:cond evt="onNext" delay="0">
+                  <p:tgtEl>
+                    <p:sldTgt/>
+                  </p:tgtEl>
+                </p:cond>
+              </p:nextCondLst>
+            </p:seq>
+          </p:childTnLst>
+        </p:cTn>
+      </p:par>
+    </p:tnLst>
+    <p:bldLst>
+      <p:bldP spid="4" grpId="0"/>
+    </p:bldLst>
+  </p:timing>
+</p:sld>
+</file>
+
+<file path=ppt/slides/slide11.xml><?xml version="1.0" encoding="utf-8"?>
+<p:sld xmlns:a="http://schemas.openxmlformats.org/drawingml/2006/main" xmlns:r="http://schemas.openxmlformats.org/officeDocument/2006/relationships" xmlns:p="http://schemas.openxmlformats.org/presentationml/2006/main">
+  <p:cSld>
+    <p:spTree>
+      <p:nvGrpSpPr>
+        <p:cNvPr id="1" name=""/>
+        <p:cNvGrpSpPr/>
+        <p:nvPr/>
+      </p:nvGrpSpPr>
+      <p:grpSpPr>
+        <a:xfrm>
+          <a:off x="0" y="0"/>
+          <a:ext cx="0" cy="0"/>
+          <a:chOff x="0" y="0"/>
+          <a:chExt cx="0" cy="0"/>
+        </a:xfrm>
+      </p:grpSpPr>
+      <p:sp>
+        <p:nvSpPr>
+          <p:cNvPr id="2" name="Title 1">
+            <a:extLst>
+              <a:ext uri="{FF2B5EF4-FFF2-40B4-BE49-F238E27FC236}">
                 <a16:creationId xmlns:a16="http://schemas.microsoft.com/office/drawing/2014/main" id="{78D7BC93-D0C7-4B16-91AC-D4E9B0142459}"/>
               </a:ext>
             </a:extLst>
@@ -13074,7 +13367,1897 @@
 </p:sld>
 </file>
 
-<file path=ppt/slides/slide11.xml><?xml version="1.0" encoding="utf-8"?>
+<file path=ppt/slides/slide12.xml><?xml version="1.0" encoding="utf-8"?>
+<p:sld xmlns:a="http://schemas.openxmlformats.org/drawingml/2006/main" xmlns:r="http://schemas.openxmlformats.org/officeDocument/2006/relationships" xmlns:p="http://schemas.openxmlformats.org/presentationml/2006/main">
+  <p:cSld>
+    <p:spTree>
+      <p:nvGrpSpPr>
+        <p:cNvPr id="1" name=""/>
+        <p:cNvGrpSpPr/>
+        <p:nvPr/>
+      </p:nvGrpSpPr>
+      <p:grpSpPr>
+        <a:xfrm>
+          <a:off x="0" y="0"/>
+          <a:ext cx="0" cy="0"/>
+          <a:chOff x="0" y="0"/>
+          <a:chExt cx="0" cy="0"/>
+        </a:xfrm>
+      </p:grpSpPr>
+      <p:sp>
+        <p:nvSpPr>
+          <p:cNvPr id="2" name="Title 1">
+            <a:extLst>
+              <a:ext uri="{FF2B5EF4-FFF2-40B4-BE49-F238E27FC236}">
+                <a16:creationId xmlns:a16="http://schemas.microsoft.com/office/drawing/2014/main" id="{E3511253-E519-4F69-8E40-7383D2CE6E3A}"/>
+              </a:ext>
+            </a:extLst>
+          </p:cNvPr>
+          <p:cNvSpPr>
+            <a:spLocks noGrp="1"/>
+          </p:cNvSpPr>
+          <p:nvPr>
+            <p:ph type="title"/>
+          </p:nvPr>
+        </p:nvSpPr>
+        <p:spPr>
+          <a:xfrm>
+            <a:off x="1126880" y="34887"/>
+            <a:ext cx="9905998" cy="1478570"/>
+          </a:xfrm>
+        </p:spPr>
+        <p:txBody>
+          <a:bodyPr/>
+          <a:lstStyle/>
+          <a:p>
+            <a:r>
+              <a:rPr lang="en-US" dirty="0"/>
+              <a:t>Razor pages</a:t>
+            </a:r>
+          </a:p>
+        </p:txBody>
+      </p:sp>
+      <p:sp>
+        <p:nvSpPr>
+          <p:cNvPr id="3" name="Content Placeholder 2">
+            <a:extLst>
+              <a:ext uri="{FF2B5EF4-FFF2-40B4-BE49-F238E27FC236}">
+                <a16:creationId xmlns:a16="http://schemas.microsoft.com/office/drawing/2014/main" id="{115855E0-EA69-4349-B2F4-F74E92FE5DC8}"/>
+              </a:ext>
+            </a:extLst>
+          </p:cNvPr>
+          <p:cNvSpPr>
+            <a:spLocks noGrp="1"/>
+          </p:cNvSpPr>
+          <p:nvPr>
+            <p:ph idx="1"/>
+          </p:nvPr>
+        </p:nvSpPr>
+        <p:spPr>
+          <a:xfrm>
+            <a:off x="1159122" y="1502345"/>
+            <a:ext cx="4438121" cy="3541714"/>
+          </a:xfrm>
+        </p:spPr>
+        <p:txBody>
+          <a:bodyPr>
+            <a:noAutofit/>
+          </a:bodyPr>
+          <a:lstStyle/>
+          <a:p>
+            <a:pPr marL="0" indent="0">
+              <a:buNone/>
+            </a:pPr>
+            <a:r>
+              <a:rPr lang="en-US" sz="1400" dirty="0"/>
+              <a:t>@page</a:t>
+            </a:r>
+          </a:p>
+          <a:p>
+            <a:pPr marL="0" indent="0">
+              <a:buNone/>
+            </a:pPr>
+            <a:r>
+              <a:rPr lang="en-US" sz="1400" dirty="0"/>
+              <a:t>@model </a:t>
+            </a:r>
+            <a:r>
+              <a:rPr lang="en-US" sz="1400" dirty="0" err="1"/>
+              <a:t>IndexModel</a:t>
+            </a:r>
+            <a:endParaRPr lang="en-US" sz="1400" dirty="0"/>
+          </a:p>
+          <a:p>
+            <a:pPr marL="0" indent="0">
+              <a:buNone/>
+            </a:pPr>
+            <a:r>
+              <a:rPr lang="en-US" sz="1400" dirty="0"/>
+              <a:t>@inject </a:t>
+            </a:r>
+            <a:r>
+              <a:rPr lang="en-US" sz="1400" dirty="0" err="1"/>
+              <a:t>IStorageDatabase</a:t>
+            </a:r>
+            <a:r>
+              <a:rPr lang="en-US" sz="1400" dirty="0"/>
+              <a:t> Database;</a:t>
+            </a:r>
+          </a:p>
+          <a:p>
+            <a:pPr marL="0" indent="0">
+              <a:buNone/>
+            </a:pPr>
+            <a:r>
+              <a:rPr lang="en-US" sz="1400" dirty="0"/>
+              <a:t>@inject </a:t>
+            </a:r>
+            <a:r>
+              <a:rPr lang="en-US" sz="1400" dirty="0" err="1"/>
+              <a:t>IQueue</a:t>
+            </a:r>
+            <a:r>
+              <a:rPr lang="en-US" sz="1400" dirty="0"/>
+              <a:t> Queue;</a:t>
+            </a:r>
+          </a:p>
+          <a:p>
+            <a:pPr marL="0" indent="0">
+              <a:buNone/>
+            </a:pPr>
+            <a:endParaRPr lang="en-US" sz="1400" dirty="0"/>
+          </a:p>
+          <a:p>
+            <a:pPr marL="0" indent="0">
+              <a:buNone/>
+            </a:pPr>
+            <a:r>
+              <a:rPr lang="en-US" sz="1400" dirty="0"/>
+              <a:t>&lt;h2&gt;Server Status&lt;/h2&gt;</a:t>
+            </a:r>
+          </a:p>
+          <a:p>
+            <a:pPr marL="0" indent="0">
+              <a:buNone/>
+            </a:pPr>
+            <a:endParaRPr lang="en-US" sz="1400" dirty="0"/>
+          </a:p>
+          <a:p>
+            <a:pPr marL="0" indent="0">
+              <a:buNone/>
+            </a:pPr>
+            <a:r>
+              <a:rPr lang="en-US" sz="1400" dirty="0"/>
+              <a:t>&lt;h3&gt;@</a:t>
+            </a:r>
+            <a:r>
+              <a:rPr lang="en-US" sz="1400" dirty="0" err="1"/>
+              <a:t>Database.Name</a:t>
+            </a:r>
+            <a:r>
+              <a:rPr lang="en-US" sz="1400" dirty="0"/>
+              <a:t> (Database) Status&lt;/h3&gt;</a:t>
+            </a:r>
+          </a:p>
+          <a:p>
+            <a:pPr marL="0" indent="0">
+              <a:buNone/>
+            </a:pPr>
+            <a:r>
+              <a:rPr lang="nl-NL" sz="1400" dirty="0"/>
+              <a:t>&lt;p&gt;Is Online: @Database.IsOnline()&lt;/p&gt;</a:t>
+            </a:r>
+          </a:p>
+          <a:p>
+            <a:pPr marL="0" indent="0">
+              <a:buNone/>
+            </a:pPr>
+            <a:endParaRPr lang="en-US" sz="1400" dirty="0"/>
+          </a:p>
+          <a:p>
+            <a:pPr marL="0" indent="0">
+              <a:buNone/>
+            </a:pPr>
+            <a:r>
+              <a:rPr lang="pt-BR" sz="1400" dirty="0"/>
+              <a:t>&lt;h3&gt;@Queue.Name (Queue) Status&lt;/h3&gt;</a:t>
+            </a:r>
+          </a:p>
+          <a:p>
+            <a:pPr marL="0" indent="0">
+              <a:buNone/>
+            </a:pPr>
+            <a:r>
+              <a:rPr lang="nl-NL" sz="1400" dirty="0"/>
+              <a:t>&lt;p&gt;Is Online: @Queue.IsOnline()&lt;/p&gt;</a:t>
+            </a:r>
+            <a:endParaRPr lang="en-US" sz="1400" dirty="0"/>
+          </a:p>
+        </p:txBody>
+      </p:sp>
+      <p:sp>
+        <p:nvSpPr>
+          <p:cNvPr id="4" name="TextBox 3">
+            <a:extLst>
+              <a:ext uri="{FF2B5EF4-FFF2-40B4-BE49-F238E27FC236}">
+                <a16:creationId xmlns:a16="http://schemas.microsoft.com/office/drawing/2014/main" id="{02404579-82B6-4127-838A-EC527A2D5499}"/>
+              </a:ext>
+            </a:extLst>
+          </p:cNvPr>
+          <p:cNvSpPr txBox="1"/>
+          <p:nvPr/>
+        </p:nvSpPr>
+        <p:spPr>
+          <a:xfrm>
+            <a:off x="1159122" y="1036975"/>
+            <a:ext cx="3830318" cy="369332"/>
+          </a:xfrm>
+          <a:prstGeom prst="rect">
+            <a:avLst/>
+          </a:prstGeom>
+          <a:noFill/>
+        </p:spPr>
+        <p:txBody>
+          <a:bodyPr wrap="square" rtlCol="0">
+            <a:spAutoFit/>
+          </a:bodyPr>
+          <a:lstStyle/>
+          <a:p>
+            <a:r>
+              <a:rPr lang="en-US" dirty="0" err="1"/>
+              <a:t>Index.cshtml</a:t>
+            </a:r>
+            <a:endParaRPr lang="en-US" dirty="0"/>
+          </a:p>
+        </p:txBody>
+      </p:sp>
+      <p:sp>
+        <p:nvSpPr>
+          <p:cNvPr id="5" name="TextBox 4">
+            <a:extLst>
+              <a:ext uri="{FF2B5EF4-FFF2-40B4-BE49-F238E27FC236}">
+                <a16:creationId xmlns:a16="http://schemas.microsoft.com/office/drawing/2014/main" id="{DE535313-E02B-48F3-AFF8-9532D7976CC9}"/>
+              </a:ext>
+            </a:extLst>
+          </p:cNvPr>
+          <p:cNvSpPr txBox="1"/>
+          <p:nvPr/>
+        </p:nvSpPr>
+        <p:spPr>
+          <a:xfrm>
+            <a:off x="6028752" y="1036975"/>
+            <a:ext cx="1489062" cy="369332"/>
+          </a:xfrm>
+          <a:prstGeom prst="rect">
+            <a:avLst/>
+          </a:prstGeom>
+          <a:noFill/>
+        </p:spPr>
+        <p:txBody>
+          <a:bodyPr wrap="none" rtlCol="0">
+            <a:spAutoFit/>
+          </a:bodyPr>
+          <a:lstStyle/>
+          <a:p>
+            <a:r>
+              <a:rPr lang="en-US" dirty="0" err="1"/>
+              <a:t>Index.cshtml.cs</a:t>
+            </a:r>
+            <a:endParaRPr lang="en-US" dirty="0"/>
+          </a:p>
+        </p:txBody>
+      </p:sp>
+      <p:sp>
+        <p:nvSpPr>
+          <p:cNvPr id="6" name="TextBox 5">
+            <a:extLst>
+              <a:ext uri="{FF2B5EF4-FFF2-40B4-BE49-F238E27FC236}">
+                <a16:creationId xmlns:a16="http://schemas.microsoft.com/office/drawing/2014/main" id="{71689863-5D84-485A-A104-A1F899D4904E}"/>
+              </a:ext>
+            </a:extLst>
+          </p:cNvPr>
+          <p:cNvSpPr txBox="1"/>
+          <p:nvPr/>
+        </p:nvSpPr>
+        <p:spPr>
+          <a:xfrm>
+            <a:off x="6028752" y="1406307"/>
+            <a:ext cx="2846805" cy="1600438"/>
+          </a:xfrm>
+          <a:prstGeom prst="rect">
+            <a:avLst/>
+          </a:prstGeom>
+          <a:noFill/>
+        </p:spPr>
+        <p:txBody>
+          <a:bodyPr wrap="none" rtlCol="0">
+            <a:spAutoFit/>
+          </a:bodyPr>
+          <a:lstStyle/>
+          <a:p>
+            <a:r>
+              <a:rPr lang="en-US" sz="1400" dirty="0"/>
+              <a:t>public class </a:t>
+            </a:r>
+            <a:r>
+              <a:rPr lang="en-US" sz="1400" dirty="0" err="1"/>
+              <a:t>IndexModel</a:t>
+            </a:r>
+            <a:r>
+              <a:rPr lang="en-US" sz="1400" dirty="0"/>
+              <a:t> : </a:t>
+            </a:r>
+            <a:r>
+              <a:rPr lang="en-US" sz="1400" dirty="0" err="1"/>
+              <a:t>PageModel</a:t>
+            </a:r>
+            <a:endParaRPr lang="en-US" sz="1400" dirty="0"/>
+          </a:p>
+          <a:p>
+            <a:r>
+              <a:rPr lang="en-US" sz="1400" dirty="0"/>
+              <a:t>{</a:t>
+            </a:r>
+          </a:p>
+          <a:p>
+            <a:r>
+              <a:rPr lang="en-US" sz="1400" dirty="0"/>
+              <a:t>    public void </a:t>
+            </a:r>
+            <a:r>
+              <a:rPr lang="en-US" sz="1400" dirty="0" err="1"/>
+              <a:t>OnGet</a:t>
+            </a:r>
+            <a:r>
+              <a:rPr lang="en-US" sz="1400" dirty="0"/>
+              <a:t>()</a:t>
+            </a:r>
+          </a:p>
+          <a:p>
+            <a:r>
+              <a:rPr lang="en-US" sz="1400" dirty="0"/>
+              <a:t>    {</a:t>
+            </a:r>
+          </a:p>
+          <a:p>
+            <a:r>
+              <a:rPr lang="en-US" sz="1400" dirty="0"/>
+              <a:t>        // Do stuff</a:t>
+            </a:r>
+          </a:p>
+          <a:p>
+            <a:r>
+              <a:rPr lang="en-US" sz="1400" dirty="0"/>
+              <a:t>    }</a:t>
+            </a:r>
+          </a:p>
+          <a:p>
+            <a:r>
+              <a:rPr lang="en-US" sz="1400" dirty="0"/>
+              <a:t>}</a:t>
+            </a:r>
+          </a:p>
+        </p:txBody>
+      </p:sp>
+    </p:spTree>
+    <p:extLst>
+      <p:ext uri="{BB962C8B-B14F-4D97-AF65-F5344CB8AC3E}">
+        <p14:creationId xmlns:p14="http://schemas.microsoft.com/office/powerpoint/2010/main" val="3721618910"/>
+      </p:ext>
+    </p:extLst>
+  </p:cSld>
+  <p:clrMapOvr>
+    <a:masterClrMapping/>
+  </p:clrMapOvr>
+  <p:timing>
+    <p:tnLst>
+      <p:par>
+        <p:cTn id="1" dur="indefinite" restart="never" nodeType="tmRoot">
+          <p:childTnLst>
+            <p:seq concurrent="1" nextAc="seek">
+              <p:cTn id="2" dur="indefinite" nodeType="mainSeq">
+                <p:childTnLst>
+                  <p:par>
+                    <p:cTn id="3" fill="hold">
+                      <p:stCondLst>
+                        <p:cond delay="indefinite"/>
+                      </p:stCondLst>
+                      <p:childTnLst>
+                        <p:par>
+                          <p:cTn id="4" fill="hold">
+                            <p:stCondLst>
+                              <p:cond delay="0"/>
+                            </p:stCondLst>
+                            <p:childTnLst>
+                              <p:par>
+                                <p:cTn id="5" presetID="10" presetClass="entr" presetSubtype="0" fill="hold" grpId="0" nodeType="clickEffect">
+                                  <p:stCondLst>
+                                    <p:cond delay="0"/>
+                                  </p:stCondLst>
+                                  <p:childTnLst>
+                                    <p:set>
+                                      <p:cBhvr>
+                                        <p:cTn id="6" dur="1" fill="hold">
+                                          <p:stCondLst>
+                                            <p:cond delay="0"/>
+                                          </p:stCondLst>
+                                        </p:cTn>
+                                        <p:tgtEl>
+                                          <p:spTgt spid="4"/>
+                                        </p:tgtEl>
+                                        <p:attrNameLst>
+                                          <p:attrName>style.visibility</p:attrName>
+                                        </p:attrNameLst>
+                                      </p:cBhvr>
+                                      <p:to>
+                                        <p:strVal val="visible"/>
+                                      </p:to>
+                                    </p:set>
+                                    <p:animEffect transition="in" filter="fade">
+                                      <p:cBhvr>
+                                        <p:cTn id="7" dur="500"/>
+                                        <p:tgtEl>
+                                          <p:spTgt spid="4"/>
+                                        </p:tgtEl>
+                                      </p:cBhvr>
+                                    </p:animEffect>
+                                  </p:childTnLst>
+                                </p:cTn>
+                              </p:par>
+                            </p:childTnLst>
+                          </p:cTn>
+                        </p:par>
+                      </p:childTnLst>
+                    </p:cTn>
+                  </p:par>
+                  <p:par>
+                    <p:cTn id="8" fill="hold">
+                      <p:stCondLst>
+                        <p:cond delay="indefinite"/>
+                      </p:stCondLst>
+                      <p:childTnLst>
+                        <p:par>
+                          <p:cTn id="9" fill="hold">
+                            <p:stCondLst>
+                              <p:cond delay="0"/>
+                            </p:stCondLst>
+                            <p:childTnLst>
+                              <p:par>
+                                <p:cTn id="10" presetID="10" presetClass="entr" presetSubtype="0" fill="hold" nodeType="clickEffect">
+                                  <p:stCondLst>
+                                    <p:cond delay="0"/>
+                                  </p:stCondLst>
+                                  <p:childTnLst>
+                                    <p:set>
+                                      <p:cBhvr>
+                                        <p:cTn id="11" dur="1" fill="hold">
+                                          <p:stCondLst>
+                                            <p:cond delay="0"/>
+                                          </p:stCondLst>
+                                        </p:cTn>
+                                        <p:tgtEl>
+                                          <p:spTgt spid="3">
+                                            <p:txEl>
+                                              <p:pRg st="2" end="2"/>
+                                            </p:txEl>
+                                          </p:spTgt>
+                                        </p:tgtEl>
+                                        <p:attrNameLst>
+                                          <p:attrName>style.visibility</p:attrName>
+                                        </p:attrNameLst>
+                                      </p:cBhvr>
+                                      <p:to>
+                                        <p:strVal val="visible"/>
+                                      </p:to>
+                                    </p:set>
+                                    <p:animEffect transition="in" filter="fade">
+                                      <p:cBhvr>
+                                        <p:cTn id="12" dur="500"/>
+                                        <p:tgtEl>
+                                          <p:spTgt spid="3">
+                                            <p:txEl>
+                                              <p:pRg st="2" end="2"/>
+                                            </p:txEl>
+                                          </p:spTgt>
+                                        </p:tgtEl>
+                                      </p:cBhvr>
+                                    </p:animEffect>
+                                  </p:childTnLst>
+                                </p:cTn>
+                              </p:par>
+                            </p:childTnLst>
+                          </p:cTn>
+                        </p:par>
+                      </p:childTnLst>
+                    </p:cTn>
+                  </p:par>
+                  <p:par>
+                    <p:cTn id="13" fill="hold">
+                      <p:stCondLst>
+                        <p:cond delay="indefinite"/>
+                      </p:stCondLst>
+                      <p:childTnLst>
+                        <p:par>
+                          <p:cTn id="14" fill="hold">
+                            <p:stCondLst>
+                              <p:cond delay="0"/>
+                            </p:stCondLst>
+                            <p:childTnLst>
+                              <p:par>
+                                <p:cTn id="15" presetID="10" presetClass="entr" presetSubtype="0" fill="hold" nodeType="clickEffect">
+                                  <p:stCondLst>
+                                    <p:cond delay="0"/>
+                                  </p:stCondLst>
+                                  <p:childTnLst>
+                                    <p:set>
+                                      <p:cBhvr>
+                                        <p:cTn id="16" dur="1" fill="hold">
+                                          <p:stCondLst>
+                                            <p:cond delay="0"/>
+                                          </p:stCondLst>
+                                        </p:cTn>
+                                        <p:tgtEl>
+                                          <p:spTgt spid="3">
+                                            <p:txEl>
+                                              <p:pRg st="0" end="0"/>
+                                            </p:txEl>
+                                          </p:spTgt>
+                                        </p:tgtEl>
+                                        <p:attrNameLst>
+                                          <p:attrName>style.visibility</p:attrName>
+                                        </p:attrNameLst>
+                                      </p:cBhvr>
+                                      <p:to>
+                                        <p:strVal val="visible"/>
+                                      </p:to>
+                                    </p:set>
+                                    <p:animEffect transition="in" filter="fade">
+                                      <p:cBhvr>
+                                        <p:cTn id="17" dur="500"/>
+                                        <p:tgtEl>
+                                          <p:spTgt spid="3">
+                                            <p:txEl>
+                                              <p:pRg st="0" end="0"/>
+                                            </p:txEl>
+                                          </p:spTgt>
+                                        </p:tgtEl>
+                                      </p:cBhvr>
+                                    </p:animEffect>
+                                  </p:childTnLst>
+                                </p:cTn>
+                              </p:par>
+                            </p:childTnLst>
+                          </p:cTn>
+                        </p:par>
+                      </p:childTnLst>
+                    </p:cTn>
+                  </p:par>
+                  <p:par>
+                    <p:cTn id="18" fill="hold">
+                      <p:stCondLst>
+                        <p:cond delay="indefinite"/>
+                      </p:stCondLst>
+                      <p:childTnLst>
+                        <p:par>
+                          <p:cTn id="19" fill="hold">
+                            <p:stCondLst>
+                              <p:cond delay="0"/>
+                            </p:stCondLst>
+                            <p:childTnLst>
+                              <p:par>
+                                <p:cTn id="20" presetID="10" presetClass="entr" presetSubtype="0" fill="hold" nodeType="clickEffect">
+                                  <p:stCondLst>
+                                    <p:cond delay="0"/>
+                                  </p:stCondLst>
+                                  <p:childTnLst>
+                                    <p:set>
+                                      <p:cBhvr>
+                                        <p:cTn id="21" dur="1" fill="hold">
+                                          <p:stCondLst>
+                                            <p:cond delay="0"/>
+                                          </p:stCondLst>
+                                        </p:cTn>
+                                        <p:tgtEl>
+                                          <p:spTgt spid="3">
+                                            <p:txEl>
+                                              <p:pRg st="1" end="1"/>
+                                            </p:txEl>
+                                          </p:spTgt>
+                                        </p:tgtEl>
+                                        <p:attrNameLst>
+                                          <p:attrName>style.visibility</p:attrName>
+                                        </p:attrNameLst>
+                                      </p:cBhvr>
+                                      <p:to>
+                                        <p:strVal val="visible"/>
+                                      </p:to>
+                                    </p:set>
+                                    <p:animEffect transition="in" filter="fade">
+                                      <p:cBhvr>
+                                        <p:cTn id="22" dur="500"/>
+                                        <p:tgtEl>
+                                          <p:spTgt spid="3">
+                                            <p:txEl>
+                                              <p:pRg st="1" end="1"/>
+                                            </p:txEl>
+                                          </p:spTgt>
+                                        </p:tgtEl>
+                                      </p:cBhvr>
+                                    </p:animEffect>
+                                  </p:childTnLst>
+                                </p:cTn>
+                              </p:par>
+                              <p:par>
+                                <p:cTn id="23" presetID="10" presetClass="entr" presetSubtype="0" fill="hold" nodeType="withEffect">
+                                  <p:stCondLst>
+                                    <p:cond delay="0"/>
+                                  </p:stCondLst>
+                                  <p:childTnLst>
+                                    <p:set>
+                                      <p:cBhvr>
+                                        <p:cTn id="24" dur="1" fill="hold">
+                                          <p:stCondLst>
+                                            <p:cond delay="0"/>
+                                          </p:stCondLst>
+                                        </p:cTn>
+                                        <p:tgtEl>
+                                          <p:spTgt spid="3">
+                                            <p:txEl>
+                                              <p:pRg st="3" end="3"/>
+                                            </p:txEl>
+                                          </p:spTgt>
+                                        </p:tgtEl>
+                                        <p:attrNameLst>
+                                          <p:attrName>style.visibility</p:attrName>
+                                        </p:attrNameLst>
+                                      </p:cBhvr>
+                                      <p:to>
+                                        <p:strVal val="visible"/>
+                                      </p:to>
+                                    </p:set>
+                                    <p:animEffect transition="in" filter="fade">
+                                      <p:cBhvr>
+                                        <p:cTn id="25" dur="500"/>
+                                        <p:tgtEl>
+                                          <p:spTgt spid="3">
+                                            <p:txEl>
+                                              <p:pRg st="3" end="3"/>
+                                            </p:txEl>
+                                          </p:spTgt>
+                                        </p:tgtEl>
+                                      </p:cBhvr>
+                                    </p:animEffect>
+                                  </p:childTnLst>
+                                </p:cTn>
+                              </p:par>
+                              <p:par>
+                                <p:cTn id="26" presetID="10" presetClass="entr" presetSubtype="0" fill="hold" nodeType="withEffect">
+                                  <p:stCondLst>
+                                    <p:cond delay="0"/>
+                                  </p:stCondLst>
+                                  <p:childTnLst>
+                                    <p:set>
+                                      <p:cBhvr>
+                                        <p:cTn id="27" dur="1" fill="hold">
+                                          <p:stCondLst>
+                                            <p:cond delay="0"/>
+                                          </p:stCondLst>
+                                        </p:cTn>
+                                        <p:tgtEl>
+                                          <p:spTgt spid="3">
+                                            <p:txEl>
+                                              <p:pRg st="5" end="5"/>
+                                            </p:txEl>
+                                          </p:spTgt>
+                                        </p:tgtEl>
+                                        <p:attrNameLst>
+                                          <p:attrName>style.visibility</p:attrName>
+                                        </p:attrNameLst>
+                                      </p:cBhvr>
+                                      <p:to>
+                                        <p:strVal val="visible"/>
+                                      </p:to>
+                                    </p:set>
+                                    <p:animEffect transition="in" filter="fade">
+                                      <p:cBhvr>
+                                        <p:cTn id="28" dur="500"/>
+                                        <p:tgtEl>
+                                          <p:spTgt spid="3">
+                                            <p:txEl>
+                                              <p:pRg st="5" end="5"/>
+                                            </p:txEl>
+                                          </p:spTgt>
+                                        </p:tgtEl>
+                                      </p:cBhvr>
+                                    </p:animEffect>
+                                  </p:childTnLst>
+                                </p:cTn>
+                              </p:par>
+                              <p:par>
+                                <p:cTn id="29" presetID="10" presetClass="entr" presetSubtype="0" fill="hold" nodeType="withEffect">
+                                  <p:stCondLst>
+                                    <p:cond delay="0"/>
+                                  </p:stCondLst>
+                                  <p:childTnLst>
+                                    <p:set>
+                                      <p:cBhvr>
+                                        <p:cTn id="30" dur="1" fill="hold">
+                                          <p:stCondLst>
+                                            <p:cond delay="0"/>
+                                          </p:stCondLst>
+                                        </p:cTn>
+                                        <p:tgtEl>
+                                          <p:spTgt spid="3">
+                                            <p:txEl>
+                                              <p:pRg st="7" end="7"/>
+                                            </p:txEl>
+                                          </p:spTgt>
+                                        </p:tgtEl>
+                                        <p:attrNameLst>
+                                          <p:attrName>style.visibility</p:attrName>
+                                        </p:attrNameLst>
+                                      </p:cBhvr>
+                                      <p:to>
+                                        <p:strVal val="visible"/>
+                                      </p:to>
+                                    </p:set>
+                                    <p:animEffect transition="in" filter="fade">
+                                      <p:cBhvr>
+                                        <p:cTn id="31" dur="500"/>
+                                        <p:tgtEl>
+                                          <p:spTgt spid="3">
+                                            <p:txEl>
+                                              <p:pRg st="7" end="7"/>
+                                            </p:txEl>
+                                          </p:spTgt>
+                                        </p:tgtEl>
+                                      </p:cBhvr>
+                                    </p:animEffect>
+                                  </p:childTnLst>
+                                </p:cTn>
+                              </p:par>
+                              <p:par>
+                                <p:cTn id="32" presetID="10" presetClass="entr" presetSubtype="0" fill="hold" nodeType="withEffect">
+                                  <p:stCondLst>
+                                    <p:cond delay="0"/>
+                                  </p:stCondLst>
+                                  <p:childTnLst>
+                                    <p:set>
+                                      <p:cBhvr>
+                                        <p:cTn id="33" dur="1" fill="hold">
+                                          <p:stCondLst>
+                                            <p:cond delay="0"/>
+                                          </p:stCondLst>
+                                        </p:cTn>
+                                        <p:tgtEl>
+                                          <p:spTgt spid="3">
+                                            <p:txEl>
+                                              <p:pRg st="8" end="8"/>
+                                            </p:txEl>
+                                          </p:spTgt>
+                                        </p:tgtEl>
+                                        <p:attrNameLst>
+                                          <p:attrName>style.visibility</p:attrName>
+                                        </p:attrNameLst>
+                                      </p:cBhvr>
+                                      <p:to>
+                                        <p:strVal val="visible"/>
+                                      </p:to>
+                                    </p:set>
+                                    <p:animEffect transition="in" filter="fade">
+                                      <p:cBhvr>
+                                        <p:cTn id="34" dur="500"/>
+                                        <p:tgtEl>
+                                          <p:spTgt spid="3">
+                                            <p:txEl>
+                                              <p:pRg st="8" end="8"/>
+                                            </p:txEl>
+                                          </p:spTgt>
+                                        </p:tgtEl>
+                                      </p:cBhvr>
+                                    </p:animEffect>
+                                  </p:childTnLst>
+                                </p:cTn>
+                              </p:par>
+                              <p:par>
+                                <p:cTn id="35" presetID="10" presetClass="entr" presetSubtype="0" fill="hold" nodeType="withEffect">
+                                  <p:stCondLst>
+                                    <p:cond delay="0"/>
+                                  </p:stCondLst>
+                                  <p:childTnLst>
+                                    <p:set>
+                                      <p:cBhvr>
+                                        <p:cTn id="36" dur="1" fill="hold">
+                                          <p:stCondLst>
+                                            <p:cond delay="0"/>
+                                          </p:stCondLst>
+                                        </p:cTn>
+                                        <p:tgtEl>
+                                          <p:spTgt spid="3">
+                                            <p:txEl>
+                                              <p:pRg st="10" end="10"/>
+                                            </p:txEl>
+                                          </p:spTgt>
+                                        </p:tgtEl>
+                                        <p:attrNameLst>
+                                          <p:attrName>style.visibility</p:attrName>
+                                        </p:attrNameLst>
+                                      </p:cBhvr>
+                                      <p:to>
+                                        <p:strVal val="visible"/>
+                                      </p:to>
+                                    </p:set>
+                                    <p:animEffect transition="in" filter="fade">
+                                      <p:cBhvr>
+                                        <p:cTn id="37" dur="500"/>
+                                        <p:tgtEl>
+                                          <p:spTgt spid="3">
+                                            <p:txEl>
+                                              <p:pRg st="10" end="10"/>
+                                            </p:txEl>
+                                          </p:spTgt>
+                                        </p:tgtEl>
+                                      </p:cBhvr>
+                                    </p:animEffect>
+                                  </p:childTnLst>
+                                </p:cTn>
+                              </p:par>
+                              <p:par>
+                                <p:cTn id="38" presetID="10" presetClass="entr" presetSubtype="0" fill="hold" nodeType="withEffect">
+                                  <p:stCondLst>
+                                    <p:cond delay="0"/>
+                                  </p:stCondLst>
+                                  <p:childTnLst>
+                                    <p:set>
+                                      <p:cBhvr>
+                                        <p:cTn id="39" dur="1" fill="hold">
+                                          <p:stCondLst>
+                                            <p:cond delay="0"/>
+                                          </p:stCondLst>
+                                        </p:cTn>
+                                        <p:tgtEl>
+                                          <p:spTgt spid="3">
+                                            <p:txEl>
+                                              <p:pRg st="11" end="11"/>
+                                            </p:txEl>
+                                          </p:spTgt>
+                                        </p:tgtEl>
+                                        <p:attrNameLst>
+                                          <p:attrName>style.visibility</p:attrName>
+                                        </p:attrNameLst>
+                                      </p:cBhvr>
+                                      <p:to>
+                                        <p:strVal val="visible"/>
+                                      </p:to>
+                                    </p:set>
+                                    <p:animEffect transition="in" filter="fade">
+                                      <p:cBhvr>
+                                        <p:cTn id="40" dur="500"/>
+                                        <p:tgtEl>
+                                          <p:spTgt spid="3">
+                                            <p:txEl>
+                                              <p:pRg st="11" end="11"/>
+                                            </p:txEl>
+                                          </p:spTgt>
+                                        </p:tgtEl>
+                                      </p:cBhvr>
+                                    </p:animEffect>
+                                  </p:childTnLst>
+                                </p:cTn>
+                              </p:par>
+                            </p:childTnLst>
+                          </p:cTn>
+                        </p:par>
+                      </p:childTnLst>
+                    </p:cTn>
+                  </p:par>
+                  <p:par>
+                    <p:cTn id="41" fill="hold">
+                      <p:stCondLst>
+                        <p:cond delay="indefinite"/>
+                      </p:stCondLst>
+                      <p:childTnLst>
+                        <p:par>
+                          <p:cTn id="42" fill="hold">
+                            <p:stCondLst>
+                              <p:cond delay="0"/>
+                            </p:stCondLst>
+                            <p:childTnLst>
+                              <p:par>
+                                <p:cTn id="43" presetID="10" presetClass="entr" presetSubtype="0" fill="hold" grpId="0" nodeType="clickEffect">
+                                  <p:stCondLst>
+                                    <p:cond delay="0"/>
+                                  </p:stCondLst>
+                                  <p:childTnLst>
+                                    <p:set>
+                                      <p:cBhvr>
+                                        <p:cTn id="44" dur="1" fill="hold">
+                                          <p:stCondLst>
+                                            <p:cond delay="0"/>
+                                          </p:stCondLst>
+                                        </p:cTn>
+                                        <p:tgtEl>
+                                          <p:spTgt spid="5"/>
+                                        </p:tgtEl>
+                                        <p:attrNameLst>
+                                          <p:attrName>style.visibility</p:attrName>
+                                        </p:attrNameLst>
+                                      </p:cBhvr>
+                                      <p:to>
+                                        <p:strVal val="visible"/>
+                                      </p:to>
+                                    </p:set>
+                                    <p:animEffect transition="in" filter="fade">
+                                      <p:cBhvr>
+                                        <p:cTn id="45" dur="500"/>
+                                        <p:tgtEl>
+                                          <p:spTgt spid="5"/>
+                                        </p:tgtEl>
+                                      </p:cBhvr>
+                                    </p:animEffect>
+                                  </p:childTnLst>
+                                </p:cTn>
+                              </p:par>
+                            </p:childTnLst>
+                          </p:cTn>
+                        </p:par>
+                      </p:childTnLst>
+                    </p:cTn>
+                  </p:par>
+                  <p:par>
+                    <p:cTn id="46" fill="hold">
+                      <p:stCondLst>
+                        <p:cond delay="indefinite"/>
+                      </p:stCondLst>
+                      <p:childTnLst>
+                        <p:par>
+                          <p:cTn id="47" fill="hold">
+                            <p:stCondLst>
+                              <p:cond delay="0"/>
+                            </p:stCondLst>
+                            <p:childTnLst>
+                              <p:par>
+                                <p:cTn id="48" presetID="10" presetClass="entr" presetSubtype="0" fill="hold" grpId="0" nodeType="clickEffect">
+                                  <p:stCondLst>
+                                    <p:cond delay="0"/>
+                                  </p:stCondLst>
+                                  <p:childTnLst>
+                                    <p:set>
+                                      <p:cBhvr>
+                                        <p:cTn id="49" dur="1" fill="hold">
+                                          <p:stCondLst>
+                                            <p:cond delay="0"/>
+                                          </p:stCondLst>
+                                        </p:cTn>
+                                        <p:tgtEl>
+                                          <p:spTgt spid="6"/>
+                                        </p:tgtEl>
+                                        <p:attrNameLst>
+                                          <p:attrName>style.visibility</p:attrName>
+                                        </p:attrNameLst>
+                                      </p:cBhvr>
+                                      <p:to>
+                                        <p:strVal val="visible"/>
+                                      </p:to>
+                                    </p:set>
+                                    <p:animEffect transition="in" filter="fade">
+                                      <p:cBhvr>
+                                        <p:cTn id="50" dur="500"/>
+                                        <p:tgtEl>
+                                          <p:spTgt spid="6"/>
+                                        </p:tgtEl>
+                                      </p:cBhvr>
+                                    </p:animEffect>
+                                  </p:childTnLst>
+                                </p:cTn>
+                              </p:par>
+                            </p:childTnLst>
+                          </p:cTn>
+                        </p:par>
+                      </p:childTnLst>
+                    </p:cTn>
+                  </p:par>
+                </p:childTnLst>
+              </p:cTn>
+              <p:prevCondLst>
+                <p:cond evt="onPrev" delay="0">
+                  <p:tgtEl>
+                    <p:sldTgt/>
+                  </p:tgtEl>
+                </p:cond>
+              </p:prevCondLst>
+              <p:nextCondLst>
+                <p:cond evt="onNext" delay="0">
+                  <p:tgtEl>
+                    <p:sldTgt/>
+                  </p:tgtEl>
+                </p:cond>
+              </p:nextCondLst>
+            </p:seq>
+          </p:childTnLst>
+        </p:cTn>
+      </p:par>
+    </p:tnLst>
+    <p:bldLst>
+      <p:bldP spid="4" grpId="0"/>
+      <p:bldP spid="5" grpId="0"/>
+      <p:bldP spid="6" grpId="0"/>
+    </p:bldLst>
+  </p:timing>
+</p:sld>
+</file>
+
+<file path=ppt/slides/slide13.xml><?xml version="1.0" encoding="utf-8"?>
+<p:sld xmlns:a="http://schemas.openxmlformats.org/drawingml/2006/main" xmlns:r="http://schemas.openxmlformats.org/officeDocument/2006/relationships" xmlns:p="http://schemas.openxmlformats.org/presentationml/2006/main">
+  <p:cSld>
+    <p:spTree>
+      <p:nvGrpSpPr>
+        <p:cNvPr id="1" name=""/>
+        <p:cNvGrpSpPr/>
+        <p:nvPr/>
+      </p:nvGrpSpPr>
+      <p:grpSpPr>
+        <a:xfrm>
+          <a:off x="0" y="0"/>
+          <a:ext cx="0" cy="0"/>
+          <a:chOff x="0" y="0"/>
+          <a:chExt cx="0" cy="0"/>
+        </a:xfrm>
+      </p:grpSpPr>
+      <p:sp>
+        <p:nvSpPr>
+          <p:cNvPr id="2" name="Title 1">
+            <a:extLst>
+              <a:ext uri="{FF2B5EF4-FFF2-40B4-BE49-F238E27FC236}">
+                <a16:creationId xmlns:a16="http://schemas.microsoft.com/office/drawing/2014/main" id="{A80C9A1D-CD34-45EE-AD17-87F894DF20D4}"/>
+              </a:ext>
+            </a:extLst>
+          </p:cNvPr>
+          <p:cNvSpPr>
+            <a:spLocks noGrp="1"/>
+          </p:cNvSpPr>
+          <p:nvPr>
+            <p:ph type="title"/>
+          </p:nvPr>
+        </p:nvSpPr>
+        <p:spPr/>
+        <p:txBody>
+          <a:bodyPr/>
+          <a:lstStyle/>
+          <a:p>
+            <a:r>
+              <a:rPr lang="en-US" dirty="0"/>
+              <a:t>ML.NET</a:t>
+            </a:r>
+          </a:p>
+        </p:txBody>
+      </p:sp>
+      <p:sp>
+        <p:nvSpPr>
+          <p:cNvPr id="3" name="Content Placeholder 2">
+            <a:extLst>
+              <a:ext uri="{FF2B5EF4-FFF2-40B4-BE49-F238E27FC236}">
+                <a16:creationId xmlns:a16="http://schemas.microsoft.com/office/drawing/2014/main" id="{5E2CF194-A731-4B5A-87FD-483B5E8E45EB}"/>
+              </a:ext>
+            </a:extLst>
+          </p:cNvPr>
+          <p:cNvSpPr>
+            <a:spLocks noGrp="1"/>
+          </p:cNvSpPr>
+          <p:nvPr>
+            <p:ph idx="1"/>
+          </p:nvPr>
+        </p:nvSpPr>
+        <p:spPr>
+          <a:xfrm>
+            <a:off x="1141413" y="2224087"/>
+            <a:ext cx="5868988" cy="3541714"/>
+          </a:xfrm>
+        </p:spPr>
+        <p:txBody>
+          <a:bodyPr>
+            <a:normAutofit fontScale="62500" lnSpcReduction="20000"/>
+          </a:bodyPr>
+          <a:lstStyle/>
+          <a:p>
+            <a:pPr marL="0" indent="0">
+              <a:buNone/>
+            </a:pPr>
+            <a:r>
+              <a:rPr lang="en-US" dirty="0"/>
+              <a:t>var pipeline = new </a:t>
+            </a:r>
+            <a:r>
+              <a:rPr lang="en-US" dirty="0" err="1"/>
+              <a:t>LearningPipeline</a:t>
+            </a:r>
+            <a:endParaRPr lang="en-US" dirty="0"/>
+          </a:p>
+          <a:p>
+            <a:pPr marL="0" indent="0">
+              <a:buNone/>
+            </a:pPr>
+            <a:r>
+              <a:rPr lang="en-US" dirty="0"/>
+              <a:t>{</a:t>
+            </a:r>
+          </a:p>
+          <a:p>
+            <a:pPr marL="0" indent="0">
+              <a:buNone/>
+            </a:pPr>
+            <a:r>
+              <a:rPr lang="en-US" dirty="0"/>
+              <a:t>    new </a:t>
+            </a:r>
+            <a:r>
+              <a:rPr lang="en-US" dirty="0" err="1"/>
+              <a:t>TextLoader</a:t>
+            </a:r>
+            <a:r>
+              <a:rPr lang="en-US" dirty="0"/>
+              <a:t>(</a:t>
+            </a:r>
+            <a:r>
+              <a:rPr lang="en-US" dirty="0" err="1"/>
+              <a:t>trainingFileName</a:t>
+            </a:r>
+            <a:r>
+              <a:rPr lang="en-US" dirty="0"/>
+              <a:t>).</a:t>
+            </a:r>
+            <a:r>
+              <a:rPr lang="en-US" dirty="0" err="1"/>
+              <a:t>CreateFrom</a:t>
+            </a:r>
+            <a:r>
+              <a:rPr lang="en-US" dirty="0"/>
+              <a:t>&lt;T&gt;(separator: ','),</a:t>
+            </a:r>
+          </a:p>
+          <a:p>
+            <a:pPr marL="0" indent="0">
+              <a:buNone/>
+            </a:pPr>
+            <a:r>
+              <a:rPr lang="en-US" dirty="0"/>
+              <a:t>    new </a:t>
+            </a:r>
+            <a:r>
+              <a:rPr lang="en-US" dirty="0" err="1"/>
+              <a:t>ColumnConcatenator</a:t>
+            </a:r>
+            <a:r>
+              <a:rPr lang="en-US" dirty="0"/>
+              <a:t>("Features", "Features"),</a:t>
+            </a:r>
+          </a:p>
+          <a:p>
+            <a:pPr marL="0" indent="0">
+              <a:buNone/>
+            </a:pPr>
+            <a:r>
+              <a:rPr lang="en-US" dirty="0"/>
+              <a:t>    new </a:t>
+            </a:r>
+            <a:r>
+              <a:rPr lang="en-US" dirty="0" err="1"/>
+              <a:t>FastTreeRegressor</a:t>
+            </a:r>
+            <a:r>
+              <a:rPr lang="en-US" dirty="0"/>
+              <a:t>()</a:t>
+            </a:r>
+          </a:p>
+          <a:p>
+            <a:pPr marL="0" indent="0">
+              <a:buNone/>
+            </a:pPr>
+            <a:r>
+              <a:rPr lang="en-US" dirty="0"/>
+              <a:t>};</a:t>
+            </a:r>
+          </a:p>
+          <a:p>
+            <a:pPr marL="0" indent="0">
+              <a:buNone/>
+            </a:pPr>
+            <a:endParaRPr lang="en-US" dirty="0"/>
+          </a:p>
+          <a:p>
+            <a:pPr marL="0" indent="0">
+              <a:buNone/>
+            </a:pPr>
+            <a:r>
+              <a:rPr lang="en-US" dirty="0"/>
+              <a:t>model = </a:t>
+            </a:r>
+            <a:r>
+              <a:rPr lang="en-US" dirty="0" err="1"/>
+              <a:t>pipeline.Train</a:t>
+            </a:r>
+            <a:r>
+              <a:rPr lang="en-US" dirty="0"/>
+              <a:t>&lt;T, TK&gt;();</a:t>
+            </a:r>
+          </a:p>
+          <a:p>
+            <a:pPr marL="0" indent="0">
+              <a:buNone/>
+            </a:pPr>
+            <a:endParaRPr lang="en-US" dirty="0"/>
+          </a:p>
+          <a:p>
+            <a:pPr marL="0" indent="0">
+              <a:buNone/>
+            </a:pPr>
+            <a:r>
+              <a:rPr lang="en-US" dirty="0"/>
+              <a:t>await </a:t>
+            </a:r>
+            <a:r>
+              <a:rPr lang="en-US" dirty="0" err="1"/>
+              <a:t>model.WriteAsync</a:t>
+            </a:r>
+            <a:r>
+              <a:rPr lang="en-US" dirty="0"/>
+              <a:t>(</a:t>
+            </a:r>
+            <a:r>
+              <a:rPr lang="en-US" dirty="0" err="1"/>
+              <a:t>ModelName</a:t>
+            </a:r>
+            <a:r>
+              <a:rPr lang="en-US" dirty="0"/>
+              <a:t>);</a:t>
+            </a:r>
+          </a:p>
+        </p:txBody>
+      </p:sp>
+      <p:sp>
+        <p:nvSpPr>
+          <p:cNvPr id="6" name="TextBox 5">
+            <a:extLst>
+              <a:ext uri="{FF2B5EF4-FFF2-40B4-BE49-F238E27FC236}">
+                <a16:creationId xmlns:a16="http://schemas.microsoft.com/office/drawing/2014/main" id="{81270002-14AD-400E-B824-B4CCC31C5AFE}"/>
+              </a:ext>
+            </a:extLst>
+          </p:cNvPr>
+          <p:cNvSpPr txBox="1"/>
+          <p:nvPr/>
+        </p:nvSpPr>
+        <p:spPr>
+          <a:xfrm>
+            <a:off x="1141413" y="1651001"/>
+            <a:ext cx="9532994" cy="369332"/>
+          </a:xfrm>
+          <a:prstGeom prst="rect">
+            <a:avLst/>
+          </a:prstGeom>
+          <a:noFill/>
+        </p:spPr>
+        <p:txBody>
+          <a:bodyPr wrap="none" rtlCol="0">
+            <a:spAutoFit/>
+          </a:bodyPr>
+          <a:lstStyle/>
+          <a:p>
+            <a:pPr marL="285750" indent="-285750">
+              <a:buFont typeface="Arial" panose="020B0604020202020204" pitchFamily="34" charset="0"/>
+              <a:buChar char="•"/>
+            </a:pPr>
+            <a:r>
+              <a:rPr lang="en-US" dirty="0"/>
+              <a:t>Open source (on GitHub) supports TensorFlow, CNTK, </a:t>
+            </a:r>
+            <a:r>
+              <a:rPr lang="en-US" dirty="0" err="1"/>
+              <a:t>Scikit</a:t>
+            </a:r>
+            <a:r>
+              <a:rPr lang="en-US" dirty="0"/>
+              <a:t>-Learn, </a:t>
+            </a:r>
+            <a:r>
+              <a:rPr lang="en-US" dirty="0" err="1"/>
+              <a:t>CoreML</a:t>
+            </a:r>
+            <a:r>
+              <a:rPr lang="en-US" dirty="0"/>
+              <a:t> (any ONNX 1.2 models)</a:t>
+            </a:r>
+          </a:p>
+        </p:txBody>
+      </p:sp>
+    </p:spTree>
+    <p:extLst>
+      <p:ext uri="{BB962C8B-B14F-4D97-AF65-F5344CB8AC3E}">
+        <p14:creationId xmlns:p14="http://schemas.microsoft.com/office/powerpoint/2010/main" val="1198719758"/>
+      </p:ext>
+    </p:extLst>
+  </p:cSld>
+  <p:clrMapOvr>
+    <a:masterClrMapping/>
+  </p:clrMapOvr>
+  <p:timing>
+    <p:tnLst>
+      <p:par>
+        <p:cTn id="1" dur="indefinite" restart="never" nodeType="tmRoot">
+          <p:childTnLst>
+            <p:seq concurrent="1" nextAc="seek">
+              <p:cTn id="2" dur="indefinite" nodeType="mainSeq">
+                <p:childTnLst>
+                  <p:par>
+                    <p:cTn id="3" fill="hold">
+                      <p:stCondLst>
+                        <p:cond delay="indefinite"/>
+                      </p:stCondLst>
+                      <p:childTnLst>
+                        <p:par>
+                          <p:cTn id="4" fill="hold">
+                            <p:stCondLst>
+                              <p:cond delay="0"/>
+                            </p:stCondLst>
+                            <p:childTnLst>
+                              <p:par>
+                                <p:cTn id="5" presetID="10" presetClass="entr" presetSubtype="0" fill="hold" grpId="0" nodeType="clickEffect">
+                                  <p:stCondLst>
+                                    <p:cond delay="0"/>
+                                  </p:stCondLst>
+                                  <p:childTnLst>
+                                    <p:set>
+                                      <p:cBhvr>
+                                        <p:cTn id="6" dur="1" fill="hold">
+                                          <p:stCondLst>
+                                            <p:cond delay="0"/>
+                                          </p:stCondLst>
+                                        </p:cTn>
+                                        <p:tgtEl>
+                                          <p:spTgt spid="6"/>
+                                        </p:tgtEl>
+                                        <p:attrNameLst>
+                                          <p:attrName>style.visibility</p:attrName>
+                                        </p:attrNameLst>
+                                      </p:cBhvr>
+                                      <p:to>
+                                        <p:strVal val="visible"/>
+                                      </p:to>
+                                    </p:set>
+                                    <p:animEffect transition="in" filter="fade">
+                                      <p:cBhvr>
+                                        <p:cTn id="7" dur="500"/>
+                                        <p:tgtEl>
+                                          <p:spTgt spid="6"/>
+                                        </p:tgtEl>
+                                      </p:cBhvr>
+                                    </p:animEffect>
+                                  </p:childTnLst>
+                                </p:cTn>
+                              </p:par>
+                            </p:childTnLst>
+                          </p:cTn>
+                        </p:par>
+                      </p:childTnLst>
+                    </p:cTn>
+                  </p:par>
+                  <p:par>
+                    <p:cTn id="8" fill="hold">
+                      <p:stCondLst>
+                        <p:cond delay="indefinite"/>
+                      </p:stCondLst>
+                      <p:childTnLst>
+                        <p:par>
+                          <p:cTn id="9" fill="hold">
+                            <p:stCondLst>
+                              <p:cond delay="0"/>
+                            </p:stCondLst>
+                            <p:childTnLst>
+                              <p:par>
+                                <p:cTn id="10" presetID="10" presetClass="entr" presetSubtype="0" fill="hold" grpId="0" nodeType="clickEffect">
+                                  <p:stCondLst>
+                                    <p:cond delay="0"/>
+                                  </p:stCondLst>
+                                  <p:childTnLst>
+                                    <p:set>
+                                      <p:cBhvr>
+                                        <p:cTn id="11" dur="1" fill="hold">
+                                          <p:stCondLst>
+                                            <p:cond delay="0"/>
+                                          </p:stCondLst>
+                                        </p:cTn>
+                                        <p:tgtEl>
+                                          <p:spTgt spid="3">
+                                            <p:txEl>
+                                              <p:pRg st="0" end="0"/>
+                                            </p:txEl>
+                                          </p:spTgt>
+                                        </p:tgtEl>
+                                        <p:attrNameLst>
+                                          <p:attrName>style.visibility</p:attrName>
+                                        </p:attrNameLst>
+                                      </p:cBhvr>
+                                      <p:to>
+                                        <p:strVal val="visible"/>
+                                      </p:to>
+                                    </p:set>
+                                    <p:animEffect transition="in" filter="fade">
+                                      <p:cBhvr>
+                                        <p:cTn id="12" dur="500"/>
+                                        <p:tgtEl>
+                                          <p:spTgt spid="3">
+                                            <p:txEl>
+                                              <p:pRg st="0" end="0"/>
+                                            </p:txEl>
+                                          </p:spTgt>
+                                        </p:tgtEl>
+                                      </p:cBhvr>
+                                    </p:animEffect>
+                                  </p:childTnLst>
+                                </p:cTn>
+                              </p:par>
+                            </p:childTnLst>
+                          </p:cTn>
+                        </p:par>
+                      </p:childTnLst>
+                    </p:cTn>
+                  </p:par>
+                  <p:par>
+                    <p:cTn id="13" fill="hold">
+                      <p:stCondLst>
+                        <p:cond delay="indefinite"/>
+                      </p:stCondLst>
+                      <p:childTnLst>
+                        <p:par>
+                          <p:cTn id="14" fill="hold">
+                            <p:stCondLst>
+                              <p:cond delay="0"/>
+                            </p:stCondLst>
+                            <p:childTnLst>
+                              <p:par>
+                                <p:cTn id="15" presetID="10" presetClass="entr" presetSubtype="0" fill="hold" grpId="0" nodeType="clickEffect">
+                                  <p:stCondLst>
+                                    <p:cond delay="0"/>
+                                  </p:stCondLst>
+                                  <p:childTnLst>
+                                    <p:set>
+                                      <p:cBhvr>
+                                        <p:cTn id="16" dur="1" fill="hold">
+                                          <p:stCondLst>
+                                            <p:cond delay="0"/>
+                                          </p:stCondLst>
+                                        </p:cTn>
+                                        <p:tgtEl>
+                                          <p:spTgt spid="3">
+                                            <p:txEl>
+                                              <p:pRg st="1" end="1"/>
+                                            </p:txEl>
+                                          </p:spTgt>
+                                        </p:tgtEl>
+                                        <p:attrNameLst>
+                                          <p:attrName>style.visibility</p:attrName>
+                                        </p:attrNameLst>
+                                      </p:cBhvr>
+                                      <p:to>
+                                        <p:strVal val="visible"/>
+                                      </p:to>
+                                    </p:set>
+                                    <p:animEffect transition="in" filter="fade">
+                                      <p:cBhvr>
+                                        <p:cTn id="17" dur="500"/>
+                                        <p:tgtEl>
+                                          <p:spTgt spid="3">
+                                            <p:txEl>
+                                              <p:pRg st="1" end="1"/>
+                                            </p:txEl>
+                                          </p:spTgt>
+                                        </p:tgtEl>
+                                      </p:cBhvr>
+                                    </p:animEffect>
+                                  </p:childTnLst>
+                                </p:cTn>
+                              </p:par>
+                            </p:childTnLst>
+                          </p:cTn>
+                        </p:par>
+                      </p:childTnLst>
+                    </p:cTn>
+                  </p:par>
+                  <p:par>
+                    <p:cTn id="18" fill="hold">
+                      <p:stCondLst>
+                        <p:cond delay="indefinite"/>
+                      </p:stCondLst>
+                      <p:childTnLst>
+                        <p:par>
+                          <p:cTn id="19" fill="hold">
+                            <p:stCondLst>
+                              <p:cond delay="0"/>
+                            </p:stCondLst>
+                            <p:childTnLst>
+                              <p:par>
+                                <p:cTn id="20" presetID="10" presetClass="entr" presetSubtype="0" fill="hold" grpId="0" nodeType="clickEffect">
+                                  <p:stCondLst>
+                                    <p:cond delay="0"/>
+                                  </p:stCondLst>
+                                  <p:childTnLst>
+                                    <p:set>
+                                      <p:cBhvr>
+                                        <p:cTn id="21" dur="1" fill="hold">
+                                          <p:stCondLst>
+                                            <p:cond delay="0"/>
+                                          </p:stCondLst>
+                                        </p:cTn>
+                                        <p:tgtEl>
+                                          <p:spTgt spid="3">
+                                            <p:txEl>
+                                              <p:pRg st="2" end="2"/>
+                                            </p:txEl>
+                                          </p:spTgt>
+                                        </p:tgtEl>
+                                        <p:attrNameLst>
+                                          <p:attrName>style.visibility</p:attrName>
+                                        </p:attrNameLst>
+                                      </p:cBhvr>
+                                      <p:to>
+                                        <p:strVal val="visible"/>
+                                      </p:to>
+                                    </p:set>
+                                    <p:animEffect transition="in" filter="fade">
+                                      <p:cBhvr>
+                                        <p:cTn id="22" dur="500"/>
+                                        <p:tgtEl>
+                                          <p:spTgt spid="3">
+                                            <p:txEl>
+                                              <p:pRg st="2" end="2"/>
+                                            </p:txEl>
+                                          </p:spTgt>
+                                        </p:tgtEl>
+                                      </p:cBhvr>
+                                    </p:animEffect>
+                                  </p:childTnLst>
+                                </p:cTn>
+                              </p:par>
+                            </p:childTnLst>
+                          </p:cTn>
+                        </p:par>
+                      </p:childTnLst>
+                    </p:cTn>
+                  </p:par>
+                  <p:par>
+                    <p:cTn id="23" fill="hold">
+                      <p:stCondLst>
+                        <p:cond delay="indefinite"/>
+                      </p:stCondLst>
+                      <p:childTnLst>
+                        <p:par>
+                          <p:cTn id="24" fill="hold">
+                            <p:stCondLst>
+                              <p:cond delay="0"/>
+                            </p:stCondLst>
+                            <p:childTnLst>
+                              <p:par>
+                                <p:cTn id="25" presetID="10" presetClass="entr" presetSubtype="0" fill="hold" grpId="0" nodeType="clickEffect">
+                                  <p:stCondLst>
+                                    <p:cond delay="0"/>
+                                  </p:stCondLst>
+                                  <p:childTnLst>
+                                    <p:set>
+                                      <p:cBhvr>
+                                        <p:cTn id="26" dur="1" fill="hold">
+                                          <p:stCondLst>
+                                            <p:cond delay="0"/>
+                                          </p:stCondLst>
+                                        </p:cTn>
+                                        <p:tgtEl>
+                                          <p:spTgt spid="3">
+                                            <p:txEl>
+                                              <p:pRg st="3" end="3"/>
+                                            </p:txEl>
+                                          </p:spTgt>
+                                        </p:tgtEl>
+                                        <p:attrNameLst>
+                                          <p:attrName>style.visibility</p:attrName>
+                                        </p:attrNameLst>
+                                      </p:cBhvr>
+                                      <p:to>
+                                        <p:strVal val="visible"/>
+                                      </p:to>
+                                    </p:set>
+                                    <p:animEffect transition="in" filter="fade">
+                                      <p:cBhvr>
+                                        <p:cTn id="27" dur="500"/>
+                                        <p:tgtEl>
+                                          <p:spTgt spid="3">
+                                            <p:txEl>
+                                              <p:pRg st="3" end="3"/>
+                                            </p:txEl>
+                                          </p:spTgt>
+                                        </p:tgtEl>
+                                      </p:cBhvr>
+                                    </p:animEffect>
+                                  </p:childTnLst>
+                                </p:cTn>
+                              </p:par>
+                            </p:childTnLst>
+                          </p:cTn>
+                        </p:par>
+                      </p:childTnLst>
+                    </p:cTn>
+                  </p:par>
+                  <p:par>
+                    <p:cTn id="28" fill="hold">
+                      <p:stCondLst>
+                        <p:cond delay="indefinite"/>
+                      </p:stCondLst>
+                      <p:childTnLst>
+                        <p:par>
+                          <p:cTn id="29" fill="hold">
+                            <p:stCondLst>
+                              <p:cond delay="0"/>
+                            </p:stCondLst>
+                            <p:childTnLst>
+                              <p:par>
+                                <p:cTn id="30" presetID="10" presetClass="entr" presetSubtype="0" fill="hold" grpId="0" nodeType="clickEffect">
+                                  <p:stCondLst>
+                                    <p:cond delay="0"/>
+                                  </p:stCondLst>
+                                  <p:childTnLst>
+                                    <p:set>
+                                      <p:cBhvr>
+                                        <p:cTn id="31" dur="1" fill="hold">
+                                          <p:stCondLst>
+                                            <p:cond delay="0"/>
+                                          </p:stCondLst>
+                                        </p:cTn>
+                                        <p:tgtEl>
+                                          <p:spTgt spid="3">
+                                            <p:txEl>
+                                              <p:pRg st="4" end="4"/>
+                                            </p:txEl>
+                                          </p:spTgt>
+                                        </p:tgtEl>
+                                        <p:attrNameLst>
+                                          <p:attrName>style.visibility</p:attrName>
+                                        </p:attrNameLst>
+                                      </p:cBhvr>
+                                      <p:to>
+                                        <p:strVal val="visible"/>
+                                      </p:to>
+                                    </p:set>
+                                    <p:animEffect transition="in" filter="fade">
+                                      <p:cBhvr>
+                                        <p:cTn id="32" dur="500"/>
+                                        <p:tgtEl>
+                                          <p:spTgt spid="3">
+                                            <p:txEl>
+                                              <p:pRg st="4" end="4"/>
+                                            </p:txEl>
+                                          </p:spTgt>
+                                        </p:tgtEl>
+                                      </p:cBhvr>
+                                    </p:animEffect>
+                                  </p:childTnLst>
+                                </p:cTn>
+                              </p:par>
+                            </p:childTnLst>
+                          </p:cTn>
+                        </p:par>
+                      </p:childTnLst>
+                    </p:cTn>
+                  </p:par>
+                  <p:par>
+                    <p:cTn id="33" fill="hold">
+                      <p:stCondLst>
+                        <p:cond delay="indefinite"/>
+                      </p:stCondLst>
+                      <p:childTnLst>
+                        <p:par>
+                          <p:cTn id="34" fill="hold">
+                            <p:stCondLst>
+                              <p:cond delay="0"/>
+                            </p:stCondLst>
+                            <p:childTnLst>
+                              <p:par>
+                                <p:cTn id="35" presetID="10" presetClass="entr" presetSubtype="0" fill="hold" grpId="0" nodeType="clickEffect">
+                                  <p:stCondLst>
+                                    <p:cond delay="0"/>
+                                  </p:stCondLst>
+                                  <p:childTnLst>
+                                    <p:set>
+                                      <p:cBhvr>
+                                        <p:cTn id="36" dur="1" fill="hold">
+                                          <p:stCondLst>
+                                            <p:cond delay="0"/>
+                                          </p:stCondLst>
+                                        </p:cTn>
+                                        <p:tgtEl>
+                                          <p:spTgt spid="3">
+                                            <p:txEl>
+                                              <p:pRg st="5" end="5"/>
+                                            </p:txEl>
+                                          </p:spTgt>
+                                        </p:tgtEl>
+                                        <p:attrNameLst>
+                                          <p:attrName>style.visibility</p:attrName>
+                                        </p:attrNameLst>
+                                      </p:cBhvr>
+                                      <p:to>
+                                        <p:strVal val="visible"/>
+                                      </p:to>
+                                    </p:set>
+                                    <p:animEffect transition="in" filter="fade">
+                                      <p:cBhvr>
+                                        <p:cTn id="37" dur="500"/>
+                                        <p:tgtEl>
+                                          <p:spTgt spid="3">
+                                            <p:txEl>
+                                              <p:pRg st="5" end="5"/>
+                                            </p:txEl>
+                                          </p:spTgt>
+                                        </p:tgtEl>
+                                      </p:cBhvr>
+                                    </p:animEffect>
+                                  </p:childTnLst>
+                                </p:cTn>
+                              </p:par>
+                            </p:childTnLst>
+                          </p:cTn>
+                        </p:par>
+                      </p:childTnLst>
+                    </p:cTn>
+                  </p:par>
+                  <p:par>
+                    <p:cTn id="38" fill="hold">
+                      <p:stCondLst>
+                        <p:cond delay="indefinite"/>
+                      </p:stCondLst>
+                      <p:childTnLst>
+                        <p:par>
+                          <p:cTn id="39" fill="hold">
+                            <p:stCondLst>
+                              <p:cond delay="0"/>
+                            </p:stCondLst>
+                            <p:childTnLst>
+                              <p:par>
+                                <p:cTn id="40" presetID="10" presetClass="entr" presetSubtype="0" fill="hold" grpId="0" nodeType="clickEffect">
+                                  <p:stCondLst>
+                                    <p:cond delay="0"/>
+                                  </p:stCondLst>
+                                  <p:childTnLst>
+                                    <p:set>
+                                      <p:cBhvr>
+                                        <p:cTn id="41" dur="1" fill="hold">
+                                          <p:stCondLst>
+                                            <p:cond delay="0"/>
+                                          </p:stCondLst>
+                                        </p:cTn>
+                                        <p:tgtEl>
+                                          <p:spTgt spid="3">
+                                            <p:txEl>
+                                              <p:pRg st="7" end="7"/>
+                                            </p:txEl>
+                                          </p:spTgt>
+                                        </p:tgtEl>
+                                        <p:attrNameLst>
+                                          <p:attrName>style.visibility</p:attrName>
+                                        </p:attrNameLst>
+                                      </p:cBhvr>
+                                      <p:to>
+                                        <p:strVal val="visible"/>
+                                      </p:to>
+                                    </p:set>
+                                    <p:animEffect transition="in" filter="fade">
+                                      <p:cBhvr>
+                                        <p:cTn id="42" dur="500"/>
+                                        <p:tgtEl>
+                                          <p:spTgt spid="3">
+                                            <p:txEl>
+                                              <p:pRg st="7" end="7"/>
+                                            </p:txEl>
+                                          </p:spTgt>
+                                        </p:tgtEl>
+                                      </p:cBhvr>
+                                    </p:animEffect>
+                                  </p:childTnLst>
+                                </p:cTn>
+                              </p:par>
+                            </p:childTnLst>
+                          </p:cTn>
+                        </p:par>
+                      </p:childTnLst>
+                    </p:cTn>
+                  </p:par>
+                  <p:par>
+                    <p:cTn id="43" fill="hold">
+                      <p:stCondLst>
+                        <p:cond delay="indefinite"/>
+                      </p:stCondLst>
+                      <p:childTnLst>
+                        <p:par>
+                          <p:cTn id="44" fill="hold">
+                            <p:stCondLst>
+                              <p:cond delay="0"/>
+                            </p:stCondLst>
+                            <p:childTnLst>
+                              <p:par>
+                                <p:cTn id="45" presetID="10" presetClass="entr" presetSubtype="0" fill="hold" grpId="0" nodeType="clickEffect">
+                                  <p:stCondLst>
+                                    <p:cond delay="0"/>
+                                  </p:stCondLst>
+                                  <p:childTnLst>
+                                    <p:set>
+                                      <p:cBhvr>
+                                        <p:cTn id="46" dur="1" fill="hold">
+                                          <p:stCondLst>
+                                            <p:cond delay="0"/>
+                                          </p:stCondLst>
+                                        </p:cTn>
+                                        <p:tgtEl>
+                                          <p:spTgt spid="3">
+                                            <p:txEl>
+                                              <p:pRg st="9" end="9"/>
+                                            </p:txEl>
+                                          </p:spTgt>
+                                        </p:tgtEl>
+                                        <p:attrNameLst>
+                                          <p:attrName>style.visibility</p:attrName>
+                                        </p:attrNameLst>
+                                      </p:cBhvr>
+                                      <p:to>
+                                        <p:strVal val="visible"/>
+                                      </p:to>
+                                    </p:set>
+                                    <p:animEffect transition="in" filter="fade">
+                                      <p:cBhvr>
+                                        <p:cTn id="47" dur="500"/>
+                                        <p:tgtEl>
+                                          <p:spTgt spid="3">
+                                            <p:txEl>
+                                              <p:pRg st="9" end="9"/>
+                                            </p:txEl>
+                                          </p:spTgt>
+                                        </p:tgtEl>
+                                      </p:cBhvr>
+                                    </p:animEffect>
+                                  </p:childTnLst>
+                                </p:cTn>
+                              </p:par>
+                            </p:childTnLst>
+                          </p:cTn>
+                        </p:par>
+                      </p:childTnLst>
+                    </p:cTn>
+                  </p:par>
+                </p:childTnLst>
+              </p:cTn>
+              <p:prevCondLst>
+                <p:cond evt="onPrev" delay="0">
+                  <p:tgtEl>
+                    <p:sldTgt/>
+                  </p:tgtEl>
+                </p:cond>
+              </p:prevCondLst>
+              <p:nextCondLst>
+                <p:cond evt="onNext" delay="0">
+                  <p:tgtEl>
+                    <p:sldTgt/>
+                  </p:tgtEl>
+                </p:cond>
+              </p:nextCondLst>
+            </p:seq>
+          </p:childTnLst>
+        </p:cTn>
+      </p:par>
+    </p:tnLst>
+    <p:bldLst>
+      <p:bldP spid="3" grpId="0" build="p"/>
+      <p:bldP spid="6" grpId="0"/>
+    </p:bldLst>
+  </p:timing>
+</p:sld>
+</file>
+
+<file path=ppt/slides/slide14.xml><?xml version="1.0" encoding="utf-8"?>
 <p:sld xmlns:a="http://schemas.openxmlformats.org/drawingml/2006/main" xmlns:r="http://schemas.openxmlformats.org/officeDocument/2006/relationships" xmlns:p="http://schemas.openxmlformats.org/presentationml/2006/main">
   <p:cSld>
     <p:spTree>
@@ -13163,7 +15346,7 @@
 </p:sld>
 </file>
 
-<file path=ppt/slides/slide12.xml><?xml version="1.0" encoding="utf-8"?>
+<file path=ppt/slides/slide15.xml><?xml version="1.0" encoding="utf-8"?>
 <p:sld xmlns:a="http://schemas.openxmlformats.org/drawingml/2006/main" xmlns:r="http://schemas.openxmlformats.org/officeDocument/2006/relationships" xmlns:p="http://schemas.openxmlformats.org/presentationml/2006/main">
   <p:cSld>
     <p:spTree>
@@ -13226,7 +15409,7 @@
 </p:sld>
 </file>
 
-<file path=ppt/slides/slide13.xml><?xml version="1.0" encoding="utf-8"?>
+<file path=ppt/slides/slide16.xml><?xml version="1.0" encoding="utf-8"?>
 <p:sld xmlns:a="http://schemas.openxmlformats.org/drawingml/2006/main" xmlns:r="http://schemas.openxmlformats.org/officeDocument/2006/relationships" xmlns:p="http://schemas.openxmlformats.org/presentationml/2006/main">
   <p:cSld>
     <p:spTree>
@@ -17476,7 +19659,7 @@
           <p:cNvPr id="2" name="Title 1">
             <a:extLst>
               <a:ext uri="{FF2B5EF4-FFF2-40B4-BE49-F238E27FC236}">
-                <a16:creationId xmlns:a16="http://schemas.microsoft.com/office/drawing/2014/main" id="{789CFA96-BE11-4606-B9F1-5E572D208C16}"/>
+                <a16:creationId xmlns:a16="http://schemas.microsoft.com/office/drawing/2014/main" id="{AD11F9BB-1D9C-4D84-9356-C14B9C84BBDD}"/>
               </a:ext>
             </a:extLst>
           </p:cNvPr>
@@ -17494,17 +19677,17 @@
           <a:p>
             <a:r>
               <a:rPr lang="en-US" dirty="0"/>
-              <a:t>.NET Core windows compatibility pack</a:t>
+              <a:t>Updated frameworks and tooling</a:t>
             </a:r>
           </a:p>
         </p:txBody>
       </p:sp>
       <p:sp>
         <p:nvSpPr>
-          <p:cNvPr id="3" name="Content Placeholder 2">
+          <p:cNvPr id="3" name="Text Placeholder 2">
             <a:extLst>
               <a:ext uri="{FF2B5EF4-FFF2-40B4-BE49-F238E27FC236}">
-                <a16:creationId xmlns:a16="http://schemas.microsoft.com/office/drawing/2014/main" id="{B69CDE4E-F672-4A83-B661-542BDA1D1156}"/>
+                <a16:creationId xmlns:a16="http://schemas.microsoft.com/office/drawing/2014/main" id="{D46BB76A-5661-4512-A133-568F624415F9}"/>
               </a:ext>
             </a:extLst>
           </p:cNvPr>
@@ -17512,235 +19695,28 @@
             <a:spLocks noGrp="1"/>
           </p:cNvSpPr>
           <p:nvPr>
-            <p:ph idx="1"/>
+            <p:ph type="body" idx="1"/>
           </p:nvPr>
         </p:nvSpPr>
-        <p:spPr>
-          <a:xfrm>
-            <a:off x="1141413" y="1792287"/>
-            <a:ext cx="9905999" cy="601778"/>
-          </a:xfrm>
-        </p:spPr>
+        <p:spPr/>
         <p:txBody>
-          <a:bodyPr>
-            <a:normAutofit/>
-          </a:bodyPr>
+          <a:bodyPr/>
           <a:lstStyle/>
           <a:p>
-            <a:r>
-              <a:rPr lang="en-US" sz="1800" dirty="0"/>
-              <a:t>20,000+ APIs now available (</a:t>
-            </a:r>
-            <a:r>
-              <a:rPr lang="en-US" sz="1800" dirty="0" err="1"/>
-              <a:t>System.Drawing</a:t>
-            </a:r>
-            <a:r>
-              <a:rPr lang="en-US" sz="1800" dirty="0"/>
-              <a:t>, </a:t>
-            </a:r>
-            <a:r>
-              <a:rPr lang="en-US" sz="1800" dirty="0" err="1"/>
-              <a:t>System.Management</a:t>
-            </a:r>
-            <a:r>
-              <a:rPr lang="en-US" sz="1800" dirty="0"/>
-              <a:t> etc.)</a:t>
-            </a:r>
-          </a:p>
-          <a:p>
-            <a:pPr marL="0" indent="0">
-              <a:buNone/>
-            </a:pPr>
-            <a:endParaRPr lang="en-US" sz="1800" dirty="0"/>
-          </a:p>
-          <a:p>
-            <a:pPr marL="0" indent="0">
-              <a:buNone/>
-            </a:pPr>
-            <a:endParaRPr lang="en-US" sz="1800" dirty="0"/>
-          </a:p>
-        </p:txBody>
-      </p:sp>
-      <p:sp>
-        <p:nvSpPr>
-          <p:cNvPr id="4" name="TextBox 3">
-            <a:extLst>
-              <a:ext uri="{FF2B5EF4-FFF2-40B4-BE49-F238E27FC236}">
-                <a16:creationId xmlns:a16="http://schemas.microsoft.com/office/drawing/2014/main" id="{65EAE699-A252-4455-A055-E0AECC61A480}"/>
-              </a:ext>
-            </a:extLst>
-          </p:cNvPr>
-          <p:cNvSpPr txBox="1"/>
-          <p:nvPr/>
-        </p:nvSpPr>
-        <p:spPr>
-          <a:xfrm>
-            <a:off x="1141413" y="2394065"/>
-            <a:ext cx="7925503" cy="1477328"/>
-          </a:xfrm>
-          <a:prstGeom prst="rect">
-            <a:avLst/>
-          </a:prstGeom>
-          <a:noFill/>
-        </p:spPr>
-        <p:txBody>
-          <a:bodyPr wrap="none" rtlCol="0">
-            <a:spAutoFit/>
-          </a:bodyPr>
-          <a:lstStyle/>
-          <a:p>
-            <a:r>
-              <a:rPr lang="en-US" dirty="0"/>
-              <a:t>if (</a:t>
-            </a:r>
-            <a:r>
-              <a:rPr lang="en-US" dirty="0" err="1"/>
-              <a:t>RuntimeInformation.IsOSPlatform</a:t>
-            </a:r>
-            <a:r>
-              <a:rPr lang="en-US" dirty="0"/>
-              <a:t>(</a:t>
-            </a:r>
-            <a:r>
-              <a:rPr lang="en-US" dirty="0" err="1"/>
-              <a:t>OSPlatform.Windows</a:t>
-            </a:r>
-            <a:r>
-              <a:rPr lang="en-US" dirty="0"/>
-              <a:t>)) {</a:t>
-            </a:r>
-          </a:p>
-          <a:p>
-            <a:r>
-              <a:rPr lang="en-US" dirty="0"/>
-              <a:t>   using (var key = </a:t>
-            </a:r>
-            <a:r>
-              <a:rPr lang="en-US" dirty="0" err="1"/>
-              <a:t>Registry.CurrentUser.OpenSubKey</a:t>
-            </a:r>
-            <a:r>
-              <a:rPr lang="en-US" dirty="0"/>
-              <a:t>(@"Software\Awesomeness")) {</a:t>
-            </a:r>
-          </a:p>
-          <a:p>
-            <a:r>
-              <a:rPr lang="en-US" dirty="0"/>
-              <a:t>      // …</a:t>
-            </a:r>
-          </a:p>
-          <a:p>
-            <a:r>
-              <a:rPr lang="en-US" dirty="0"/>
-              <a:t>   }</a:t>
-            </a:r>
-          </a:p>
-          <a:p>
-            <a:r>
-              <a:rPr lang="en-US" dirty="0"/>
-              <a:t>}</a:t>
-            </a:r>
+            <a:endParaRPr lang="en-US"/>
           </a:p>
         </p:txBody>
       </p:sp>
     </p:spTree>
     <p:extLst>
       <p:ext uri="{BB962C8B-B14F-4D97-AF65-F5344CB8AC3E}">
-        <p14:creationId xmlns:p14="http://schemas.microsoft.com/office/powerpoint/2010/main" val="3811043102"/>
+        <p14:creationId xmlns:p14="http://schemas.microsoft.com/office/powerpoint/2010/main" val="292374890"/>
       </p:ext>
     </p:extLst>
   </p:cSld>
   <p:clrMapOvr>
     <a:masterClrMapping/>
   </p:clrMapOvr>
-  <p:timing>
-    <p:tnLst>
-      <p:par>
-        <p:cTn id="1" dur="indefinite" restart="never" nodeType="tmRoot">
-          <p:childTnLst>
-            <p:seq concurrent="1" nextAc="seek">
-              <p:cTn id="2" dur="indefinite" nodeType="mainSeq">
-                <p:childTnLst>
-                  <p:par>
-                    <p:cTn id="3" fill="hold">
-                      <p:stCondLst>
-                        <p:cond delay="indefinite"/>
-                      </p:stCondLst>
-                      <p:childTnLst>
-                        <p:par>
-                          <p:cTn id="4" fill="hold">
-                            <p:stCondLst>
-                              <p:cond delay="0"/>
-                            </p:stCondLst>
-                            <p:childTnLst>
-                              <p:par>
-                                <p:cTn id="5" presetID="10" presetClass="entr" presetSubtype="0" fill="hold" grpId="0" nodeType="clickEffect">
-                                  <p:stCondLst>
-                                    <p:cond delay="0"/>
-                                  </p:stCondLst>
-                                  <p:childTnLst>
-                                    <p:set>
-                                      <p:cBhvr>
-                                        <p:cTn id="6" dur="1" fill="hold">
-                                          <p:stCondLst>
-                                            <p:cond delay="0"/>
-                                          </p:stCondLst>
-                                        </p:cTn>
-                                        <p:tgtEl>
-                                          <p:spTgt spid="4"/>
-                                        </p:tgtEl>
-                                        <p:attrNameLst>
-                                          <p:attrName>style.visibility</p:attrName>
-                                        </p:attrNameLst>
-                                      </p:cBhvr>
-                                      <p:to>
-                                        <p:strVal val="visible"/>
-                                      </p:to>
-                                    </p:set>
-                                    <p:animEffect transition="in" filter="fade">
-                                      <p:cBhvr>
-                                        <p:cTn id="7" dur="500"/>
-                                        <p:tgtEl>
-                                          <p:spTgt spid="4"/>
-                                        </p:tgtEl>
-                                      </p:cBhvr>
-                                    </p:animEffect>
-                                  </p:childTnLst>
-                                </p:cTn>
-                              </p:par>
-                            </p:childTnLst>
-                          </p:cTn>
-                        </p:par>
-                      </p:childTnLst>
-                    </p:cTn>
-                  </p:par>
-                </p:childTnLst>
-              </p:cTn>
-              <p:prevCondLst>
-                <p:cond evt="onPrev" delay="0">
-                  <p:tgtEl>
-                    <p:sldTgt/>
-                  </p:tgtEl>
-                </p:cond>
-              </p:prevCondLst>
-              <p:nextCondLst>
-                <p:cond evt="onNext" delay="0">
-                  <p:tgtEl>
-                    <p:sldTgt/>
-                  </p:tgtEl>
-                </p:cond>
-              </p:nextCondLst>
-            </p:seq>
-          </p:childTnLst>
-        </p:cTn>
-      </p:par>
-    </p:tnLst>
-    <p:bldLst>
-      <p:bldP spid="4" grpId="0"/>
-    </p:bldLst>
-  </p:timing>
 </p:sld>
 </file>
 

</xml_diff>